<commit_message>
added new logo versions
</commit_message>
<xml_diff>
--- a/Toolkit/Logos/Logo.pptx
+++ b/Toolkit/Logos/Logo.pptx
@@ -2,13 +2,14 @@
 <file path=ppt/presentation.xml><?xml version="1.0" encoding="utf-8"?>
 <p:presentation xmlns:a="http://schemas.openxmlformats.org/drawingml/2006/main" xmlns:r="http://schemas.openxmlformats.org/officeDocument/2006/relationships" xmlns:p="http://schemas.openxmlformats.org/presentationml/2006/main" saveSubsetFonts="1">
   <p:sldMasterIdLst>
-    <p:sldMasterId id="2147483672" r:id="rId1"/>
+    <p:sldMasterId id="2147483696" r:id="rId1"/>
   </p:sldMasterIdLst>
   <p:sldIdLst>
     <p:sldId id="257" r:id="rId2"/>
-    <p:sldId id="258" r:id="rId3"/>
+    <p:sldId id="259" r:id="rId3"/>
+    <p:sldId id="258" r:id="rId4"/>
   </p:sldIdLst>
-  <p:sldSz cx="2743200" cy="1828800"/>
+  <p:sldSz cx="1828800" cy="1828800"/>
   <p:notesSz cx="6858000" cy="9144000"/>
   <p:defaultTextStyle>
     <a:defPPr>
@@ -113,7 +114,7 @@
             <a:srgbClr val="A4A3A4"/>
           </p15:clr>
         </p15:guide>
-        <p15:guide id="2" pos="864" userDrawn="1">
+        <p15:guide id="2" pos="576" userDrawn="1">
           <p15:clr>
             <a:srgbClr val="A4A3A4"/>
           </p15:clr>
@@ -153,15 +154,15 @@
         </p:nvSpPr>
         <p:spPr>
           <a:xfrm>
-            <a:off x="205740" y="299297"/>
-            <a:ext cx="2331720" cy="636693"/>
+            <a:off x="137160" y="299297"/>
+            <a:ext cx="1554480" cy="636693"/>
           </a:xfrm>
         </p:spPr>
         <p:txBody>
           <a:bodyPr anchor="b"/>
           <a:lstStyle>
             <a:lvl1pPr algn="ctr">
-              <a:defRPr sz="1600"/>
+              <a:defRPr sz="1200"/>
             </a:lvl1pPr>
           </a:lstStyle>
           <a:p>
@@ -185,8 +186,8 @@
         </p:nvSpPr>
         <p:spPr>
           <a:xfrm>
-            <a:off x="342900" y="960543"/>
-            <a:ext cx="2057400" cy="441537"/>
+            <a:off x="228600" y="960543"/>
+            <a:ext cx="1371600" cy="441537"/>
           </a:xfrm>
         </p:spPr>
         <p:txBody>
@@ -194,39 +195,39 @@
           <a:lstStyle>
             <a:lvl1pPr marL="0" indent="0" algn="ctr">
               <a:buNone/>
-              <a:defRPr sz="640"/>
+              <a:defRPr sz="480"/>
             </a:lvl1pPr>
-            <a:lvl2pPr marL="121935" indent="0" algn="ctr">
+            <a:lvl2pPr marL="91440" indent="0" algn="ctr">
               <a:buNone/>
-              <a:defRPr sz="533"/>
+              <a:defRPr sz="400"/>
             </a:lvl2pPr>
-            <a:lvl3pPr marL="243870" indent="0" algn="ctr">
+            <a:lvl3pPr marL="182880" indent="0" algn="ctr">
               <a:buNone/>
-              <a:defRPr sz="480"/>
+              <a:defRPr sz="360"/>
             </a:lvl3pPr>
-            <a:lvl4pPr marL="365806" indent="0" algn="ctr">
+            <a:lvl4pPr marL="274320" indent="0" algn="ctr">
               <a:buNone/>
-              <a:defRPr sz="427"/>
+              <a:defRPr sz="320"/>
             </a:lvl4pPr>
-            <a:lvl5pPr marL="487741" indent="0" algn="ctr">
+            <a:lvl5pPr marL="365760" indent="0" algn="ctr">
               <a:buNone/>
-              <a:defRPr sz="427"/>
+              <a:defRPr sz="320"/>
             </a:lvl5pPr>
-            <a:lvl6pPr marL="609676" indent="0" algn="ctr">
+            <a:lvl6pPr marL="457200" indent="0" algn="ctr">
               <a:buNone/>
-              <a:defRPr sz="427"/>
+              <a:defRPr sz="320"/>
             </a:lvl6pPr>
-            <a:lvl7pPr marL="731611" indent="0" algn="ctr">
+            <a:lvl7pPr marL="548640" indent="0" algn="ctr">
               <a:buNone/>
-              <a:defRPr sz="427"/>
+              <a:defRPr sz="320"/>
             </a:lvl7pPr>
-            <a:lvl8pPr marL="853547" indent="0" algn="ctr">
+            <a:lvl8pPr marL="640080" indent="0" algn="ctr">
               <a:buNone/>
-              <a:defRPr sz="427"/>
+              <a:defRPr sz="320"/>
             </a:lvl8pPr>
-            <a:lvl9pPr marL="975482" indent="0" algn="ctr">
+            <a:lvl9pPr marL="731520" indent="0" algn="ctr">
               <a:buNone/>
-              <a:defRPr sz="427"/>
+              <a:defRPr sz="320"/>
             </a:lvl9pPr>
           </a:lstStyle>
           <a:p>
@@ -255,7 +256,7 @@
           <a:p>
             <a:fld id="{DDB6C534-9D36-4359-8E87-1610FE6652AD}" type="datetimeFigureOut">
               <a:rPr lang="en-US" smtClean="0"/>
-              <a:t>10/26/2022</a:t>
+              <a:t>11/2/2022</a:t>
             </a:fld>
             <a:endParaRPr lang="en-US"/>
           </a:p>
@@ -306,7 +307,7 @@
     </p:spTree>
     <p:extLst>
       <p:ext uri="{BB962C8B-B14F-4D97-AF65-F5344CB8AC3E}">
-        <p14:creationId xmlns:p14="http://schemas.microsoft.com/office/powerpoint/2010/main" val="3898887257"/>
+        <p14:creationId xmlns:p14="http://schemas.microsoft.com/office/powerpoint/2010/main" val="692520814"/>
       </p:ext>
     </p:extLst>
   </p:cSld>
@@ -425,7 +426,7 @@
           <a:p>
             <a:fld id="{DDB6C534-9D36-4359-8E87-1610FE6652AD}" type="datetimeFigureOut">
               <a:rPr lang="en-US" smtClean="0"/>
-              <a:t>10/26/2022</a:t>
+              <a:t>11/2/2022</a:t>
             </a:fld>
             <a:endParaRPr lang="en-US"/>
           </a:p>
@@ -476,7 +477,7 @@
     </p:spTree>
     <p:extLst>
       <p:ext uri="{BB962C8B-B14F-4D97-AF65-F5344CB8AC3E}">
-        <p14:creationId xmlns:p14="http://schemas.microsoft.com/office/powerpoint/2010/main" val="742837067"/>
+        <p14:creationId xmlns:p14="http://schemas.microsoft.com/office/powerpoint/2010/main" val="1290977821"/>
       </p:ext>
     </p:extLst>
   </p:cSld>
@@ -515,8 +516,8 @@
         </p:nvSpPr>
         <p:spPr>
           <a:xfrm>
-            <a:off x="1963102" y="97367"/>
-            <a:ext cx="591503" cy="1549823"/>
+            <a:off x="1308735" y="97367"/>
+            <a:ext cx="394335" cy="1549823"/>
           </a:xfrm>
         </p:spPr>
         <p:txBody>
@@ -543,8 +544,8 @@
         </p:nvSpPr>
         <p:spPr>
           <a:xfrm>
-            <a:off x="188595" y="97367"/>
-            <a:ext cx="1740218" cy="1549823"/>
+            <a:off x="125730" y="97367"/>
+            <a:ext cx="1160145" cy="1549823"/>
           </a:xfrm>
         </p:spPr>
         <p:txBody>
@@ -605,7 +606,7 @@
           <a:p>
             <a:fld id="{DDB6C534-9D36-4359-8E87-1610FE6652AD}" type="datetimeFigureOut">
               <a:rPr lang="en-US" smtClean="0"/>
-              <a:t>10/26/2022</a:t>
+              <a:t>11/2/2022</a:t>
             </a:fld>
             <a:endParaRPr lang="en-US"/>
           </a:p>
@@ -656,7 +657,7 @@
     </p:spTree>
     <p:extLst>
       <p:ext uri="{BB962C8B-B14F-4D97-AF65-F5344CB8AC3E}">
-        <p14:creationId xmlns:p14="http://schemas.microsoft.com/office/powerpoint/2010/main" val="3652625054"/>
+        <p14:creationId xmlns:p14="http://schemas.microsoft.com/office/powerpoint/2010/main" val="898344078"/>
       </p:ext>
     </p:extLst>
   </p:cSld>
@@ -775,7 +776,7 @@
           <a:p>
             <a:fld id="{DDB6C534-9D36-4359-8E87-1610FE6652AD}" type="datetimeFigureOut">
               <a:rPr lang="en-US" smtClean="0"/>
-              <a:t>10/26/2022</a:t>
+              <a:t>11/2/2022</a:t>
             </a:fld>
             <a:endParaRPr lang="en-US"/>
           </a:p>
@@ -826,7 +827,7 @@
     </p:spTree>
     <p:extLst>
       <p:ext uri="{BB962C8B-B14F-4D97-AF65-F5344CB8AC3E}">
-        <p14:creationId xmlns:p14="http://schemas.microsoft.com/office/powerpoint/2010/main" val="3232582432"/>
+        <p14:creationId xmlns:p14="http://schemas.microsoft.com/office/powerpoint/2010/main" val="3340995304"/>
       </p:ext>
     </p:extLst>
   </p:cSld>
@@ -865,15 +866,15 @@
         </p:nvSpPr>
         <p:spPr>
           <a:xfrm>
-            <a:off x="187166" y="455930"/>
-            <a:ext cx="2366010" cy="760730"/>
+            <a:off x="124778" y="455930"/>
+            <a:ext cx="1577340" cy="760730"/>
           </a:xfrm>
         </p:spPr>
         <p:txBody>
           <a:bodyPr anchor="b"/>
           <a:lstStyle>
             <a:lvl1pPr>
-              <a:defRPr sz="1600"/>
+              <a:defRPr sz="1200"/>
             </a:lvl1pPr>
           </a:lstStyle>
           <a:p>
@@ -897,8 +898,8 @@
         </p:nvSpPr>
         <p:spPr>
           <a:xfrm>
-            <a:off x="187166" y="1223857"/>
-            <a:ext cx="2366010" cy="400050"/>
+            <a:off x="124778" y="1223857"/>
+            <a:ext cx="1577340" cy="400050"/>
           </a:xfrm>
         </p:spPr>
         <p:txBody>
@@ -906,15 +907,15 @@
           <a:lstStyle>
             <a:lvl1pPr marL="0" indent="0">
               <a:buNone/>
-              <a:defRPr sz="640">
+              <a:defRPr sz="480">
                 <a:solidFill>
                   <a:schemeClr val="tx1"/>
                 </a:solidFill>
               </a:defRPr>
             </a:lvl1pPr>
-            <a:lvl2pPr marL="121935" indent="0">
+            <a:lvl2pPr marL="91440" indent="0">
               <a:buNone/>
-              <a:defRPr sz="533">
+              <a:defRPr sz="400">
                 <a:solidFill>
                   <a:schemeClr val="tx1">
                     <a:tint val="75000"/>
@@ -922,9 +923,9 @@
                 </a:solidFill>
               </a:defRPr>
             </a:lvl2pPr>
-            <a:lvl3pPr marL="243870" indent="0">
+            <a:lvl3pPr marL="182880" indent="0">
               <a:buNone/>
-              <a:defRPr sz="480">
+              <a:defRPr sz="360">
                 <a:solidFill>
                   <a:schemeClr val="tx1">
                     <a:tint val="75000"/>
@@ -932,9 +933,9 @@
                 </a:solidFill>
               </a:defRPr>
             </a:lvl3pPr>
-            <a:lvl4pPr marL="365806" indent="0">
+            <a:lvl4pPr marL="274320" indent="0">
               <a:buNone/>
-              <a:defRPr sz="427">
+              <a:defRPr sz="320">
                 <a:solidFill>
                   <a:schemeClr val="tx1">
                     <a:tint val="75000"/>
@@ -942,9 +943,9 @@
                 </a:solidFill>
               </a:defRPr>
             </a:lvl4pPr>
-            <a:lvl5pPr marL="487741" indent="0">
+            <a:lvl5pPr marL="365760" indent="0">
               <a:buNone/>
-              <a:defRPr sz="427">
+              <a:defRPr sz="320">
                 <a:solidFill>
                   <a:schemeClr val="tx1">
                     <a:tint val="75000"/>
@@ -952,9 +953,9 @@
                 </a:solidFill>
               </a:defRPr>
             </a:lvl5pPr>
-            <a:lvl6pPr marL="609676" indent="0">
+            <a:lvl6pPr marL="457200" indent="0">
               <a:buNone/>
-              <a:defRPr sz="427">
+              <a:defRPr sz="320">
                 <a:solidFill>
                   <a:schemeClr val="tx1">
                     <a:tint val="75000"/>
@@ -962,9 +963,9 @@
                 </a:solidFill>
               </a:defRPr>
             </a:lvl6pPr>
-            <a:lvl7pPr marL="731611" indent="0">
+            <a:lvl7pPr marL="548640" indent="0">
               <a:buNone/>
-              <a:defRPr sz="427">
+              <a:defRPr sz="320">
                 <a:solidFill>
                   <a:schemeClr val="tx1">
                     <a:tint val="75000"/>
@@ -972,9 +973,9 @@
                 </a:solidFill>
               </a:defRPr>
             </a:lvl7pPr>
-            <a:lvl8pPr marL="853547" indent="0">
+            <a:lvl8pPr marL="640080" indent="0">
               <a:buNone/>
-              <a:defRPr sz="427">
+              <a:defRPr sz="320">
                 <a:solidFill>
                   <a:schemeClr val="tx1">
                     <a:tint val="75000"/>
@@ -982,9 +983,9 @@
                 </a:solidFill>
               </a:defRPr>
             </a:lvl8pPr>
-            <a:lvl9pPr marL="975482" indent="0">
+            <a:lvl9pPr marL="731520" indent="0">
               <a:buNone/>
-              <a:defRPr sz="427">
+              <a:defRPr sz="320">
                 <a:solidFill>
                   <a:schemeClr val="tx1">
                     <a:tint val="75000"/>
@@ -1019,7 +1020,7 @@
           <a:p>
             <a:fld id="{DDB6C534-9D36-4359-8E87-1610FE6652AD}" type="datetimeFigureOut">
               <a:rPr lang="en-US" smtClean="0"/>
-              <a:t>10/26/2022</a:t>
+              <a:t>11/2/2022</a:t>
             </a:fld>
             <a:endParaRPr lang="en-US"/>
           </a:p>
@@ -1070,7 +1071,7 @@
     </p:spTree>
     <p:extLst>
       <p:ext uri="{BB962C8B-B14F-4D97-AF65-F5344CB8AC3E}">
-        <p14:creationId xmlns:p14="http://schemas.microsoft.com/office/powerpoint/2010/main" val="3318046134"/>
+        <p14:creationId xmlns:p14="http://schemas.microsoft.com/office/powerpoint/2010/main" val="3987760511"/>
       </p:ext>
     </p:extLst>
   </p:cSld>
@@ -1132,8 +1133,8 @@
         </p:nvSpPr>
         <p:spPr>
           <a:xfrm>
-            <a:off x="188595" y="486833"/>
-            <a:ext cx="1165860" cy="1160357"/>
+            <a:off x="125730" y="486833"/>
+            <a:ext cx="777240" cy="1160357"/>
           </a:xfrm>
         </p:spPr>
         <p:txBody>
@@ -1189,8 +1190,8 @@
         </p:nvSpPr>
         <p:spPr>
           <a:xfrm>
-            <a:off x="1388745" y="486833"/>
-            <a:ext cx="1165860" cy="1160357"/>
+            <a:off x="925830" y="486833"/>
+            <a:ext cx="777240" cy="1160357"/>
           </a:xfrm>
         </p:spPr>
         <p:txBody>
@@ -1251,7 +1252,7 @@
           <a:p>
             <a:fld id="{DDB6C534-9D36-4359-8E87-1610FE6652AD}" type="datetimeFigureOut">
               <a:rPr lang="en-US" smtClean="0"/>
-              <a:t>10/26/2022</a:t>
+              <a:t>11/2/2022</a:t>
             </a:fld>
             <a:endParaRPr lang="en-US"/>
           </a:p>
@@ -1302,7 +1303,7 @@
     </p:spTree>
     <p:extLst>
       <p:ext uri="{BB962C8B-B14F-4D97-AF65-F5344CB8AC3E}">
-        <p14:creationId xmlns:p14="http://schemas.microsoft.com/office/powerpoint/2010/main" val="2623249498"/>
+        <p14:creationId xmlns:p14="http://schemas.microsoft.com/office/powerpoint/2010/main" val="1529175727"/>
       </p:ext>
     </p:extLst>
   </p:cSld>
@@ -1341,8 +1342,8 @@
         </p:nvSpPr>
         <p:spPr>
           <a:xfrm>
-            <a:off x="188952" y="97367"/>
-            <a:ext cx="2366010" cy="353483"/>
+            <a:off x="125968" y="97367"/>
+            <a:ext cx="1577340" cy="353483"/>
           </a:xfrm>
         </p:spPr>
         <p:txBody>
@@ -1369,8 +1370,8 @@
         </p:nvSpPr>
         <p:spPr>
           <a:xfrm>
-            <a:off x="188953" y="448310"/>
-            <a:ext cx="1160502" cy="219710"/>
+            <a:off x="125968" y="448310"/>
+            <a:ext cx="773668" cy="219710"/>
           </a:xfrm>
         </p:spPr>
         <p:txBody>
@@ -1378,39 +1379,39 @@
           <a:lstStyle>
             <a:lvl1pPr marL="0" indent="0">
               <a:buNone/>
-              <a:defRPr sz="640" b="1"/>
+              <a:defRPr sz="480" b="1"/>
             </a:lvl1pPr>
-            <a:lvl2pPr marL="121935" indent="0">
+            <a:lvl2pPr marL="91440" indent="0">
               <a:buNone/>
-              <a:defRPr sz="533" b="1"/>
+              <a:defRPr sz="400" b="1"/>
             </a:lvl2pPr>
-            <a:lvl3pPr marL="243870" indent="0">
+            <a:lvl3pPr marL="182880" indent="0">
               <a:buNone/>
-              <a:defRPr sz="480" b="1"/>
+              <a:defRPr sz="360" b="1"/>
             </a:lvl3pPr>
-            <a:lvl4pPr marL="365806" indent="0">
+            <a:lvl4pPr marL="274320" indent="0">
               <a:buNone/>
-              <a:defRPr sz="427" b="1"/>
+              <a:defRPr sz="320" b="1"/>
             </a:lvl4pPr>
-            <a:lvl5pPr marL="487741" indent="0">
+            <a:lvl5pPr marL="365760" indent="0">
               <a:buNone/>
-              <a:defRPr sz="427" b="1"/>
+              <a:defRPr sz="320" b="1"/>
             </a:lvl5pPr>
-            <a:lvl6pPr marL="609676" indent="0">
+            <a:lvl6pPr marL="457200" indent="0">
               <a:buNone/>
-              <a:defRPr sz="427" b="1"/>
+              <a:defRPr sz="320" b="1"/>
             </a:lvl6pPr>
-            <a:lvl7pPr marL="731611" indent="0">
+            <a:lvl7pPr marL="548640" indent="0">
               <a:buNone/>
-              <a:defRPr sz="427" b="1"/>
+              <a:defRPr sz="320" b="1"/>
             </a:lvl7pPr>
-            <a:lvl8pPr marL="853547" indent="0">
+            <a:lvl8pPr marL="640080" indent="0">
               <a:buNone/>
-              <a:defRPr sz="427" b="1"/>
+              <a:defRPr sz="320" b="1"/>
             </a:lvl8pPr>
-            <a:lvl9pPr marL="975482" indent="0">
+            <a:lvl9pPr marL="731520" indent="0">
               <a:buNone/>
-              <a:defRPr sz="427" b="1"/>
+              <a:defRPr sz="320" b="1"/>
             </a:lvl9pPr>
           </a:lstStyle>
           <a:p>
@@ -1434,8 +1435,8 @@
         </p:nvSpPr>
         <p:spPr>
           <a:xfrm>
-            <a:off x="188953" y="668020"/>
-            <a:ext cx="1160502" cy="982557"/>
+            <a:off x="125968" y="668020"/>
+            <a:ext cx="773668" cy="982557"/>
           </a:xfrm>
         </p:spPr>
         <p:txBody>
@@ -1491,8 +1492,8 @@
         </p:nvSpPr>
         <p:spPr>
           <a:xfrm>
-            <a:off x="1388745" y="448310"/>
-            <a:ext cx="1166217" cy="219710"/>
+            <a:off x="925830" y="448310"/>
+            <a:ext cx="777478" cy="219710"/>
           </a:xfrm>
         </p:spPr>
         <p:txBody>
@@ -1500,39 +1501,39 @@
           <a:lstStyle>
             <a:lvl1pPr marL="0" indent="0">
               <a:buNone/>
-              <a:defRPr sz="640" b="1"/>
+              <a:defRPr sz="480" b="1"/>
             </a:lvl1pPr>
-            <a:lvl2pPr marL="121935" indent="0">
+            <a:lvl2pPr marL="91440" indent="0">
               <a:buNone/>
-              <a:defRPr sz="533" b="1"/>
+              <a:defRPr sz="400" b="1"/>
             </a:lvl2pPr>
-            <a:lvl3pPr marL="243870" indent="0">
+            <a:lvl3pPr marL="182880" indent="0">
               <a:buNone/>
-              <a:defRPr sz="480" b="1"/>
+              <a:defRPr sz="360" b="1"/>
             </a:lvl3pPr>
-            <a:lvl4pPr marL="365806" indent="0">
+            <a:lvl4pPr marL="274320" indent="0">
               <a:buNone/>
-              <a:defRPr sz="427" b="1"/>
+              <a:defRPr sz="320" b="1"/>
             </a:lvl4pPr>
-            <a:lvl5pPr marL="487741" indent="0">
+            <a:lvl5pPr marL="365760" indent="0">
               <a:buNone/>
-              <a:defRPr sz="427" b="1"/>
+              <a:defRPr sz="320" b="1"/>
             </a:lvl5pPr>
-            <a:lvl6pPr marL="609676" indent="0">
+            <a:lvl6pPr marL="457200" indent="0">
               <a:buNone/>
-              <a:defRPr sz="427" b="1"/>
+              <a:defRPr sz="320" b="1"/>
             </a:lvl6pPr>
-            <a:lvl7pPr marL="731611" indent="0">
+            <a:lvl7pPr marL="548640" indent="0">
               <a:buNone/>
-              <a:defRPr sz="427" b="1"/>
+              <a:defRPr sz="320" b="1"/>
             </a:lvl7pPr>
-            <a:lvl8pPr marL="853547" indent="0">
+            <a:lvl8pPr marL="640080" indent="0">
               <a:buNone/>
-              <a:defRPr sz="427" b="1"/>
+              <a:defRPr sz="320" b="1"/>
             </a:lvl8pPr>
-            <a:lvl9pPr marL="975482" indent="0">
+            <a:lvl9pPr marL="731520" indent="0">
               <a:buNone/>
-              <a:defRPr sz="427" b="1"/>
+              <a:defRPr sz="320" b="1"/>
             </a:lvl9pPr>
           </a:lstStyle>
           <a:p>
@@ -1556,8 +1557,8 @@
         </p:nvSpPr>
         <p:spPr>
           <a:xfrm>
-            <a:off x="1388745" y="668020"/>
-            <a:ext cx="1166217" cy="982557"/>
+            <a:off x="925830" y="668020"/>
+            <a:ext cx="777478" cy="982557"/>
           </a:xfrm>
         </p:spPr>
         <p:txBody>
@@ -1618,7 +1619,7 @@
           <a:p>
             <a:fld id="{DDB6C534-9D36-4359-8E87-1610FE6652AD}" type="datetimeFigureOut">
               <a:rPr lang="en-US" smtClean="0"/>
-              <a:t>10/26/2022</a:t>
+              <a:t>11/2/2022</a:t>
             </a:fld>
             <a:endParaRPr lang="en-US"/>
           </a:p>
@@ -1669,7 +1670,7 @@
     </p:spTree>
     <p:extLst>
       <p:ext uri="{BB962C8B-B14F-4D97-AF65-F5344CB8AC3E}">
-        <p14:creationId xmlns:p14="http://schemas.microsoft.com/office/powerpoint/2010/main" val="3798495813"/>
+        <p14:creationId xmlns:p14="http://schemas.microsoft.com/office/powerpoint/2010/main" val="3025002703"/>
       </p:ext>
     </p:extLst>
   </p:cSld>
@@ -1736,7 +1737,7 @@
           <a:p>
             <a:fld id="{DDB6C534-9D36-4359-8E87-1610FE6652AD}" type="datetimeFigureOut">
               <a:rPr lang="en-US" smtClean="0"/>
-              <a:t>10/26/2022</a:t>
+              <a:t>11/2/2022</a:t>
             </a:fld>
             <a:endParaRPr lang="en-US"/>
           </a:p>
@@ -1787,7 +1788,7 @@
     </p:spTree>
     <p:extLst>
       <p:ext uri="{BB962C8B-B14F-4D97-AF65-F5344CB8AC3E}">
-        <p14:creationId xmlns:p14="http://schemas.microsoft.com/office/powerpoint/2010/main" val="3921388947"/>
+        <p14:creationId xmlns:p14="http://schemas.microsoft.com/office/powerpoint/2010/main" val="2530096807"/>
       </p:ext>
     </p:extLst>
   </p:cSld>
@@ -1831,7 +1832,7 @@
           <a:p>
             <a:fld id="{DDB6C534-9D36-4359-8E87-1610FE6652AD}" type="datetimeFigureOut">
               <a:rPr lang="en-US" smtClean="0"/>
-              <a:t>10/26/2022</a:t>
+              <a:t>11/2/2022</a:t>
             </a:fld>
             <a:endParaRPr lang="en-US"/>
           </a:p>
@@ -1882,7 +1883,7 @@
     </p:spTree>
     <p:extLst>
       <p:ext uri="{BB962C8B-B14F-4D97-AF65-F5344CB8AC3E}">
-        <p14:creationId xmlns:p14="http://schemas.microsoft.com/office/powerpoint/2010/main" val="3534261111"/>
+        <p14:creationId xmlns:p14="http://schemas.microsoft.com/office/powerpoint/2010/main" val="3836708272"/>
       </p:ext>
     </p:extLst>
   </p:cSld>
@@ -1921,15 +1922,15 @@
         </p:nvSpPr>
         <p:spPr>
           <a:xfrm>
-            <a:off x="188953" y="121920"/>
-            <a:ext cx="884753" cy="426720"/>
+            <a:off x="125968" y="121920"/>
+            <a:ext cx="589836" cy="426720"/>
           </a:xfrm>
         </p:spPr>
         <p:txBody>
           <a:bodyPr anchor="b"/>
           <a:lstStyle>
             <a:lvl1pPr>
-              <a:defRPr sz="853"/>
+              <a:defRPr sz="640"/>
             </a:lvl1pPr>
           </a:lstStyle>
           <a:p>
@@ -1953,39 +1954,39 @@
         </p:nvSpPr>
         <p:spPr>
           <a:xfrm>
-            <a:off x="1166217" y="263314"/>
-            <a:ext cx="1388745" cy="1299633"/>
+            <a:off x="777478" y="263314"/>
+            <a:ext cx="925830" cy="1299633"/>
           </a:xfrm>
         </p:spPr>
         <p:txBody>
           <a:bodyPr/>
           <a:lstStyle>
             <a:lvl1pPr>
-              <a:defRPr sz="853"/>
+              <a:defRPr sz="640"/>
             </a:lvl1pPr>
             <a:lvl2pPr>
-              <a:defRPr sz="747"/>
+              <a:defRPr sz="560"/>
             </a:lvl2pPr>
             <a:lvl3pPr>
-              <a:defRPr sz="640"/>
+              <a:defRPr sz="480"/>
             </a:lvl3pPr>
             <a:lvl4pPr>
-              <a:defRPr sz="533"/>
+              <a:defRPr sz="400"/>
             </a:lvl4pPr>
             <a:lvl5pPr>
-              <a:defRPr sz="533"/>
+              <a:defRPr sz="400"/>
             </a:lvl5pPr>
             <a:lvl6pPr>
-              <a:defRPr sz="533"/>
+              <a:defRPr sz="400"/>
             </a:lvl6pPr>
             <a:lvl7pPr>
-              <a:defRPr sz="533"/>
+              <a:defRPr sz="400"/>
             </a:lvl7pPr>
             <a:lvl8pPr>
-              <a:defRPr sz="533"/>
+              <a:defRPr sz="400"/>
             </a:lvl8pPr>
             <a:lvl9pPr>
-              <a:defRPr sz="533"/>
+              <a:defRPr sz="400"/>
             </a:lvl9pPr>
           </a:lstStyle>
           <a:p>
@@ -2038,8 +2039,8 @@
         </p:nvSpPr>
         <p:spPr>
           <a:xfrm>
-            <a:off x="188953" y="548640"/>
-            <a:ext cx="884753" cy="1016423"/>
+            <a:off x="125968" y="548640"/>
+            <a:ext cx="589836" cy="1016423"/>
           </a:xfrm>
         </p:spPr>
         <p:txBody>
@@ -2047,39 +2048,39 @@
           <a:lstStyle>
             <a:lvl1pPr marL="0" indent="0">
               <a:buNone/>
-              <a:defRPr sz="427"/>
+              <a:defRPr sz="320"/>
             </a:lvl1pPr>
-            <a:lvl2pPr marL="121935" indent="0">
+            <a:lvl2pPr marL="91440" indent="0">
               <a:buNone/>
-              <a:defRPr sz="373"/>
+              <a:defRPr sz="280"/>
             </a:lvl2pPr>
-            <a:lvl3pPr marL="243870" indent="0">
+            <a:lvl3pPr marL="182880" indent="0">
               <a:buNone/>
-              <a:defRPr sz="320"/>
+              <a:defRPr sz="240"/>
             </a:lvl3pPr>
-            <a:lvl4pPr marL="365806" indent="0">
+            <a:lvl4pPr marL="274320" indent="0">
               <a:buNone/>
-              <a:defRPr sz="267"/>
+              <a:defRPr sz="200"/>
             </a:lvl4pPr>
-            <a:lvl5pPr marL="487741" indent="0">
+            <a:lvl5pPr marL="365760" indent="0">
               <a:buNone/>
-              <a:defRPr sz="267"/>
+              <a:defRPr sz="200"/>
             </a:lvl5pPr>
-            <a:lvl6pPr marL="609676" indent="0">
+            <a:lvl6pPr marL="457200" indent="0">
               <a:buNone/>
-              <a:defRPr sz="267"/>
+              <a:defRPr sz="200"/>
             </a:lvl6pPr>
-            <a:lvl7pPr marL="731611" indent="0">
+            <a:lvl7pPr marL="548640" indent="0">
               <a:buNone/>
-              <a:defRPr sz="267"/>
+              <a:defRPr sz="200"/>
             </a:lvl7pPr>
-            <a:lvl8pPr marL="853547" indent="0">
+            <a:lvl8pPr marL="640080" indent="0">
               <a:buNone/>
-              <a:defRPr sz="267"/>
+              <a:defRPr sz="200"/>
             </a:lvl8pPr>
-            <a:lvl9pPr marL="975482" indent="0">
+            <a:lvl9pPr marL="731520" indent="0">
               <a:buNone/>
-              <a:defRPr sz="267"/>
+              <a:defRPr sz="200"/>
             </a:lvl9pPr>
           </a:lstStyle>
           <a:p>
@@ -2108,7 +2109,7 @@
           <a:p>
             <a:fld id="{DDB6C534-9D36-4359-8E87-1610FE6652AD}" type="datetimeFigureOut">
               <a:rPr lang="en-US" smtClean="0"/>
-              <a:t>10/26/2022</a:t>
+              <a:t>11/2/2022</a:t>
             </a:fld>
             <a:endParaRPr lang="en-US"/>
           </a:p>
@@ -2159,7 +2160,7 @@
     </p:spTree>
     <p:extLst>
       <p:ext uri="{BB962C8B-B14F-4D97-AF65-F5344CB8AC3E}">
-        <p14:creationId xmlns:p14="http://schemas.microsoft.com/office/powerpoint/2010/main" val="733846998"/>
+        <p14:creationId xmlns:p14="http://schemas.microsoft.com/office/powerpoint/2010/main" val="579030103"/>
       </p:ext>
     </p:extLst>
   </p:cSld>
@@ -2198,15 +2199,15 @@
         </p:nvSpPr>
         <p:spPr>
           <a:xfrm>
-            <a:off x="188953" y="121920"/>
-            <a:ext cx="884753" cy="426720"/>
+            <a:off x="125968" y="121920"/>
+            <a:ext cx="589836" cy="426720"/>
           </a:xfrm>
         </p:spPr>
         <p:txBody>
           <a:bodyPr anchor="b"/>
           <a:lstStyle>
             <a:lvl1pPr>
-              <a:defRPr sz="853"/>
+              <a:defRPr sz="640"/>
             </a:lvl1pPr>
           </a:lstStyle>
           <a:p>
@@ -2230,8 +2231,8 @@
         </p:nvSpPr>
         <p:spPr>
           <a:xfrm>
-            <a:off x="1166217" y="263314"/>
-            <a:ext cx="1388745" cy="1299633"/>
+            <a:off x="777478" y="263314"/>
+            <a:ext cx="925830" cy="1299633"/>
           </a:xfrm>
         </p:spPr>
         <p:txBody>
@@ -2239,39 +2240,39 @@
           <a:lstStyle>
             <a:lvl1pPr marL="0" indent="0">
               <a:buNone/>
-              <a:defRPr sz="853"/>
+              <a:defRPr sz="640"/>
             </a:lvl1pPr>
-            <a:lvl2pPr marL="121935" indent="0">
+            <a:lvl2pPr marL="91440" indent="0">
               <a:buNone/>
-              <a:defRPr sz="747"/>
+              <a:defRPr sz="560"/>
             </a:lvl2pPr>
-            <a:lvl3pPr marL="243870" indent="0">
+            <a:lvl3pPr marL="182880" indent="0">
               <a:buNone/>
-              <a:defRPr sz="640"/>
+              <a:defRPr sz="480"/>
             </a:lvl3pPr>
-            <a:lvl4pPr marL="365806" indent="0">
+            <a:lvl4pPr marL="274320" indent="0">
               <a:buNone/>
-              <a:defRPr sz="533"/>
+              <a:defRPr sz="400"/>
             </a:lvl4pPr>
-            <a:lvl5pPr marL="487741" indent="0">
+            <a:lvl5pPr marL="365760" indent="0">
               <a:buNone/>
-              <a:defRPr sz="533"/>
+              <a:defRPr sz="400"/>
             </a:lvl5pPr>
-            <a:lvl6pPr marL="609676" indent="0">
+            <a:lvl6pPr marL="457200" indent="0">
               <a:buNone/>
-              <a:defRPr sz="533"/>
+              <a:defRPr sz="400"/>
             </a:lvl6pPr>
-            <a:lvl7pPr marL="731611" indent="0">
+            <a:lvl7pPr marL="548640" indent="0">
               <a:buNone/>
-              <a:defRPr sz="533"/>
+              <a:defRPr sz="400"/>
             </a:lvl7pPr>
-            <a:lvl8pPr marL="853547" indent="0">
+            <a:lvl8pPr marL="640080" indent="0">
               <a:buNone/>
-              <a:defRPr sz="533"/>
+              <a:defRPr sz="400"/>
             </a:lvl8pPr>
-            <a:lvl9pPr marL="975482" indent="0">
+            <a:lvl9pPr marL="731520" indent="0">
               <a:buNone/>
-              <a:defRPr sz="533"/>
+              <a:defRPr sz="400"/>
             </a:lvl9pPr>
           </a:lstStyle>
           <a:p>
@@ -2295,8 +2296,8 @@
         </p:nvSpPr>
         <p:spPr>
           <a:xfrm>
-            <a:off x="188953" y="548640"/>
-            <a:ext cx="884753" cy="1016423"/>
+            <a:off x="125968" y="548640"/>
+            <a:ext cx="589836" cy="1016423"/>
           </a:xfrm>
         </p:spPr>
         <p:txBody>
@@ -2304,39 +2305,39 @@
           <a:lstStyle>
             <a:lvl1pPr marL="0" indent="0">
               <a:buNone/>
-              <a:defRPr sz="427"/>
+              <a:defRPr sz="320"/>
             </a:lvl1pPr>
-            <a:lvl2pPr marL="121935" indent="0">
+            <a:lvl2pPr marL="91440" indent="0">
               <a:buNone/>
-              <a:defRPr sz="373"/>
+              <a:defRPr sz="280"/>
             </a:lvl2pPr>
-            <a:lvl3pPr marL="243870" indent="0">
+            <a:lvl3pPr marL="182880" indent="0">
               <a:buNone/>
-              <a:defRPr sz="320"/>
+              <a:defRPr sz="240"/>
             </a:lvl3pPr>
-            <a:lvl4pPr marL="365806" indent="0">
+            <a:lvl4pPr marL="274320" indent="0">
               <a:buNone/>
-              <a:defRPr sz="267"/>
+              <a:defRPr sz="200"/>
             </a:lvl4pPr>
-            <a:lvl5pPr marL="487741" indent="0">
+            <a:lvl5pPr marL="365760" indent="0">
               <a:buNone/>
-              <a:defRPr sz="267"/>
+              <a:defRPr sz="200"/>
             </a:lvl5pPr>
-            <a:lvl6pPr marL="609676" indent="0">
+            <a:lvl6pPr marL="457200" indent="0">
               <a:buNone/>
-              <a:defRPr sz="267"/>
+              <a:defRPr sz="200"/>
             </a:lvl6pPr>
-            <a:lvl7pPr marL="731611" indent="0">
+            <a:lvl7pPr marL="548640" indent="0">
               <a:buNone/>
-              <a:defRPr sz="267"/>
+              <a:defRPr sz="200"/>
             </a:lvl7pPr>
-            <a:lvl8pPr marL="853547" indent="0">
+            <a:lvl8pPr marL="640080" indent="0">
               <a:buNone/>
-              <a:defRPr sz="267"/>
+              <a:defRPr sz="200"/>
             </a:lvl8pPr>
-            <a:lvl9pPr marL="975482" indent="0">
+            <a:lvl9pPr marL="731520" indent="0">
               <a:buNone/>
-              <a:defRPr sz="267"/>
+              <a:defRPr sz="200"/>
             </a:lvl9pPr>
           </a:lstStyle>
           <a:p>
@@ -2365,7 +2366,7 @@
           <a:p>
             <a:fld id="{DDB6C534-9D36-4359-8E87-1610FE6652AD}" type="datetimeFigureOut">
               <a:rPr lang="en-US" smtClean="0"/>
-              <a:t>10/26/2022</a:t>
+              <a:t>11/2/2022</a:t>
             </a:fld>
             <a:endParaRPr lang="en-US"/>
           </a:p>
@@ -2416,7 +2417,7 @@
     </p:spTree>
     <p:extLst>
       <p:ext uri="{BB962C8B-B14F-4D97-AF65-F5344CB8AC3E}">
-        <p14:creationId xmlns:p14="http://schemas.microsoft.com/office/powerpoint/2010/main" val="3381702373"/>
+        <p14:creationId xmlns:p14="http://schemas.microsoft.com/office/powerpoint/2010/main" val="1699964150"/>
       </p:ext>
     </p:extLst>
   </p:cSld>
@@ -2460,8 +2461,8 @@
         </p:nvSpPr>
         <p:spPr>
           <a:xfrm>
-            <a:off x="188595" y="97367"/>
-            <a:ext cx="2366010" cy="353483"/>
+            <a:off x="125730" y="97367"/>
+            <a:ext cx="1577340" cy="353483"/>
           </a:xfrm>
           <a:prstGeom prst="rect">
             <a:avLst/>
@@ -2493,8 +2494,8 @@
         </p:nvSpPr>
         <p:spPr>
           <a:xfrm>
-            <a:off x="188595" y="486833"/>
-            <a:ext cx="2366010" cy="1160357"/>
+            <a:off x="125730" y="486833"/>
+            <a:ext cx="1577340" cy="1160357"/>
           </a:xfrm>
           <a:prstGeom prst="rect">
             <a:avLst/>
@@ -2555,8 +2556,8 @@
         </p:nvSpPr>
         <p:spPr>
           <a:xfrm>
-            <a:off x="188595" y="1695027"/>
-            <a:ext cx="617220" cy="97367"/>
+            <a:off x="125730" y="1695027"/>
+            <a:ext cx="411480" cy="97367"/>
           </a:xfrm>
           <a:prstGeom prst="rect">
             <a:avLst/>
@@ -2566,7 +2567,7 @@
           <a:bodyPr vert="horz" lIns="91440" tIns="45720" rIns="91440" bIns="45720" rtlCol="0" anchor="ctr"/>
           <a:lstStyle>
             <a:lvl1pPr algn="l">
-              <a:defRPr sz="320">
+              <a:defRPr sz="240">
                 <a:solidFill>
                   <a:schemeClr val="tx1">
                     <a:tint val="75000"/>
@@ -2578,7 +2579,7 @@
           <a:p>
             <a:fld id="{DDB6C534-9D36-4359-8E87-1610FE6652AD}" type="datetimeFigureOut">
               <a:rPr lang="en-US" smtClean="0"/>
-              <a:t>10/26/2022</a:t>
+              <a:t>11/2/2022</a:t>
             </a:fld>
             <a:endParaRPr lang="en-US"/>
           </a:p>
@@ -2596,8 +2597,8 @@
         </p:nvSpPr>
         <p:spPr>
           <a:xfrm>
-            <a:off x="908685" y="1695027"/>
-            <a:ext cx="925830" cy="97367"/>
+            <a:off x="605790" y="1695027"/>
+            <a:ext cx="617220" cy="97367"/>
           </a:xfrm>
           <a:prstGeom prst="rect">
             <a:avLst/>
@@ -2607,7 +2608,7 @@
           <a:bodyPr vert="horz" lIns="91440" tIns="45720" rIns="91440" bIns="45720" rtlCol="0" anchor="ctr"/>
           <a:lstStyle>
             <a:lvl1pPr algn="ctr">
-              <a:defRPr sz="320">
+              <a:defRPr sz="240">
                 <a:solidFill>
                   <a:schemeClr val="tx1">
                     <a:tint val="75000"/>
@@ -2633,8 +2634,8 @@
         </p:nvSpPr>
         <p:spPr>
           <a:xfrm>
-            <a:off x="1937385" y="1695027"/>
-            <a:ext cx="617220" cy="97367"/>
+            <a:off x="1291590" y="1695027"/>
+            <a:ext cx="411480" cy="97367"/>
           </a:xfrm>
           <a:prstGeom prst="rect">
             <a:avLst/>
@@ -2644,7 +2645,7 @@
           <a:bodyPr vert="horz" lIns="91440" tIns="45720" rIns="91440" bIns="45720" rtlCol="0" anchor="ctr"/>
           <a:lstStyle>
             <a:lvl1pPr algn="r">
-              <a:defRPr sz="320">
+              <a:defRPr sz="240">
                 <a:solidFill>
                   <a:schemeClr val="tx1">
                     <a:tint val="75000"/>
@@ -2665,27 +2666,27 @@
     </p:spTree>
     <p:extLst>
       <p:ext uri="{BB962C8B-B14F-4D97-AF65-F5344CB8AC3E}">
-        <p14:creationId xmlns:p14="http://schemas.microsoft.com/office/powerpoint/2010/main" val="3207051848"/>
+        <p14:creationId xmlns:p14="http://schemas.microsoft.com/office/powerpoint/2010/main" val="694736346"/>
       </p:ext>
     </p:extLst>
   </p:cSld>
   <p:clrMap bg1="lt1" tx1="dk1" bg2="lt2" tx2="dk2" accent1="accent1" accent2="accent2" accent3="accent3" accent4="accent4" accent5="accent5" accent6="accent6" hlink="hlink" folHlink="folHlink"/>
   <p:sldLayoutIdLst>
-    <p:sldLayoutId id="2147483673" r:id="rId1"/>
-    <p:sldLayoutId id="2147483674" r:id="rId2"/>
-    <p:sldLayoutId id="2147483675" r:id="rId3"/>
-    <p:sldLayoutId id="2147483676" r:id="rId4"/>
-    <p:sldLayoutId id="2147483677" r:id="rId5"/>
-    <p:sldLayoutId id="2147483678" r:id="rId6"/>
-    <p:sldLayoutId id="2147483679" r:id="rId7"/>
-    <p:sldLayoutId id="2147483680" r:id="rId8"/>
-    <p:sldLayoutId id="2147483681" r:id="rId9"/>
-    <p:sldLayoutId id="2147483682" r:id="rId10"/>
-    <p:sldLayoutId id="2147483683" r:id="rId11"/>
+    <p:sldLayoutId id="2147483697" r:id="rId1"/>
+    <p:sldLayoutId id="2147483698" r:id="rId2"/>
+    <p:sldLayoutId id="2147483699" r:id="rId3"/>
+    <p:sldLayoutId id="2147483700" r:id="rId4"/>
+    <p:sldLayoutId id="2147483701" r:id="rId5"/>
+    <p:sldLayoutId id="2147483702" r:id="rId6"/>
+    <p:sldLayoutId id="2147483703" r:id="rId7"/>
+    <p:sldLayoutId id="2147483704" r:id="rId8"/>
+    <p:sldLayoutId id="2147483705" r:id="rId9"/>
+    <p:sldLayoutId id="2147483706" r:id="rId10"/>
+    <p:sldLayoutId id="2147483707" r:id="rId11"/>
   </p:sldLayoutIdLst>
   <p:txStyles>
     <p:titleStyle>
-      <a:lvl1pPr algn="l" defTabSz="243870" rtl="0" eaLnBrk="1" latinLnBrk="0" hangingPunct="1">
+      <a:lvl1pPr algn="l" defTabSz="182880" rtl="0" eaLnBrk="1" latinLnBrk="0" hangingPunct="1">
         <a:lnSpc>
           <a:spcPct val="90000"/>
         </a:lnSpc>
@@ -2693,7 +2694,7 @@
           <a:spcPct val="0"/>
         </a:spcBef>
         <a:buNone/>
-        <a:defRPr sz="1173" kern="1200">
+        <a:defRPr sz="880" kern="1200">
           <a:solidFill>
             <a:schemeClr val="tx1"/>
           </a:solidFill>
@@ -2704,16 +2705,16 @@
       </a:lvl1pPr>
     </p:titleStyle>
     <p:bodyStyle>
-      <a:lvl1pPr marL="60968" indent="-60968" algn="l" defTabSz="243870" rtl="0" eaLnBrk="1" latinLnBrk="0" hangingPunct="1">
+      <a:lvl1pPr marL="45720" indent="-45720" algn="l" defTabSz="182880" rtl="0" eaLnBrk="1" latinLnBrk="0" hangingPunct="1">
         <a:lnSpc>
           <a:spcPct val="90000"/>
         </a:lnSpc>
         <a:spcBef>
-          <a:spcPts val="267"/>
+          <a:spcPts val="200"/>
         </a:spcBef>
         <a:buFont typeface="Arial" panose="020B0604020202020204" pitchFamily="34" charset="0"/>
         <a:buChar char="•"/>
-        <a:defRPr sz="747" kern="1200">
+        <a:defRPr sz="560" kern="1200">
           <a:solidFill>
             <a:schemeClr val="tx1"/>
           </a:solidFill>
@@ -2722,48 +2723,12 @@
           <a:cs typeface="+mn-cs"/>
         </a:defRPr>
       </a:lvl1pPr>
-      <a:lvl2pPr marL="182903" indent="-60968" algn="l" defTabSz="243870" rtl="0" eaLnBrk="1" latinLnBrk="0" hangingPunct="1">
+      <a:lvl2pPr marL="137160" indent="-45720" algn="l" defTabSz="182880" rtl="0" eaLnBrk="1" latinLnBrk="0" hangingPunct="1">
         <a:lnSpc>
           <a:spcPct val="90000"/>
         </a:lnSpc>
         <a:spcBef>
-          <a:spcPts val="133"/>
-        </a:spcBef>
-        <a:buFont typeface="Arial" panose="020B0604020202020204" pitchFamily="34" charset="0"/>
-        <a:buChar char="•"/>
-        <a:defRPr sz="640" kern="1200">
-          <a:solidFill>
-            <a:schemeClr val="tx1"/>
-          </a:solidFill>
-          <a:latin typeface="+mn-lt"/>
-          <a:ea typeface="+mn-ea"/>
-          <a:cs typeface="+mn-cs"/>
-        </a:defRPr>
-      </a:lvl2pPr>
-      <a:lvl3pPr marL="304838" indent="-60968" algn="l" defTabSz="243870" rtl="0" eaLnBrk="1" latinLnBrk="0" hangingPunct="1">
-        <a:lnSpc>
-          <a:spcPct val="90000"/>
-        </a:lnSpc>
-        <a:spcBef>
-          <a:spcPts val="133"/>
-        </a:spcBef>
-        <a:buFont typeface="Arial" panose="020B0604020202020204" pitchFamily="34" charset="0"/>
-        <a:buChar char="•"/>
-        <a:defRPr sz="533" kern="1200">
-          <a:solidFill>
-            <a:schemeClr val="tx1"/>
-          </a:solidFill>
-          <a:latin typeface="+mn-lt"/>
-          <a:ea typeface="+mn-ea"/>
-          <a:cs typeface="+mn-cs"/>
-        </a:defRPr>
-      </a:lvl3pPr>
-      <a:lvl4pPr marL="426773" indent="-60968" algn="l" defTabSz="243870" rtl="0" eaLnBrk="1" latinLnBrk="0" hangingPunct="1">
-        <a:lnSpc>
-          <a:spcPct val="90000"/>
-        </a:lnSpc>
-        <a:spcBef>
-          <a:spcPts val="133"/>
+          <a:spcPts val="100"/>
         </a:spcBef>
         <a:buFont typeface="Arial" panose="020B0604020202020204" pitchFamily="34" charset="0"/>
         <a:buChar char="•"/>
@@ -2775,17 +2740,53 @@
           <a:ea typeface="+mn-ea"/>
           <a:cs typeface="+mn-cs"/>
         </a:defRPr>
-      </a:lvl4pPr>
-      <a:lvl5pPr marL="548709" indent="-60968" algn="l" defTabSz="243870" rtl="0" eaLnBrk="1" latinLnBrk="0" hangingPunct="1">
+      </a:lvl2pPr>
+      <a:lvl3pPr marL="228600" indent="-45720" algn="l" defTabSz="182880" rtl="0" eaLnBrk="1" latinLnBrk="0" hangingPunct="1">
         <a:lnSpc>
           <a:spcPct val="90000"/>
         </a:lnSpc>
         <a:spcBef>
-          <a:spcPts val="133"/>
+          <a:spcPts val="100"/>
         </a:spcBef>
         <a:buFont typeface="Arial" panose="020B0604020202020204" pitchFamily="34" charset="0"/>
         <a:buChar char="•"/>
-        <a:defRPr sz="480" kern="1200">
+        <a:defRPr sz="400" kern="1200">
+          <a:solidFill>
+            <a:schemeClr val="tx1"/>
+          </a:solidFill>
+          <a:latin typeface="+mn-lt"/>
+          <a:ea typeface="+mn-ea"/>
+          <a:cs typeface="+mn-cs"/>
+        </a:defRPr>
+      </a:lvl3pPr>
+      <a:lvl4pPr marL="320040" indent="-45720" algn="l" defTabSz="182880" rtl="0" eaLnBrk="1" latinLnBrk="0" hangingPunct="1">
+        <a:lnSpc>
+          <a:spcPct val="90000"/>
+        </a:lnSpc>
+        <a:spcBef>
+          <a:spcPts val="100"/>
+        </a:spcBef>
+        <a:buFont typeface="Arial" panose="020B0604020202020204" pitchFamily="34" charset="0"/>
+        <a:buChar char="•"/>
+        <a:defRPr sz="360" kern="1200">
+          <a:solidFill>
+            <a:schemeClr val="tx1"/>
+          </a:solidFill>
+          <a:latin typeface="+mn-lt"/>
+          <a:ea typeface="+mn-ea"/>
+          <a:cs typeface="+mn-cs"/>
+        </a:defRPr>
+      </a:lvl4pPr>
+      <a:lvl5pPr marL="411480" indent="-45720" algn="l" defTabSz="182880" rtl="0" eaLnBrk="1" latinLnBrk="0" hangingPunct="1">
+        <a:lnSpc>
+          <a:spcPct val="90000"/>
+        </a:lnSpc>
+        <a:spcBef>
+          <a:spcPts val="100"/>
+        </a:spcBef>
+        <a:buFont typeface="Arial" panose="020B0604020202020204" pitchFamily="34" charset="0"/>
+        <a:buChar char="•"/>
+        <a:defRPr sz="360" kern="1200">
           <a:solidFill>
             <a:schemeClr val="tx1"/>
           </a:solidFill>
@@ -2794,16 +2795,16 @@
           <a:cs typeface="+mn-cs"/>
         </a:defRPr>
       </a:lvl5pPr>
-      <a:lvl6pPr marL="670644" indent="-60968" algn="l" defTabSz="243870" rtl="0" eaLnBrk="1" latinLnBrk="0" hangingPunct="1">
+      <a:lvl6pPr marL="502920" indent="-45720" algn="l" defTabSz="182880" rtl="0" eaLnBrk="1" latinLnBrk="0" hangingPunct="1">
         <a:lnSpc>
           <a:spcPct val="90000"/>
         </a:lnSpc>
         <a:spcBef>
-          <a:spcPts val="133"/>
+          <a:spcPts val="100"/>
         </a:spcBef>
         <a:buFont typeface="Arial" panose="020B0604020202020204" pitchFamily="34" charset="0"/>
         <a:buChar char="•"/>
-        <a:defRPr sz="480" kern="1200">
+        <a:defRPr sz="360" kern="1200">
           <a:solidFill>
             <a:schemeClr val="tx1"/>
           </a:solidFill>
@@ -2812,16 +2813,16 @@
           <a:cs typeface="+mn-cs"/>
         </a:defRPr>
       </a:lvl6pPr>
-      <a:lvl7pPr marL="792579" indent="-60968" algn="l" defTabSz="243870" rtl="0" eaLnBrk="1" latinLnBrk="0" hangingPunct="1">
+      <a:lvl7pPr marL="594360" indent="-45720" algn="l" defTabSz="182880" rtl="0" eaLnBrk="1" latinLnBrk="0" hangingPunct="1">
         <a:lnSpc>
           <a:spcPct val="90000"/>
         </a:lnSpc>
         <a:spcBef>
-          <a:spcPts val="133"/>
+          <a:spcPts val="100"/>
         </a:spcBef>
         <a:buFont typeface="Arial" panose="020B0604020202020204" pitchFamily="34" charset="0"/>
         <a:buChar char="•"/>
-        <a:defRPr sz="480" kern="1200">
+        <a:defRPr sz="360" kern="1200">
           <a:solidFill>
             <a:schemeClr val="tx1"/>
           </a:solidFill>
@@ -2830,16 +2831,16 @@
           <a:cs typeface="+mn-cs"/>
         </a:defRPr>
       </a:lvl7pPr>
-      <a:lvl8pPr marL="914514" indent="-60968" algn="l" defTabSz="243870" rtl="0" eaLnBrk="1" latinLnBrk="0" hangingPunct="1">
+      <a:lvl8pPr marL="685800" indent="-45720" algn="l" defTabSz="182880" rtl="0" eaLnBrk="1" latinLnBrk="0" hangingPunct="1">
         <a:lnSpc>
           <a:spcPct val="90000"/>
         </a:lnSpc>
         <a:spcBef>
-          <a:spcPts val="133"/>
+          <a:spcPts val="100"/>
         </a:spcBef>
         <a:buFont typeface="Arial" panose="020B0604020202020204" pitchFamily="34" charset="0"/>
         <a:buChar char="•"/>
-        <a:defRPr sz="480" kern="1200">
+        <a:defRPr sz="360" kern="1200">
           <a:solidFill>
             <a:schemeClr val="tx1"/>
           </a:solidFill>
@@ -2848,16 +2849,16 @@
           <a:cs typeface="+mn-cs"/>
         </a:defRPr>
       </a:lvl8pPr>
-      <a:lvl9pPr marL="1036450" indent="-60968" algn="l" defTabSz="243870" rtl="0" eaLnBrk="1" latinLnBrk="0" hangingPunct="1">
+      <a:lvl9pPr marL="777240" indent="-45720" algn="l" defTabSz="182880" rtl="0" eaLnBrk="1" latinLnBrk="0" hangingPunct="1">
         <a:lnSpc>
           <a:spcPct val="90000"/>
         </a:lnSpc>
         <a:spcBef>
-          <a:spcPts val="133"/>
+          <a:spcPts val="100"/>
         </a:spcBef>
         <a:buFont typeface="Arial" panose="020B0604020202020204" pitchFamily="34" charset="0"/>
         <a:buChar char="•"/>
-        <a:defRPr sz="480" kern="1200">
+        <a:defRPr sz="360" kern="1200">
           <a:solidFill>
             <a:schemeClr val="tx1"/>
           </a:solidFill>
@@ -2871,8 +2872,8 @@
       <a:defPPr>
         <a:defRPr lang="en-US"/>
       </a:defPPr>
-      <a:lvl1pPr marL="0" algn="l" defTabSz="243870" rtl="0" eaLnBrk="1" latinLnBrk="0" hangingPunct="1">
-        <a:defRPr sz="480" kern="1200">
+      <a:lvl1pPr marL="0" algn="l" defTabSz="182880" rtl="0" eaLnBrk="1" latinLnBrk="0" hangingPunct="1">
+        <a:defRPr sz="360" kern="1200">
           <a:solidFill>
             <a:schemeClr val="tx1"/>
           </a:solidFill>
@@ -2881,8 +2882,8 @@
           <a:cs typeface="+mn-cs"/>
         </a:defRPr>
       </a:lvl1pPr>
-      <a:lvl2pPr marL="121935" algn="l" defTabSz="243870" rtl="0" eaLnBrk="1" latinLnBrk="0" hangingPunct="1">
-        <a:defRPr sz="480" kern="1200">
+      <a:lvl2pPr marL="91440" algn="l" defTabSz="182880" rtl="0" eaLnBrk="1" latinLnBrk="0" hangingPunct="1">
+        <a:defRPr sz="360" kern="1200">
           <a:solidFill>
             <a:schemeClr val="tx1"/>
           </a:solidFill>
@@ -2891,8 +2892,8 @@
           <a:cs typeface="+mn-cs"/>
         </a:defRPr>
       </a:lvl2pPr>
-      <a:lvl3pPr marL="243870" algn="l" defTabSz="243870" rtl="0" eaLnBrk="1" latinLnBrk="0" hangingPunct="1">
-        <a:defRPr sz="480" kern="1200">
+      <a:lvl3pPr marL="182880" algn="l" defTabSz="182880" rtl="0" eaLnBrk="1" latinLnBrk="0" hangingPunct="1">
+        <a:defRPr sz="360" kern="1200">
           <a:solidFill>
             <a:schemeClr val="tx1"/>
           </a:solidFill>
@@ -2901,8 +2902,8 @@
           <a:cs typeface="+mn-cs"/>
         </a:defRPr>
       </a:lvl3pPr>
-      <a:lvl4pPr marL="365806" algn="l" defTabSz="243870" rtl="0" eaLnBrk="1" latinLnBrk="0" hangingPunct="1">
-        <a:defRPr sz="480" kern="1200">
+      <a:lvl4pPr marL="274320" algn="l" defTabSz="182880" rtl="0" eaLnBrk="1" latinLnBrk="0" hangingPunct="1">
+        <a:defRPr sz="360" kern="1200">
           <a:solidFill>
             <a:schemeClr val="tx1"/>
           </a:solidFill>
@@ -2911,8 +2912,8 @@
           <a:cs typeface="+mn-cs"/>
         </a:defRPr>
       </a:lvl4pPr>
-      <a:lvl5pPr marL="487741" algn="l" defTabSz="243870" rtl="0" eaLnBrk="1" latinLnBrk="0" hangingPunct="1">
-        <a:defRPr sz="480" kern="1200">
+      <a:lvl5pPr marL="365760" algn="l" defTabSz="182880" rtl="0" eaLnBrk="1" latinLnBrk="0" hangingPunct="1">
+        <a:defRPr sz="360" kern="1200">
           <a:solidFill>
             <a:schemeClr val="tx1"/>
           </a:solidFill>
@@ -2921,8 +2922,8 @@
           <a:cs typeface="+mn-cs"/>
         </a:defRPr>
       </a:lvl5pPr>
-      <a:lvl6pPr marL="609676" algn="l" defTabSz="243870" rtl="0" eaLnBrk="1" latinLnBrk="0" hangingPunct="1">
-        <a:defRPr sz="480" kern="1200">
+      <a:lvl6pPr marL="457200" algn="l" defTabSz="182880" rtl="0" eaLnBrk="1" latinLnBrk="0" hangingPunct="1">
+        <a:defRPr sz="360" kern="1200">
           <a:solidFill>
             <a:schemeClr val="tx1"/>
           </a:solidFill>
@@ -2931,8 +2932,8 @@
           <a:cs typeface="+mn-cs"/>
         </a:defRPr>
       </a:lvl6pPr>
-      <a:lvl7pPr marL="731611" algn="l" defTabSz="243870" rtl="0" eaLnBrk="1" latinLnBrk="0" hangingPunct="1">
-        <a:defRPr sz="480" kern="1200">
+      <a:lvl7pPr marL="548640" algn="l" defTabSz="182880" rtl="0" eaLnBrk="1" latinLnBrk="0" hangingPunct="1">
+        <a:defRPr sz="360" kern="1200">
           <a:solidFill>
             <a:schemeClr val="tx1"/>
           </a:solidFill>
@@ -2941,8 +2942,8 @@
           <a:cs typeface="+mn-cs"/>
         </a:defRPr>
       </a:lvl7pPr>
-      <a:lvl8pPr marL="853547" algn="l" defTabSz="243870" rtl="0" eaLnBrk="1" latinLnBrk="0" hangingPunct="1">
-        <a:defRPr sz="480" kern="1200">
+      <a:lvl8pPr marL="640080" algn="l" defTabSz="182880" rtl="0" eaLnBrk="1" latinLnBrk="0" hangingPunct="1">
+        <a:defRPr sz="360" kern="1200">
           <a:solidFill>
             <a:schemeClr val="tx1"/>
           </a:solidFill>
@@ -2951,8 +2952,8 @@
           <a:cs typeface="+mn-cs"/>
         </a:defRPr>
       </a:lvl8pPr>
-      <a:lvl9pPr marL="975482" algn="l" defTabSz="243870" rtl="0" eaLnBrk="1" latinLnBrk="0" hangingPunct="1">
-        <a:defRPr sz="480" kern="1200">
+      <a:lvl9pPr marL="731520" algn="l" defTabSz="182880" rtl="0" eaLnBrk="1" latinLnBrk="0" hangingPunct="1">
+        <a:defRPr sz="360" kern="1200">
           <a:solidFill>
             <a:schemeClr val="tx1"/>
           </a:solidFill>
@@ -2969,6 +2970,16 @@
 <file path=ppt/slides/slide1.xml><?xml version="1.0" encoding="utf-8"?>
 <p:sld xmlns:a="http://schemas.openxmlformats.org/drawingml/2006/main" xmlns:r="http://schemas.openxmlformats.org/officeDocument/2006/relationships" xmlns:p="http://schemas.openxmlformats.org/presentationml/2006/main">
   <p:cSld>
+    <p:bg>
+      <p:bgPr>
+        <a:solidFill>
+          <a:schemeClr val="bg1">
+            <a:alpha val="0"/>
+          </a:schemeClr>
+        </a:solidFill>
+        <a:effectLst/>
+      </p:bgPr>
+    </p:bg>
     <p:spTree>
       <p:nvGrpSpPr>
         <p:cNvPr id="1" name=""/>
@@ -2997,22 +3008,22 @@
         </p:nvSpPr>
         <p:spPr>
           <a:xfrm rot="600000">
-            <a:off x="1386465" y="803199"/>
-            <a:ext cx="60489" cy="183438"/>
+            <a:off x="926294" y="825439"/>
+            <a:ext cx="48391" cy="146750"/>
           </a:xfrm>
           <a:custGeom>
             <a:avLst/>
             <a:gdLst>
-              <a:gd name="connsiteX0" fmla="*/ 0 w 60489"/>
-              <a:gd name="connsiteY0" fmla="*/ 91719 h 183438"/>
-              <a:gd name="connsiteX1" fmla="*/ 30245 w 60489"/>
-              <a:gd name="connsiteY1" fmla="*/ 0 h 183438"/>
-              <a:gd name="connsiteX2" fmla="*/ 60490 w 60489"/>
-              <a:gd name="connsiteY2" fmla="*/ 91719 h 183438"/>
-              <a:gd name="connsiteX3" fmla="*/ 30245 w 60489"/>
-              <a:gd name="connsiteY3" fmla="*/ 183438 h 183438"/>
-              <a:gd name="connsiteX4" fmla="*/ 0 w 60489"/>
-              <a:gd name="connsiteY4" fmla="*/ 91719 h 183438"/>
+              <a:gd name="connsiteX0" fmla="*/ 0 w 48391"/>
+              <a:gd name="connsiteY0" fmla="*/ 73375 h 146750"/>
+              <a:gd name="connsiteX1" fmla="*/ 24196 w 48391"/>
+              <a:gd name="connsiteY1" fmla="*/ 0 h 146750"/>
+              <a:gd name="connsiteX2" fmla="*/ 48392 w 48391"/>
+              <a:gd name="connsiteY2" fmla="*/ 73375 h 146750"/>
+              <a:gd name="connsiteX3" fmla="*/ 24196 w 48391"/>
+              <a:gd name="connsiteY3" fmla="*/ 146750 h 146750"/>
+              <a:gd name="connsiteX4" fmla="*/ 0 w 48391"/>
+              <a:gd name="connsiteY4" fmla="*/ 73375 h 146750"/>
             </a:gdLst>
             <a:ahLst/>
             <a:cxnLst>
@@ -3034,55 +3045,55 @@
             </a:cxnLst>
             <a:rect l="l" t="t" r="r" b="b"/>
             <a:pathLst>
-              <a:path w="60489" h="183438" fill="none" extrusionOk="0">
+              <a:path w="48391" h="146750" fill="none" extrusionOk="0">
                 <a:moveTo>
-                  <a:pt x="0" y="91719"/>
+                  <a:pt x="0" y="73375"/>
                 </a:moveTo>
                 <a:cubicBezTo>
-                  <a:pt x="-1009" y="41969"/>
-                  <a:pt x="15614" y="-2177"/>
-                  <a:pt x="30245" y="0"/>
-                </a:cubicBezTo>
-                <a:cubicBezTo>
-                  <a:pt x="51480" y="-1457"/>
-                  <a:pt x="56253" y="38241"/>
-                  <a:pt x="60490" y="91719"/>
-                </a:cubicBezTo>
-                <a:cubicBezTo>
-                  <a:pt x="60161" y="143243"/>
-                  <a:pt x="44811" y="185763"/>
-                  <a:pt x="30245" y="183438"/>
-                </a:cubicBezTo>
-                <a:cubicBezTo>
-                  <a:pt x="14281" y="182423"/>
-                  <a:pt x="-5920" y="151212"/>
-                  <a:pt x="0" y="91719"/>
+                  <a:pt x="-2112" y="34746"/>
+                  <a:pt x="12906" y="-2176"/>
+                  <a:pt x="24196" y="0"/>
+                </a:cubicBezTo>
+                <a:cubicBezTo>
+                  <a:pt x="44502" y="-2232"/>
+                  <a:pt x="44478" y="30243"/>
+                  <a:pt x="48392" y="73375"/>
+                </a:cubicBezTo>
+                <a:cubicBezTo>
+                  <a:pt x="47957" y="115048"/>
+                  <a:pt x="37294" y="147038"/>
+                  <a:pt x="24196" y="146750"/>
+                </a:cubicBezTo>
+                <a:cubicBezTo>
+                  <a:pt x="14832" y="141264"/>
+                  <a:pt x="-3709" y="119436"/>
+                  <a:pt x="0" y="73375"/>
                 </a:cubicBezTo>
                 <a:close/>
               </a:path>
-              <a:path w="60489" h="183438" stroke="0" extrusionOk="0">
+              <a:path w="48391" h="146750" stroke="0" extrusionOk="0">
                 <a:moveTo>
-                  <a:pt x="0" y="91719"/>
+                  <a:pt x="0" y="73375"/>
                 </a:moveTo>
                 <a:cubicBezTo>
-                  <a:pt x="999" y="41370"/>
-                  <a:pt x="12982" y="-690"/>
-                  <a:pt x="30245" y="0"/>
-                </a:cubicBezTo>
-                <a:cubicBezTo>
-                  <a:pt x="47599" y="-6097"/>
-                  <a:pt x="67982" y="37967"/>
-                  <a:pt x="60490" y="91719"/>
-                </a:cubicBezTo>
-                <a:cubicBezTo>
-                  <a:pt x="61049" y="143315"/>
-                  <a:pt x="46573" y="187569"/>
-                  <a:pt x="30245" y="183438"/>
-                </a:cubicBezTo>
-                <a:cubicBezTo>
-                  <a:pt x="12617" y="177042"/>
-                  <a:pt x="-4686" y="148443"/>
-                  <a:pt x="0" y="91719"/>
+                  <a:pt x="1307" y="33252"/>
+                  <a:pt x="8738" y="-2589"/>
+                  <a:pt x="24196" y="0"/>
+                </a:cubicBezTo>
+                <a:cubicBezTo>
+                  <a:pt x="37896" y="-3161"/>
+                  <a:pt x="50314" y="32056"/>
+                  <a:pt x="48392" y="73375"/>
+                </a:cubicBezTo>
+                <a:cubicBezTo>
+                  <a:pt x="49031" y="114974"/>
+                  <a:pt x="37462" y="147815"/>
+                  <a:pt x="24196" y="146750"/>
+                </a:cubicBezTo>
+                <a:cubicBezTo>
+                  <a:pt x="10565" y="144895"/>
+                  <a:pt x="-1115" y="115343"/>
+                  <a:pt x="0" y="73375"/>
                 </a:cubicBezTo>
                 <a:close/>
               </a:path>
@@ -3134,7 +3145,7 @@
           <a:lstStyle/>
           <a:p>
             <a:pPr algn="ctr"/>
-            <a:endParaRPr lang="en-US"/>
+            <a:endParaRPr lang="en-US" sz="1440"/>
           </a:p>
         </p:txBody>
       </p:sp>
@@ -3152,22 +3163,22 @@
         </p:nvSpPr>
         <p:spPr>
           <a:xfrm rot="-600000">
-            <a:off x="1587672" y="803900"/>
-            <a:ext cx="62213" cy="188665"/>
+            <a:off x="1087260" y="826002"/>
+            <a:ext cx="49770" cy="150932"/>
           </a:xfrm>
           <a:custGeom>
             <a:avLst/>
             <a:gdLst>
-              <a:gd name="connsiteX0" fmla="*/ 0 w 62213"/>
-              <a:gd name="connsiteY0" fmla="*/ 94333 h 188665"/>
-              <a:gd name="connsiteX1" fmla="*/ 31107 w 62213"/>
-              <a:gd name="connsiteY1" fmla="*/ 0 h 188665"/>
-              <a:gd name="connsiteX2" fmla="*/ 62214 w 62213"/>
-              <a:gd name="connsiteY2" fmla="*/ 94333 h 188665"/>
-              <a:gd name="connsiteX3" fmla="*/ 31107 w 62213"/>
-              <a:gd name="connsiteY3" fmla="*/ 188666 h 188665"/>
-              <a:gd name="connsiteX4" fmla="*/ 0 w 62213"/>
-              <a:gd name="connsiteY4" fmla="*/ 94333 h 188665"/>
+              <a:gd name="connsiteX0" fmla="*/ 0 w 49770"/>
+              <a:gd name="connsiteY0" fmla="*/ 75466 h 150932"/>
+              <a:gd name="connsiteX1" fmla="*/ 24885 w 49770"/>
+              <a:gd name="connsiteY1" fmla="*/ 0 h 150932"/>
+              <a:gd name="connsiteX2" fmla="*/ 49770 w 49770"/>
+              <a:gd name="connsiteY2" fmla="*/ 75466 h 150932"/>
+              <a:gd name="connsiteX3" fmla="*/ 24885 w 49770"/>
+              <a:gd name="connsiteY3" fmla="*/ 150932 h 150932"/>
+              <a:gd name="connsiteX4" fmla="*/ 0 w 49770"/>
+              <a:gd name="connsiteY4" fmla="*/ 75466 h 150932"/>
             </a:gdLst>
             <a:ahLst/>
             <a:cxnLst>
@@ -3189,55 +3200,55 @@
             </a:cxnLst>
             <a:rect l="l" t="t" r="r" b="b"/>
             <a:pathLst>
-              <a:path w="62213" h="188665" fill="none" extrusionOk="0">
+              <a:path w="49770" h="150932" fill="none" extrusionOk="0">
                 <a:moveTo>
-                  <a:pt x="0" y="94333"/>
+                  <a:pt x="0" y="75466"/>
                 </a:moveTo>
                 <a:cubicBezTo>
-                  <a:pt x="-1193" y="43304"/>
-                  <a:pt x="15254" y="-1393"/>
-                  <a:pt x="31107" y="0"/>
-                </a:cubicBezTo>
-                <a:cubicBezTo>
-                  <a:pt x="55866" y="-2437"/>
-                  <a:pt x="57596" y="39157"/>
-                  <a:pt x="62214" y="94333"/>
-                </a:cubicBezTo>
-                <a:cubicBezTo>
-                  <a:pt x="61034" y="149549"/>
-                  <a:pt x="46431" y="190684"/>
-                  <a:pt x="31107" y="188666"/>
-                </a:cubicBezTo>
-                <a:cubicBezTo>
-                  <a:pt x="18348" y="182600"/>
-                  <a:pt x="-4809" y="153611"/>
-                  <a:pt x="0" y="94333"/>
+                  <a:pt x="-1569" y="35194"/>
+                  <a:pt x="11761" y="-651"/>
+                  <a:pt x="24885" y="0"/>
+                </a:cubicBezTo>
+                <a:cubicBezTo>
+                  <a:pt x="43390" y="-1531"/>
+                  <a:pt x="48647" y="33039"/>
+                  <a:pt x="49770" y="75466"/>
+                </a:cubicBezTo>
+                <a:cubicBezTo>
+                  <a:pt x="48740" y="119867"/>
+                  <a:pt x="36998" y="152705"/>
+                  <a:pt x="24885" y="150932"/>
+                </a:cubicBezTo>
+                <a:cubicBezTo>
+                  <a:pt x="14167" y="146780"/>
+                  <a:pt x="-2267" y="120530"/>
+                  <a:pt x="0" y="75466"/>
                 </a:cubicBezTo>
                 <a:close/>
               </a:path>
-              <a:path w="62213" h="188665" stroke="0" extrusionOk="0">
+              <a:path w="49770" h="150932" stroke="0" extrusionOk="0">
                 <a:moveTo>
-                  <a:pt x="0" y="94333"/>
+                  <a:pt x="0" y="75466"/>
                 </a:moveTo>
                 <a:cubicBezTo>
-                  <a:pt x="2028" y="42857"/>
-                  <a:pt x="11976" y="-2411"/>
-                  <a:pt x="31107" y="0"/>
-                </a:cubicBezTo>
-                <a:cubicBezTo>
-                  <a:pt x="48737" y="-4215"/>
-                  <a:pt x="64878" y="41133"/>
-                  <a:pt x="62214" y="94333"/>
-                </a:cubicBezTo>
-                <a:cubicBezTo>
-                  <a:pt x="63804" y="149107"/>
-                  <a:pt x="47948" y="192398"/>
-                  <a:pt x="31107" y="188666"/>
-                </a:cubicBezTo>
-                <a:cubicBezTo>
-                  <a:pt x="12422" y="178249"/>
-                  <a:pt x="-6681" y="155086"/>
-                  <a:pt x="0" y="94333"/>
+                  <a:pt x="2999" y="34707"/>
+                  <a:pt x="9737" y="-1736"/>
+                  <a:pt x="24885" y="0"/>
+                </a:cubicBezTo>
+                <a:cubicBezTo>
+                  <a:pt x="39570" y="-8822"/>
+                  <a:pt x="51368" y="33127"/>
+                  <a:pt x="49770" y="75466"/>
+                </a:cubicBezTo>
+                <a:cubicBezTo>
+                  <a:pt x="51367" y="119833"/>
+                  <a:pt x="38332" y="154203"/>
+                  <a:pt x="24885" y="150932"/>
+                </a:cubicBezTo>
+                <a:cubicBezTo>
+                  <a:pt x="9891" y="142283"/>
+                  <a:pt x="-637" y="117970"/>
+                  <a:pt x="0" y="75466"/>
                 </a:cubicBezTo>
                 <a:close/>
               </a:path>
@@ -3289,7 +3300,7 @@
           <a:lstStyle/>
           <a:p>
             <a:pPr algn="ctr"/>
-            <a:endParaRPr lang="en-US"/>
+            <a:endParaRPr lang="en-US" sz="1440"/>
           </a:p>
         </p:txBody>
       </p:sp>
@@ -3307,22 +3318,22 @@
         </p:nvSpPr>
         <p:spPr>
           <a:xfrm>
-            <a:off x="1573996" y="470728"/>
-            <a:ext cx="793072" cy="745724"/>
+            <a:off x="1076317" y="559463"/>
+            <a:ext cx="634458" cy="596579"/>
           </a:xfrm>
           <a:custGeom>
             <a:avLst/>
             <a:gdLst>
-              <a:gd name="connsiteX0" fmla="*/ 0 w 793072"/>
-              <a:gd name="connsiteY0" fmla="*/ 372862 h 745724"/>
-              <a:gd name="connsiteX1" fmla="*/ 396536 w 793072"/>
-              <a:gd name="connsiteY1" fmla="*/ 0 h 745724"/>
-              <a:gd name="connsiteX2" fmla="*/ 793072 w 793072"/>
-              <a:gd name="connsiteY2" fmla="*/ 372862 h 745724"/>
-              <a:gd name="connsiteX3" fmla="*/ 396536 w 793072"/>
-              <a:gd name="connsiteY3" fmla="*/ 745724 h 745724"/>
-              <a:gd name="connsiteX4" fmla="*/ 0 w 793072"/>
-              <a:gd name="connsiteY4" fmla="*/ 372862 h 745724"/>
+              <a:gd name="connsiteX0" fmla="*/ 0 w 634458"/>
+              <a:gd name="connsiteY0" fmla="*/ 298290 h 596579"/>
+              <a:gd name="connsiteX1" fmla="*/ 317229 w 634458"/>
+              <a:gd name="connsiteY1" fmla="*/ 0 h 596579"/>
+              <a:gd name="connsiteX2" fmla="*/ 634458 w 634458"/>
+              <a:gd name="connsiteY2" fmla="*/ 298290 h 596579"/>
+              <a:gd name="connsiteX3" fmla="*/ 317229 w 634458"/>
+              <a:gd name="connsiteY3" fmla="*/ 596580 h 596579"/>
+              <a:gd name="connsiteX4" fmla="*/ 0 w 634458"/>
+              <a:gd name="connsiteY4" fmla="*/ 298290 h 596579"/>
             </a:gdLst>
             <a:ahLst/>
             <a:cxnLst>
@@ -3344,55 +3355,55 @@
             </a:cxnLst>
             <a:rect l="l" t="t" r="r" b="b"/>
             <a:pathLst>
-              <a:path w="793072" h="745724" fill="none" extrusionOk="0">
+              <a:path w="634458" h="596579" fill="none" extrusionOk="0">
                 <a:moveTo>
-                  <a:pt x="0" y="372862"/>
+                  <a:pt x="0" y="298290"/>
                 </a:moveTo>
                 <a:cubicBezTo>
-                  <a:pt x="-13124" y="189320"/>
-                  <a:pt x="162748" y="32954"/>
-                  <a:pt x="396536" y="0"/>
-                </a:cubicBezTo>
-                <a:cubicBezTo>
-                  <a:pt x="621648" y="7509"/>
-                  <a:pt x="806342" y="177515"/>
-                  <a:pt x="793072" y="372862"/>
-                </a:cubicBezTo>
-                <a:cubicBezTo>
-                  <a:pt x="801884" y="554454"/>
-                  <a:pt x="614859" y="752350"/>
-                  <a:pt x="396536" y="745724"/>
-                </a:cubicBezTo>
-                <a:cubicBezTo>
-                  <a:pt x="140718" y="744822"/>
-                  <a:pt x="-14992" y="569995"/>
-                  <a:pt x="0" y="372862"/>
+                  <a:pt x="-3991" y="140356"/>
+                  <a:pt x="130281" y="26180"/>
+                  <a:pt x="317229" y="0"/>
+                </a:cubicBezTo>
+                <a:cubicBezTo>
+                  <a:pt x="499752" y="8996"/>
+                  <a:pt x="647893" y="144260"/>
+                  <a:pt x="634458" y="298290"/>
+                </a:cubicBezTo>
+                <a:cubicBezTo>
+                  <a:pt x="636384" y="457712"/>
+                  <a:pt x="489223" y="627926"/>
+                  <a:pt x="317229" y="596580"/>
+                </a:cubicBezTo>
+                <a:cubicBezTo>
+                  <a:pt x="136747" y="596451"/>
+                  <a:pt x="-3594" y="460923"/>
+                  <a:pt x="0" y="298290"/>
                 </a:cubicBezTo>
                 <a:close/>
               </a:path>
-              <a:path w="793072" h="745724" stroke="0" extrusionOk="0">
+              <a:path w="634458" h="596579" stroke="0" extrusionOk="0">
                 <a:moveTo>
-                  <a:pt x="0" y="372862"/>
+                  <a:pt x="0" y="298290"/>
                 </a:moveTo>
                 <a:cubicBezTo>
-                  <a:pt x="34818" y="178072"/>
-                  <a:pt x="201434" y="30979"/>
-                  <a:pt x="396536" y="0"/>
-                </a:cubicBezTo>
-                <a:cubicBezTo>
-                  <a:pt x="589034" y="25038"/>
-                  <a:pt x="799292" y="163781"/>
-                  <a:pt x="793072" y="372862"/>
-                </a:cubicBezTo>
-                <a:cubicBezTo>
-                  <a:pt x="784908" y="564325"/>
-                  <a:pt x="590896" y="769324"/>
-                  <a:pt x="396536" y="745724"/>
-                </a:cubicBezTo>
-                <a:cubicBezTo>
-                  <a:pt x="177143" y="738897"/>
-                  <a:pt x="7678" y="583719"/>
-                  <a:pt x="0" y="372862"/>
+                  <a:pt x="5686" y="135368"/>
+                  <a:pt x="162447" y="26467"/>
+                  <a:pt x="317229" y="0"/>
+                </a:cubicBezTo>
+                <a:cubicBezTo>
+                  <a:pt x="481857" y="9989"/>
+                  <a:pt x="639963" y="130757"/>
+                  <a:pt x="634458" y="298290"/>
+                </a:cubicBezTo>
+                <a:cubicBezTo>
+                  <a:pt x="621724" y="440470"/>
+                  <a:pt x="486353" y="602400"/>
+                  <a:pt x="317229" y="596580"/>
+                </a:cubicBezTo>
+                <a:cubicBezTo>
+                  <a:pt x="140567" y="571149"/>
+                  <a:pt x="13501" y="471702"/>
+                  <a:pt x="0" y="298290"/>
                 </a:cubicBezTo>
                 <a:close/>
               </a:path>
@@ -3468,7 +3479,7 @@
           <a:lstStyle/>
           <a:p>
             <a:pPr algn="ctr"/>
-            <a:endParaRPr lang="en-US"/>
+            <a:endParaRPr lang="en-US" sz="1440"/>
           </a:p>
         </p:txBody>
       </p:sp>
@@ -3486,22 +3497,22 @@
         </p:nvSpPr>
         <p:spPr>
           <a:xfrm>
-            <a:off x="674398" y="470728"/>
-            <a:ext cx="793072" cy="745724"/>
+            <a:off x="356638" y="559463"/>
+            <a:ext cx="634458" cy="596579"/>
           </a:xfrm>
           <a:custGeom>
             <a:avLst/>
             <a:gdLst>
-              <a:gd name="connsiteX0" fmla="*/ 0 w 793072"/>
-              <a:gd name="connsiteY0" fmla="*/ 372862 h 745724"/>
-              <a:gd name="connsiteX1" fmla="*/ 396536 w 793072"/>
-              <a:gd name="connsiteY1" fmla="*/ 0 h 745724"/>
-              <a:gd name="connsiteX2" fmla="*/ 793072 w 793072"/>
-              <a:gd name="connsiteY2" fmla="*/ 372862 h 745724"/>
-              <a:gd name="connsiteX3" fmla="*/ 396536 w 793072"/>
-              <a:gd name="connsiteY3" fmla="*/ 745724 h 745724"/>
-              <a:gd name="connsiteX4" fmla="*/ 0 w 793072"/>
-              <a:gd name="connsiteY4" fmla="*/ 372862 h 745724"/>
+              <a:gd name="connsiteX0" fmla="*/ 0 w 634458"/>
+              <a:gd name="connsiteY0" fmla="*/ 298290 h 596579"/>
+              <a:gd name="connsiteX1" fmla="*/ 317229 w 634458"/>
+              <a:gd name="connsiteY1" fmla="*/ 0 h 596579"/>
+              <a:gd name="connsiteX2" fmla="*/ 634458 w 634458"/>
+              <a:gd name="connsiteY2" fmla="*/ 298290 h 596579"/>
+              <a:gd name="connsiteX3" fmla="*/ 317229 w 634458"/>
+              <a:gd name="connsiteY3" fmla="*/ 596580 h 596579"/>
+              <a:gd name="connsiteX4" fmla="*/ 0 w 634458"/>
+              <a:gd name="connsiteY4" fmla="*/ 298290 h 596579"/>
             </a:gdLst>
             <a:ahLst/>
             <a:cxnLst>
@@ -3523,55 +3534,55 @@
             </a:cxnLst>
             <a:rect l="l" t="t" r="r" b="b"/>
             <a:pathLst>
-              <a:path w="793072" h="745724" fill="none" extrusionOk="0">
+              <a:path w="634458" h="596579" fill="none" extrusionOk="0">
                 <a:moveTo>
-                  <a:pt x="0" y="372862"/>
+                  <a:pt x="0" y="298290"/>
                 </a:moveTo>
                 <a:cubicBezTo>
-                  <a:pt x="9943" y="166305"/>
-                  <a:pt x="160892" y="-10251"/>
-                  <a:pt x="396536" y="0"/>
-                </a:cubicBezTo>
-                <a:cubicBezTo>
-                  <a:pt x="629423" y="14708"/>
-                  <a:pt x="772656" y="145507"/>
-                  <a:pt x="793072" y="372862"/>
-                </a:cubicBezTo>
-                <a:cubicBezTo>
-                  <a:pt x="775778" y="614956"/>
-                  <a:pt x="631639" y="726316"/>
-                  <a:pt x="396536" y="745724"/>
-                </a:cubicBezTo>
-                <a:cubicBezTo>
-                  <a:pt x="149981" y="729288"/>
-                  <a:pt x="-1635" y="592335"/>
-                  <a:pt x="0" y="372862"/>
+                  <a:pt x="5243" y="133216"/>
+                  <a:pt x="118882" y="-14256"/>
+                  <a:pt x="317229" y="0"/>
+                </a:cubicBezTo>
+                <a:cubicBezTo>
+                  <a:pt x="505663" y="14017"/>
+                  <a:pt x="616664" y="114872"/>
+                  <a:pt x="634458" y="298290"/>
+                </a:cubicBezTo>
+                <a:cubicBezTo>
+                  <a:pt x="621336" y="490475"/>
+                  <a:pt x="507175" y="578808"/>
+                  <a:pt x="317229" y="596580"/>
+                </a:cubicBezTo>
+                <a:cubicBezTo>
+                  <a:pt x="124810" y="586310"/>
+                  <a:pt x="-1624" y="476482"/>
+                  <a:pt x="0" y="298290"/>
                 </a:cubicBezTo>
                 <a:close/>
               </a:path>
-              <a:path w="793072" h="745724" stroke="0" extrusionOk="0">
+              <a:path w="634458" h="596579" stroke="0" extrusionOk="0">
                 <a:moveTo>
-                  <a:pt x="0" y="372862"/>
+                  <a:pt x="0" y="298290"/>
                 </a:moveTo>
                 <a:cubicBezTo>
-                  <a:pt x="-1172" y="174753"/>
-                  <a:pt x="178774" y="32163"/>
-                  <a:pt x="396536" y="0"/>
-                </a:cubicBezTo>
-                <a:cubicBezTo>
-                  <a:pt x="599490" y="17898"/>
-                  <a:pt x="789438" y="149485"/>
-                  <a:pt x="793072" y="372862"/>
-                </a:cubicBezTo>
-                <a:cubicBezTo>
-                  <a:pt x="804224" y="570231"/>
-                  <a:pt x="597272" y="755959"/>
-                  <a:pt x="396536" y="745724"/>
-                </a:cubicBezTo>
-                <a:cubicBezTo>
-                  <a:pt x="169066" y="751909"/>
-                  <a:pt x="15446" y="552727"/>
-                  <a:pt x="0" y="372862"/>
+                  <a:pt x="-3476" y="156727"/>
+                  <a:pt x="143242" y="31506"/>
+                  <a:pt x="317229" y="0"/>
+                </a:cubicBezTo>
+                <a:cubicBezTo>
+                  <a:pt x="489650" y="3101"/>
+                  <a:pt x="628580" y="105323"/>
+                  <a:pt x="634458" y="298290"/>
+                </a:cubicBezTo>
+                <a:cubicBezTo>
+                  <a:pt x="651860" y="449679"/>
+                  <a:pt x="470139" y="609071"/>
+                  <a:pt x="317229" y="596580"/>
+                </a:cubicBezTo>
+                <a:cubicBezTo>
+                  <a:pt x="139521" y="598411"/>
+                  <a:pt x="5764" y="453305"/>
+                  <a:pt x="0" y="298290"/>
                 </a:cubicBezTo>
                 <a:close/>
               </a:path>
@@ -3647,7 +3658,7 @@
           <a:lstStyle/>
           <a:p>
             <a:pPr algn="ctr"/>
-            <a:endParaRPr lang="en-US"/>
+            <a:endParaRPr lang="en-US" sz="1440"/>
           </a:p>
         </p:txBody>
       </p:sp>
@@ -3665,8 +3676,8 @@
         </p:nvSpPr>
         <p:spPr>
           <a:xfrm>
-            <a:off x="161871" y="412703"/>
-            <a:ext cx="568171" cy="861774"/>
+            <a:off x="-53383" y="513042"/>
+            <a:ext cx="454537" cy="707886"/>
           </a:xfrm>
           <a:prstGeom prst="rect">
             <a:avLst/>
@@ -3680,7 +3691,7 @@
           <a:lstStyle/>
           <a:p>
             <a:r>
-              <a:rPr lang="en-US" sz="5000" dirty="0">
+              <a:rPr lang="en-US" sz="4000" dirty="0">
                 <a:latin typeface="Arial Nova Light" panose="020B0304020202020204" pitchFamily="34" charset="0"/>
               </a:rPr>
               <a:t>R</a:t>
@@ -3702,8 +3713,8 @@
         </p:nvSpPr>
         <p:spPr>
           <a:xfrm>
-            <a:off x="785686" y="590558"/>
-            <a:ext cx="570496" cy="506067"/>
+            <a:off x="445669" y="655327"/>
+            <a:ext cx="456397" cy="404854"/>
           </a:xfrm>
           <a:prstGeom prst="rect">
             <a:avLst/>
@@ -3720,7 +3731,7 @@
           <a:lstStyle/>
           <a:p>
             <a:r>
-              <a:rPr lang="en-US" dirty="0">
+              <a:rPr lang="en-US" sz="1440" dirty="0">
                 <a:latin typeface="Arial Nova Light" panose="020B0304020202020204" pitchFamily="34" charset="0"/>
               </a:rPr>
               <a:t>EE</a:t>
@@ -3742,8 +3753,8 @@
         </p:nvSpPr>
         <p:spPr>
           <a:xfrm>
-            <a:off x="1680522" y="575152"/>
-            <a:ext cx="605229" cy="536877"/>
+            <a:off x="1161540" y="643003"/>
+            <a:ext cx="484183" cy="429502"/>
           </a:xfrm>
           <a:prstGeom prst="rect">
             <a:avLst/>
@@ -3760,7 +3771,7 @@
           <a:lstStyle/>
           <a:p>
             <a:r>
-              <a:rPr lang="en-US" dirty="0">
+              <a:rPr lang="en-US" sz="1440" dirty="0">
                 <a:latin typeface="Arial Nova Light" panose="020B0304020202020204" pitchFamily="34" charset="0"/>
               </a:rPr>
               <a:t>DR</a:t>
@@ -3782,24 +3793,24 @@
         </p:nvSpPr>
         <p:spPr>
           <a:xfrm>
-            <a:off x="1307295" y="799340"/>
-            <a:ext cx="266700" cy="229360"/>
+            <a:off x="862957" y="822352"/>
+            <a:ext cx="213360" cy="183488"/>
           </a:xfrm>
           <a:custGeom>
             <a:avLst/>
             <a:gdLst>
-              <a:gd name="connsiteX0" fmla="*/ 133350 w 266700"/>
-              <a:gd name="connsiteY0" fmla="*/ 0 h 229360"/>
-              <a:gd name="connsiteX1" fmla="*/ 266700 w 266700"/>
-              <a:gd name="connsiteY1" fmla="*/ 114680 h 229360"/>
-              <a:gd name="connsiteX2" fmla="*/ 133350 w 266700"/>
-              <a:gd name="connsiteY2" fmla="*/ 114680 h 229360"/>
-              <a:gd name="connsiteX3" fmla="*/ 133350 w 266700"/>
-              <a:gd name="connsiteY3" fmla="*/ 0 h 229360"/>
-              <a:gd name="connsiteX0" fmla="*/ 133350 w 266700"/>
-              <a:gd name="connsiteY0" fmla="*/ 0 h 229360"/>
-              <a:gd name="connsiteX1" fmla="*/ 266700 w 266700"/>
-              <a:gd name="connsiteY1" fmla="*/ 114680 h 229360"/>
+              <a:gd name="connsiteX0" fmla="*/ 106680 w 213360"/>
+              <a:gd name="connsiteY0" fmla="*/ 0 h 183488"/>
+              <a:gd name="connsiteX1" fmla="*/ 213360 w 213360"/>
+              <a:gd name="connsiteY1" fmla="*/ 91744 h 183488"/>
+              <a:gd name="connsiteX2" fmla="*/ 106680 w 213360"/>
+              <a:gd name="connsiteY2" fmla="*/ 91744 h 183488"/>
+              <a:gd name="connsiteX3" fmla="*/ 106680 w 213360"/>
+              <a:gd name="connsiteY3" fmla="*/ 0 h 183488"/>
+              <a:gd name="connsiteX0" fmla="*/ 106680 w 213360"/>
+              <a:gd name="connsiteY0" fmla="*/ 0 h 183488"/>
+              <a:gd name="connsiteX1" fmla="*/ 213360 w 213360"/>
+              <a:gd name="connsiteY1" fmla="*/ 91744 h 183488"/>
             </a:gdLst>
             <a:ahLst/>
             <a:cxnLst>
@@ -3812,45 +3823,35 @@
             </a:cxnLst>
             <a:rect l="l" t="t" r="r" b="b"/>
             <a:pathLst>
-              <a:path w="266700" h="229360" stroke="0" extrusionOk="0">
+              <a:path w="213360" h="183488" stroke="0" extrusionOk="0">
                 <a:moveTo>
-                  <a:pt x="133350" y="0"/>
+                  <a:pt x="106680" y="0"/>
                 </a:moveTo>
                 <a:cubicBezTo>
-                  <a:pt x="209538" y="-31"/>
-                  <a:pt x="262316" y="53201"/>
-                  <a:pt x="266700" y="114680"/>
-                </a:cubicBezTo>
-                <a:cubicBezTo>
-                  <a:pt x="250348" y="108994"/>
-                  <a:pt x="166006" y="107022"/>
-                  <a:pt x="133350" y="114680"/>
-                </a:cubicBezTo>
-                <a:cubicBezTo>
-                  <a:pt x="132725" y="93784"/>
-                  <a:pt x="137235" y="55357"/>
-                  <a:pt x="133350" y="0"/>
+                  <a:pt x="172856" y="-89"/>
+                  <a:pt x="211878" y="41703"/>
+                  <a:pt x="213360" y="91744"/>
+                </a:cubicBezTo>
+                <a:cubicBezTo>
+                  <a:pt x="200467" y="98059"/>
+                  <a:pt x="122237" y="91286"/>
+                  <a:pt x="106680" y="91744"/>
+                </a:cubicBezTo>
+                <a:cubicBezTo>
+                  <a:pt x="99863" y="70544"/>
+                  <a:pt x="112629" y="26454"/>
+                  <a:pt x="106680" y="0"/>
                 </a:cubicBezTo>
                 <a:close/>
               </a:path>
-              <a:path w="266700" h="229360" fill="none" extrusionOk="0">
+              <a:path w="213360" h="183488" fill="none" extrusionOk="0">
                 <a:moveTo>
-                  <a:pt x="133350" y="0"/>
+                  <a:pt x="106680" y="0"/>
                 </a:moveTo>
                 <a:cubicBezTo>
-                  <a:pt x="206740" y="3173"/>
-                  <a:pt x="269823" y="44784"/>
-                  <a:pt x="266700" y="114680"/>
-                </a:cubicBezTo>
-              </a:path>
-              <a:path w="266700" h="229360" fill="none" stroke="0" extrusionOk="0">
-                <a:moveTo>
-                  <a:pt x="133350" y="0"/>
-                </a:moveTo>
-                <a:cubicBezTo>
-                  <a:pt x="201788" y="-9065"/>
-                  <a:pt x="258790" y="50975"/>
-                  <a:pt x="266700" y="114680"/>
+                  <a:pt x="163190" y="-4190"/>
+                  <a:pt x="204604" y="40667"/>
+                  <a:pt x="213360" y="91744"/>
                 </a:cubicBezTo>
               </a:path>
             </a:pathLst>
@@ -3895,7 +3896,7 @@
           <a:lstStyle/>
           <a:p>
             <a:pPr algn="ctr"/>
-            <a:endParaRPr lang="en-US"/>
+            <a:endParaRPr lang="en-US" sz="1440"/>
           </a:p>
         </p:txBody>
       </p:sp>
@@ -3913,8 +3914,8 @@
         </p:nvSpPr>
         <p:spPr>
           <a:xfrm>
-            <a:off x="208025" y="1237482"/>
-            <a:ext cx="2286725" cy="212366"/>
+            <a:off x="0" y="1175557"/>
+            <a:ext cx="1829380" cy="184666"/>
           </a:xfrm>
           <a:prstGeom prst="rect">
             <a:avLst/>
@@ -3928,61 +3929,61 @@
           <a:lstStyle/>
           <a:p>
             <a:r>
-              <a:rPr lang="en-US" sz="760" b="1" dirty="0">
+              <a:rPr lang="en-US" sz="600" b="1" dirty="0">
                 <a:latin typeface="Arial Nova Light" panose="020B0304020202020204" pitchFamily="34" charset="0"/>
               </a:rPr>
               <a:t>R</a:t>
             </a:r>
             <a:r>
-              <a:rPr lang="en-US" sz="760" dirty="0">
+              <a:rPr lang="en-US" sz="600" dirty="0">
                 <a:latin typeface="Arial Nova Light" panose="020B0304020202020204" pitchFamily="34" charset="0"/>
               </a:rPr>
               <a:t>esidential. </a:t>
             </a:r>
             <a:r>
-              <a:rPr lang="en-US" sz="760" b="1" dirty="0">
+              <a:rPr lang="en-US" sz="600" b="1" dirty="0">
                 <a:latin typeface="Arial Nova Light" panose="020B0304020202020204" pitchFamily="34" charset="0"/>
               </a:rPr>
               <a:t>E</a:t>
             </a:r>
             <a:r>
-              <a:rPr lang="en-US" sz="760" dirty="0">
+              <a:rPr lang="en-US" sz="600" dirty="0">
                 <a:latin typeface="Arial Nova Light" panose="020B0304020202020204" pitchFamily="34" charset="0"/>
               </a:rPr>
               <a:t>nergy</a:t>
             </a:r>
             <a:r>
-              <a:rPr lang="en-US" sz="760" b="1" dirty="0">
+              <a:rPr lang="en-US" sz="600" b="1" dirty="0">
                 <a:latin typeface="Arial Nova Light" panose="020B0304020202020204" pitchFamily="34" charset="0"/>
               </a:rPr>
               <a:t> E</a:t>
             </a:r>
             <a:r>
-              <a:rPr lang="en-US" sz="760" dirty="0">
+              <a:rPr lang="en-US" sz="600" dirty="0">
                 <a:latin typeface="Arial Nova Light" panose="020B0304020202020204" pitchFamily="34" charset="0"/>
               </a:rPr>
               <a:t>fficiency.</a:t>
             </a:r>
             <a:r>
-              <a:rPr lang="en-US" sz="760" b="1" dirty="0">
+              <a:rPr lang="en-US" sz="600" b="1" dirty="0">
                 <a:latin typeface="Arial Nova Light" panose="020B0304020202020204" pitchFamily="34" charset="0"/>
               </a:rPr>
               <a:t> D</a:t>
             </a:r>
             <a:r>
-              <a:rPr lang="en-US" sz="760" dirty="0">
+              <a:rPr lang="en-US" sz="600" dirty="0">
                 <a:latin typeface="Arial Nova Light" panose="020B0304020202020204" pitchFamily="34" charset="0"/>
               </a:rPr>
               <a:t>emand</a:t>
             </a:r>
             <a:r>
-              <a:rPr lang="en-US" sz="760" b="1" dirty="0">
+              <a:rPr lang="en-US" sz="600" b="1" dirty="0">
                 <a:latin typeface="Arial Nova Light" panose="020B0304020202020204" pitchFamily="34" charset="0"/>
               </a:rPr>
               <a:t> R</a:t>
             </a:r>
             <a:r>
-              <a:rPr lang="en-US" sz="760" dirty="0">
+              <a:rPr lang="en-US" sz="600" dirty="0">
                 <a:latin typeface="Arial Nova Light" panose="020B0304020202020204" pitchFamily="34" charset="0"/>
               </a:rPr>
               <a:t>esponse.</a:t>
@@ -4004,22 +4005,22 @@
         </p:nvSpPr>
         <p:spPr>
           <a:xfrm>
-            <a:off x="640759" y="830374"/>
-            <a:ext cx="79117" cy="45719"/>
+            <a:off x="329729" y="847181"/>
+            <a:ext cx="63294" cy="36575"/>
           </a:xfrm>
           <a:custGeom>
             <a:avLst/>
             <a:gdLst>
-              <a:gd name="connsiteX0" fmla="*/ 0 w 79117"/>
-              <a:gd name="connsiteY0" fmla="*/ 0 h 45719"/>
-              <a:gd name="connsiteX1" fmla="*/ 79117 w 79117"/>
-              <a:gd name="connsiteY1" fmla="*/ 0 h 45719"/>
-              <a:gd name="connsiteX2" fmla="*/ 79117 w 79117"/>
-              <a:gd name="connsiteY2" fmla="*/ 45719 h 45719"/>
-              <a:gd name="connsiteX3" fmla="*/ 0 w 79117"/>
-              <a:gd name="connsiteY3" fmla="*/ 45719 h 45719"/>
-              <a:gd name="connsiteX4" fmla="*/ 0 w 79117"/>
-              <a:gd name="connsiteY4" fmla="*/ 0 h 45719"/>
+              <a:gd name="connsiteX0" fmla="*/ 0 w 63294"/>
+              <a:gd name="connsiteY0" fmla="*/ 0 h 36575"/>
+              <a:gd name="connsiteX1" fmla="*/ 63294 w 63294"/>
+              <a:gd name="connsiteY1" fmla="*/ 0 h 36575"/>
+              <a:gd name="connsiteX2" fmla="*/ 63294 w 63294"/>
+              <a:gd name="connsiteY2" fmla="*/ 36575 h 36575"/>
+              <a:gd name="connsiteX3" fmla="*/ 0 w 63294"/>
+              <a:gd name="connsiteY3" fmla="*/ 36575 h 36575"/>
+              <a:gd name="connsiteX4" fmla="*/ 0 w 63294"/>
+              <a:gd name="connsiteY4" fmla="*/ 0 h 36575"/>
             </a:gdLst>
             <a:ahLst/>
             <a:cxnLst>
@@ -4041,54 +4042,54 @@
             </a:cxnLst>
             <a:rect l="l" t="t" r="r" b="b"/>
             <a:pathLst>
-              <a:path w="79117" h="45719" fill="none" extrusionOk="0">
+              <a:path w="63294" h="36575" fill="none" extrusionOk="0">
                 <a:moveTo>
                   <a:pt x="0" y="0"/>
                 </a:moveTo>
                 <a:cubicBezTo>
-                  <a:pt x="23045" y="1611"/>
-                  <a:pt x="53366" y="822"/>
-                  <a:pt x="79117" y="0"/>
-                </a:cubicBezTo>
-                <a:cubicBezTo>
-                  <a:pt x="77081" y="17070"/>
-                  <a:pt x="80490" y="25705"/>
-                  <a:pt x="79117" y="45719"/>
-                </a:cubicBezTo>
-                <a:cubicBezTo>
-                  <a:pt x="54419" y="47153"/>
-                  <a:pt x="36086" y="48873"/>
-                  <a:pt x="0" y="45719"/>
-                </a:cubicBezTo>
-                <a:cubicBezTo>
-                  <a:pt x="806" y="34592"/>
-                  <a:pt x="876" y="9605"/>
+                  <a:pt x="16393" y="-949"/>
+                  <a:pt x="47418" y="-3140"/>
+                  <a:pt x="63294" y="0"/>
+                </a:cubicBezTo>
+                <a:cubicBezTo>
+                  <a:pt x="63689" y="15737"/>
+                  <a:pt x="61759" y="28686"/>
+                  <a:pt x="63294" y="36575"/>
+                </a:cubicBezTo>
+                <a:cubicBezTo>
+                  <a:pt x="33901" y="35514"/>
+                  <a:pt x="20977" y="38817"/>
+                  <a:pt x="0" y="36575"/>
+                </a:cubicBezTo>
+                <a:cubicBezTo>
+                  <a:pt x="584" y="26105"/>
+                  <a:pt x="-224" y="7763"/>
                   <a:pt x="0" y="0"/>
                 </a:cubicBezTo>
                 <a:close/>
               </a:path>
-              <a:path w="79117" h="45719" stroke="0" extrusionOk="0">
+              <a:path w="63294" h="36575" stroke="0" extrusionOk="0">
                 <a:moveTo>
                   <a:pt x="0" y="0"/>
                 </a:moveTo>
                 <a:cubicBezTo>
-                  <a:pt x="33487" y="3878"/>
-                  <a:pt x="48428" y="330"/>
-                  <a:pt x="79117" y="0"/>
-                </a:cubicBezTo>
-                <a:cubicBezTo>
-                  <a:pt x="81255" y="16182"/>
-                  <a:pt x="81276" y="33719"/>
-                  <a:pt x="79117" y="45719"/>
-                </a:cubicBezTo>
-                <a:cubicBezTo>
-                  <a:pt x="62540" y="44370"/>
-                  <a:pt x="30026" y="46550"/>
-                  <a:pt x="0" y="45719"/>
-                </a:cubicBezTo>
-                <a:cubicBezTo>
-                  <a:pt x="-1966" y="25792"/>
-                  <a:pt x="-747" y="20069"/>
+                  <a:pt x="28177" y="878"/>
+                  <a:pt x="41115" y="892"/>
+                  <a:pt x="63294" y="0"/>
+                </a:cubicBezTo>
+                <a:cubicBezTo>
+                  <a:pt x="63368" y="11321"/>
+                  <a:pt x="61617" y="24127"/>
+                  <a:pt x="63294" y="36575"/>
+                </a:cubicBezTo>
+                <a:cubicBezTo>
+                  <a:pt x="44569" y="35970"/>
+                  <a:pt x="14705" y="35334"/>
+                  <a:pt x="0" y="36575"/>
+                </a:cubicBezTo>
+                <a:cubicBezTo>
+                  <a:pt x="-1271" y="24377"/>
+                  <a:pt x="-473" y="13190"/>
                   <a:pt x="0" y="0"/>
                 </a:cubicBezTo>
                 <a:close/>
@@ -4134,7 +4135,7 @@
           <a:lstStyle/>
           <a:p>
             <a:pPr algn="ctr"/>
-            <a:endParaRPr lang="en-US"/>
+            <a:endParaRPr lang="en-US" sz="1440"/>
           </a:p>
         </p:txBody>
       </p:sp>
@@ -4152,22 +4153,22 @@
         </p:nvSpPr>
         <p:spPr>
           <a:xfrm>
-            <a:off x="2327509" y="820730"/>
-            <a:ext cx="79117" cy="45719"/>
+            <a:off x="1679128" y="839465"/>
+            <a:ext cx="63294" cy="36575"/>
           </a:xfrm>
           <a:custGeom>
             <a:avLst/>
             <a:gdLst>
-              <a:gd name="connsiteX0" fmla="*/ 0 w 79117"/>
-              <a:gd name="connsiteY0" fmla="*/ 0 h 45719"/>
-              <a:gd name="connsiteX1" fmla="*/ 79117 w 79117"/>
-              <a:gd name="connsiteY1" fmla="*/ 0 h 45719"/>
-              <a:gd name="connsiteX2" fmla="*/ 79117 w 79117"/>
-              <a:gd name="connsiteY2" fmla="*/ 45719 h 45719"/>
-              <a:gd name="connsiteX3" fmla="*/ 0 w 79117"/>
-              <a:gd name="connsiteY3" fmla="*/ 45719 h 45719"/>
-              <a:gd name="connsiteX4" fmla="*/ 0 w 79117"/>
-              <a:gd name="connsiteY4" fmla="*/ 0 h 45719"/>
+              <a:gd name="connsiteX0" fmla="*/ 0 w 63294"/>
+              <a:gd name="connsiteY0" fmla="*/ 0 h 36575"/>
+              <a:gd name="connsiteX1" fmla="*/ 63294 w 63294"/>
+              <a:gd name="connsiteY1" fmla="*/ 0 h 36575"/>
+              <a:gd name="connsiteX2" fmla="*/ 63294 w 63294"/>
+              <a:gd name="connsiteY2" fmla="*/ 36575 h 36575"/>
+              <a:gd name="connsiteX3" fmla="*/ 0 w 63294"/>
+              <a:gd name="connsiteY3" fmla="*/ 36575 h 36575"/>
+              <a:gd name="connsiteX4" fmla="*/ 0 w 63294"/>
+              <a:gd name="connsiteY4" fmla="*/ 0 h 36575"/>
             </a:gdLst>
             <a:ahLst/>
             <a:cxnLst>
@@ -4189,54 +4190,54 @@
             </a:cxnLst>
             <a:rect l="l" t="t" r="r" b="b"/>
             <a:pathLst>
-              <a:path w="79117" h="45719" fill="none" extrusionOk="0">
+              <a:path w="63294" h="36575" fill="none" extrusionOk="0">
                 <a:moveTo>
                   <a:pt x="0" y="0"/>
                 </a:moveTo>
                 <a:cubicBezTo>
-                  <a:pt x="23045" y="1611"/>
-                  <a:pt x="53366" y="822"/>
-                  <a:pt x="79117" y="0"/>
-                </a:cubicBezTo>
-                <a:cubicBezTo>
-                  <a:pt x="77081" y="17070"/>
-                  <a:pt x="80490" y="25705"/>
-                  <a:pt x="79117" y="45719"/>
-                </a:cubicBezTo>
-                <a:cubicBezTo>
-                  <a:pt x="54419" y="47153"/>
-                  <a:pt x="36086" y="48873"/>
-                  <a:pt x="0" y="45719"/>
-                </a:cubicBezTo>
-                <a:cubicBezTo>
-                  <a:pt x="806" y="34592"/>
-                  <a:pt x="876" y="9605"/>
+                  <a:pt x="16393" y="-949"/>
+                  <a:pt x="47418" y="-3140"/>
+                  <a:pt x="63294" y="0"/>
+                </a:cubicBezTo>
+                <a:cubicBezTo>
+                  <a:pt x="63689" y="15737"/>
+                  <a:pt x="61759" y="28686"/>
+                  <a:pt x="63294" y="36575"/>
+                </a:cubicBezTo>
+                <a:cubicBezTo>
+                  <a:pt x="33901" y="35514"/>
+                  <a:pt x="20977" y="38817"/>
+                  <a:pt x="0" y="36575"/>
+                </a:cubicBezTo>
+                <a:cubicBezTo>
+                  <a:pt x="584" y="26105"/>
+                  <a:pt x="-224" y="7763"/>
                   <a:pt x="0" y="0"/>
                 </a:cubicBezTo>
                 <a:close/>
               </a:path>
-              <a:path w="79117" h="45719" stroke="0" extrusionOk="0">
+              <a:path w="63294" h="36575" stroke="0" extrusionOk="0">
                 <a:moveTo>
                   <a:pt x="0" y="0"/>
                 </a:moveTo>
                 <a:cubicBezTo>
-                  <a:pt x="33487" y="3878"/>
-                  <a:pt x="48428" y="330"/>
-                  <a:pt x="79117" y="0"/>
-                </a:cubicBezTo>
-                <a:cubicBezTo>
-                  <a:pt x="81255" y="16182"/>
-                  <a:pt x="81276" y="33719"/>
-                  <a:pt x="79117" y="45719"/>
-                </a:cubicBezTo>
-                <a:cubicBezTo>
-                  <a:pt x="62540" y="44370"/>
-                  <a:pt x="30026" y="46550"/>
-                  <a:pt x="0" y="45719"/>
-                </a:cubicBezTo>
-                <a:cubicBezTo>
-                  <a:pt x="-1966" y="25792"/>
-                  <a:pt x="-747" y="20069"/>
+                  <a:pt x="28177" y="878"/>
+                  <a:pt x="41115" y="892"/>
+                  <a:pt x="63294" y="0"/>
+                </a:cubicBezTo>
+                <a:cubicBezTo>
+                  <a:pt x="63368" y="11321"/>
+                  <a:pt x="61617" y="24127"/>
+                  <a:pt x="63294" y="36575"/>
+                </a:cubicBezTo>
+                <a:cubicBezTo>
+                  <a:pt x="44569" y="35970"/>
+                  <a:pt x="14705" y="35334"/>
+                  <a:pt x="0" y="36575"/>
+                </a:cubicBezTo>
+                <a:cubicBezTo>
+                  <a:pt x="-1271" y="24377"/>
+                  <a:pt x="-473" y="13190"/>
                   <a:pt x="0" y="0"/>
                 </a:cubicBezTo>
                 <a:close/>
@@ -4282,7 +4283,7 @@
           <a:lstStyle/>
           <a:p>
             <a:pPr algn="ctr"/>
-            <a:endParaRPr lang="en-US"/>
+            <a:endParaRPr lang="en-US" sz="1440"/>
           </a:p>
         </p:txBody>
       </p:sp>
@@ -4330,22 +4331,22 @@
         </p:nvSpPr>
         <p:spPr>
           <a:xfrm rot="600000">
-            <a:off x="1386465" y="803199"/>
-            <a:ext cx="60489" cy="183438"/>
+            <a:off x="926294" y="825439"/>
+            <a:ext cx="48391" cy="146750"/>
           </a:xfrm>
           <a:custGeom>
             <a:avLst/>
             <a:gdLst>
-              <a:gd name="connsiteX0" fmla="*/ 0 w 60489"/>
-              <a:gd name="connsiteY0" fmla="*/ 91719 h 183438"/>
-              <a:gd name="connsiteX1" fmla="*/ 30245 w 60489"/>
-              <a:gd name="connsiteY1" fmla="*/ 0 h 183438"/>
-              <a:gd name="connsiteX2" fmla="*/ 60490 w 60489"/>
-              <a:gd name="connsiteY2" fmla="*/ 91719 h 183438"/>
-              <a:gd name="connsiteX3" fmla="*/ 30245 w 60489"/>
-              <a:gd name="connsiteY3" fmla="*/ 183438 h 183438"/>
-              <a:gd name="connsiteX4" fmla="*/ 0 w 60489"/>
-              <a:gd name="connsiteY4" fmla="*/ 91719 h 183438"/>
+              <a:gd name="connsiteX0" fmla="*/ 0 w 48391"/>
+              <a:gd name="connsiteY0" fmla="*/ 73375 h 146750"/>
+              <a:gd name="connsiteX1" fmla="*/ 24196 w 48391"/>
+              <a:gd name="connsiteY1" fmla="*/ 0 h 146750"/>
+              <a:gd name="connsiteX2" fmla="*/ 48392 w 48391"/>
+              <a:gd name="connsiteY2" fmla="*/ 73375 h 146750"/>
+              <a:gd name="connsiteX3" fmla="*/ 24196 w 48391"/>
+              <a:gd name="connsiteY3" fmla="*/ 146750 h 146750"/>
+              <a:gd name="connsiteX4" fmla="*/ 0 w 48391"/>
+              <a:gd name="connsiteY4" fmla="*/ 73375 h 146750"/>
             </a:gdLst>
             <a:ahLst/>
             <a:cxnLst>
@@ -4367,55 +4368,55 @@
             </a:cxnLst>
             <a:rect l="l" t="t" r="r" b="b"/>
             <a:pathLst>
-              <a:path w="60489" h="183438" fill="none" extrusionOk="0">
+              <a:path w="48391" h="146750" fill="none" extrusionOk="0">
                 <a:moveTo>
-                  <a:pt x="0" y="91719"/>
+                  <a:pt x="0" y="73375"/>
                 </a:moveTo>
                 <a:cubicBezTo>
-                  <a:pt x="-1009" y="41969"/>
-                  <a:pt x="15614" y="-2177"/>
-                  <a:pt x="30245" y="0"/>
-                </a:cubicBezTo>
-                <a:cubicBezTo>
-                  <a:pt x="51480" y="-1457"/>
-                  <a:pt x="56253" y="38241"/>
-                  <a:pt x="60490" y="91719"/>
-                </a:cubicBezTo>
-                <a:cubicBezTo>
-                  <a:pt x="60161" y="143243"/>
-                  <a:pt x="44811" y="185763"/>
-                  <a:pt x="30245" y="183438"/>
-                </a:cubicBezTo>
-                <a:cubicBezTo>
-                  <a:pt x="14281" y="182423"/>
-                  <a:pt x="-5920" y="151212"/>
-                  <a:pt x="0" y="91719"/>
+                  <a:pt x="-2112" y="34746"/>
+                  <a:pt x="12906" y="-2176"/>
+                  <a:pt x="24196" y="0"/>
+                </a:cubicBezTo>
+                <a:cubicBezTo>
+                  <a:pt x="44502" y="-2232"/>
+                  <a:pt x="44478" y="30243"/>
+                  <a:pt x="48392" y="73375"/>
+                </a:cubicBezTo>
+                <a:cubicBezTo>
+                  <a:pt x="47957" y="115048"/>
+                  <a:pt x="37294" y="147038"/>
+                  <a:pt x="24196" y="146750"/>
+                </a:cubicBezTo>
+                <a:cubicBezTo>
+                  <a:pt x="14832" y="141264"/>
+                  <a:pt x="-3709" y="119436"/>
+                  <a:pt x="0" y="73375"/>
                 </a:cubicBezTo>
                 <a:close/>
               </a:path>
-              <a:path w="60489" h="183438" stroke="0" extrusionOk="0">
+              <a:path w="48391" h="146750" stroke="0" extrusionOk="0">
                 <a:moveTo>
-                  <a:pt x="0" y="91719"/>
+                  <a:pt x="0" y="73375"/>
                 </a:moveTo>
                 <a:cubicBezTo>
-                  <a:pt x="999" y="41370"/>
-                  <a:pt x="12982" y="-690"/>
-                  <a:pt x="30245" y="0"/>
-                </a:cubicBezTo>
-                <a:cubicBezTo>
-                  <a:pt x="47599" y="-6097"/>
-                  <a:pt x="67982" y="37967"/>
-                  <a:pt x="60490" y="91719"/>
-                </a:cubicBezTo>
-                <a:cubicBezTo>
-                  <a:pt x="61049" y="143315"/>
-                  <a:pt x="46573" y="187569"/>
-                  <a:pt x="30245" y="183438"/>
-                </a:cubicBezTo>
-                <a:cubicBezTo>
-                  <a:pt x="12617" y="177042"/>
-                  <a:pt x="-4686" y="148443"/>
-                  <a:pt x="0" y="91719"/>
+                  <a:pt x="1307" y="33252"/>
+                  <a:pt x="8738" y="-2589"/>
+                  <a:pt x="24196" y="0"/>
+                </a:cubicBezTo>
+                <a:cubicBezTo>
+                  <a:pt x="37896" y="-3161"/>
+                  <a:pt x="50314" y="32056"/>
+                  <a:pt x="48392" y="73375"/>
+                </a:cubicBezTo>
+                <a:cubicBezTo>
+                  <a:pt x="49031" y="114974"/>
+                  <a:pt x="37462" y="147815"/>
+                  <a:pt x="24196" y="146750"/>
+                </a:cubicBezTo>
+                <a:cubicBezTo>
+                  <a:pt x="10565" y="144895"/>
+                  <a:pt x="-1115" y="115343"/>
+                  <a:pt x="0" y="73375"/>
                 </a:cubicBezTo>
                 <a:close/>
               </a:path>
@@ -4467,7 +4468,7 @@
           <a:lstStyle/>
           <a:p>
             <a:pPr algn="ctr"/>
-            <a:endParaRPr lang="en-US"/>
+            <a:endParaRPr lang="en-US" sz="1440"/>
           </a:p>
         </p:txBody>
       </p:sp>
@@ -4485,22 +4486,22 @@
         </p:nvSpPr>
         <p:spPr>
           <a:xfrm rot="-600000">
-            <a:off x="1587672" y="803900"/>
-            <a:ext cx="62213" cy="188665"/>
+            <a:off x="1087260" y="826002"/>
+            <a:ext cx="49770" cy="150932"/>
           </a:xfrm>
           <a:custGeom>
             <a:avLst/>
             <a:gdLst>
-              <a:gd name="connsiteX0" fmla="*/ 0 w 62213"/>
-              <a:gd name="connsiteY0" fmla="*/ 94333 h 188665"/>
-              <a:gd name="connsiteX1" fmla="*/ 31107 w 62213"/>
-              <a:gd name="connsiteY1" fmla="*/ 0 h 188665"/>
-              <a:gd name="connsiteX2" fmla="*/ 62214 w 62213"/>
-              <a:gd name="connsiteY2" fmla="*/ 94333 h 188665"/>
-              <a:gd name="connsiteX3" fmla="*/ 31107 w 62213"/>
-              <a:gd name="connsiteY3" fmla="*/ 188666 h 188665"/>
-              <a:gd name="connsiteX4" fmla="*/ 0 w 62213"/>
-              <a:gd name="connsiteY4" fmla="*/ 94333 h 188665"/>
+              <a:gd name="connsiteX0" fmla="*/ 0 w 49770"/>
+              <a:gd name="connsiteY0" fmla="*/ 75466 h 150932"/>
+              <a:gd name="connsiteX1" fmla="*/ 24885 w 49770"/>
+              <a:gd name="connsiteY1" fmla="*/ 0 h 150932"/>
+              <a:gd name="connsiteX2" fmla="*/ 49770 w 49770"/>
+              <a:gd name="connsiteY2" fmla="*/ 75466 h 150932"/>
+              <a:gd name="connsiteX3" fmla="*/ 24885 w 49770"/>
+              <a:gd name="connsiteY3" fmla="*/ 150932 h 150932"/>
+              <a:gd name="connsiteX4" fmla="*/ 0 w 49770"/>
+              <a:gd name="connsiteY4" fmla="*/ 75466 h 150932"/>
             </a:gdLst>
             <a:ahLst/>
             <a:cxnLst>
@@ -4522,55 +4523,55 @@
             </a:cxnLst>
             <a:rect l="l" t="t" r="r" b="b"/>
             <a:pathLst>
-              <a:path w="62213" h="188665" fill="none" extrusionOk="0">
+              <a:path w="49770" h="150932" fill="none" extrusionOk="0">
                 <a:moveTo>
-                  <a:pt x="0" y="94333"/>
+                  <a:pt x="0" y="75466"/>
                 </a:moveTo>
                 <a:cubicBezTo>
-                  <a:pt x="-1193" y="43304"/>
-                  <a:pt x="15254" y="-1393"/>
-                  <a:pt x="31107" y="0"/>
-                </a:cubicBezTo>
-                <a:cubicBezTo>
-                  <a:pt x="55866" y="-2437"/>
-                  <a:pt x="57596" y="39157"/>
-                  <a:pt x="62214" y="94333"/>
-                </a:cubicBezTo>
-                <a:cubicBezTo>
-                  <a:pt x="61034" y="149549"/>
-                  <a:pt x="46431" y="190684"/>
-                  <a:pt x="31107" y="188666"/>
-                </a:cubicBezTo>
-                <a:cubicBezTo>
-                  <a:pt x="18348" y="182600"/>
-                  <a:pt x="-4809" y="153611"/>
-                  <a:pt x="0" y="94333"/>
+                  <a:pt x="-1569" y="35194"/>
+                  <a:pt x="11761" y="-651"/>
+                  <a:pt x="24885" y="0"/>
+                </a:cubicBezTo>
+                <a:cubicBezTo>
+                  <a:pt x="43390" y="-1531"/>
+                  <a:pt x="48647" y="33039"/>
+                  <a:pt x="49770" y="75466"/>
+                </a:cubicBezTo>
+                <a:cubicBezTo>
+                  <a:pt x="48740" y="119867"/>
+                  <a:pt x="36998" y="152705"/>
+                  <a:pt x="24885" y="150932"/>
+                </a:cubicBezTo>
+                <a:cubicBezTo>
+                  <a:pt x="14167" y="146780"/>
+                  <a:pt x="-2267" y="120530"/>
+                  <a:pt x="0" y="75466"/>
                 </a:cubicBezTo>
                 <a:close/>
               </a:path>
-              <a:path w="62213" h="188665" stroke="0" extrusionOk="0">
+              <a:path w="49770" h="150932" stroke="0" extrusionOk="0">
                 <a:moveTo>
-                  <a:pt x="0" y="94333"/>
+                  <a:pt x="0" y="75466"/>
                 </a:moveTo>
                 <a:cubicBezTo>
-                  <a:pt x="2028" y="42857"/>
-                  <a:pt x="11976" y="-2411"/>
-                  <a:pt x="31107" y="0"/>
-                </a:cubicBezTo>
-                <a:cubicBezTo>
-                  <a:pt x="48737" y="-4215"/>
-                  <a:pt x="64878" y="41133"/>
-                  <a:pt x="62214" y="94333"/>
-                </a:cubicBezTo>
-                <a:cubicBezTo>
-                  <a:pt x="63804" y="149107"/>
-                  <a:pt x="47948" y="192398"/>
-                  <a:pt x="31107" y="188666"/>
-                </a:cubicBezTo>
-                <a:cubicBezTo>
-                  <a:pt x="12422" y="178249"/>
-                  <a:pt x="-6681" y="155086"/>
-                  <a:pt x="0" y="94333"/>
+                  <a:pt x="2999" y="34707"/>
+                  <a:pt x="9737" y="-1736"/>
+                  <a:pt x="24885" y="0"/>
+                </a:cubicBezTo>
+                <a:cubicBezTo>
+                  <a:pt x="39570" y="-8822"/>
+                  <a:pt x="51368" y="33127"/>
+                  <a:pt x="49770" y="75466"/>
+                </a:cubicBezTo>
+                <a:cubicBezTo>
+                  <a:pt x="51367" y="119833"/>
+                  <a:pt x="38332" y="154203"/>
+                  <a:pt x="24885" y="150932"/>
+                </a:cubicBezTo>
+                <a:cubicBezTo>
+                  <a:pt x="9891" y="142283"/>
+                  <a:pt x="-637" y="117970"/>
+                  <a:pt x="0" y="75466"/>
                 </a:cubicBezTo>
                 <a:close/>
               </a:path>
@@ -4622,7 +4623,7 @@
           <a:lstStyle/>
           <a:p>
             <a:pPr algn="ctr"/>
-            <a:endParaRPr lang="en-US"/>
+            <a:endParaRPr lang="en-US" sz="1440"/>
           </a:p>
         </p:txBody>
       </p:sp>
@@ -4640,22 +4641,22 @@
         </p:nvSpPr>
         <p:spPr>
           <a:xfrm>
-            <a:off x="1573996" y="470728"/>
-            <a:ext cx="793072" cy="745724"/>
+            <a:off x="1076317" y="559463"/>
+            <a:ext cx="634458" cy="596579"/>
           </a:xfrm>
           <a:custGeom>
             <a:avLst/>
             <a:gdLst>
-              <a:gd name="connsiteX0" fmla="*/ 0 w 793072"/>
-              <a:gd name="connsiteY0" fmla="*/ 372862 h 745724"/>
-              <a:gd name="connsiteX1" fmla="*/ 396536 w 793072"/>
-              <a:gd name="connsiteY1" fmla="*/ 0 h 745724"/>
-              <a:gd name="connsiteX2" fmla="*/ 793072 w 793072"/>
-              <a:gd name="connsiteY2" fmla="*/ 372862 h 745724"/>
-              <a:gd name="connsiteX3" fmla="*/ 396536 w 793072"/>
-              <a:gd name="connsiteY3" fmla="*/ 745724 h 745724"/>
-              <a:gd name="connsiteX4" fmla="*/ 0 w 793072"/>
-              <a:gd name="connsiteY4" fmla="*/ 372862 h 745724"/>
+              <a:gd name="connsiteX0" fmla="*/ 0 w 634458"/>
+              <a:gd name="connsiteY0" fmla="*/ 298290 h 596579"/>
+              <a:gd name="connsiteX1" fmla="*/ 317229 w 634458"/>
+              <a:gd name="connsiteY1" fmla="*/ 0 h 596579"/>
+              <a:gd name="connsiteX2" fmla="*/ 634458 w 634458"/>
+              <a:gd name="connsiteY2" fmla="*/ 298290 h 596579"/>
+              <a:gd name="connsiteX3" fmla="*/ 317229 w 634458"/>
+              <a:gd name="connsiteY3" fmla="*/ 596580 h 596579"/>
+              <a:gd name="connsiteX4" fmla="*/ 0 w 634458"/>
+              <a:gd name="connsiteY4" fmla="*/ 298290 h 596579"/>
             </a:gdLst>
             <a:ahLst/>
             <a:cxnLst>
@@ -4677,55 +4678,55 @@
             </a:cxnLst>
             <a:rect l="l" t="t" r="r" b="b"/>
             <a:pathLst>
-              <a:path w="793072" h="745724" fill="none" extrusionOk="0">
+              <a:path w="634458" h="596579" fill="none" extrusionOk="0">
                 <a:moveTo>
-                  <a:pt x="0" y="372862"/>
+                  <a:pt x="0" y="298290"/>
                 </a:moveTo>
                 <a:cubicBezTo>
-                  <a:pt x="-13124" y="189320"/>
-                  <a:pt x="162748" y="32954"/>
-                  <a:pt x="396536" y="0"/>
-                </a:cubicBezTo>
-                <a:cubicBezTo>
-                  <a:pt x="621648" y="7509"/>
-                  <a:pt x="806342" y="177515"/>
-                  <a:pt x="793072" y="372862"/>
-                </a:cubicBezTo>
-                <a:cubicBezTo>
-                  <a:pt x="801884" y="554454"/>
-                  <a:pt x="614859" y="752350"/>
-                  <a:pt x="396536" y="745724"/>
-                </a:cubicBezTo>
-                <a:cubicBezTo>
-                  <a:pt x="140718" y="744822"/>
-                  <a:pt x="-14992" y="569995"/>
-                  <a:pt x="0" y="372862"/>
+                  <a:pt x="-3991" y="140356"/>
+                  <a:pt x="130281" y="26180"/>
+                  <a:pt x="317229" y="0"/>
+                </a:cubicBezTo>
+                <a:cubicBezTo>
+                  <a:pt x="499752" y="8996"/>
+                  <a:pt x="647893" y="144260"/>
+                  <a:pt x="634458" y="298290"/>
+                </a:cubicBezTo>
+                <a:cubicBezTo>
+                  <a:pt x="636384" y="457712"/>
+                  <a:pt x="489223" y="627926"/>
+                  <a:pt x="317229" y="596580"/>
+                </a:cubicBezTo>
+                <a:cubicBezTo>
+                  <a:pt x="136747" y="596451"/>
+                  <a:pt x="-3594" y="460923"/>
+                  <a:pt x="0" y="298290"/>
                 </a:cubicBezTo>
                 <a:close/>
               </a:path>
-              <a:path w="793072" h="745724" stroke="0" extrusionOk="0">
+              <a:path w="634458" h="596579" stroke="0" extrusionOk="0">
                 <a:moveTo>
-                  <a:pt x="0" y="372862"/>
+                  <a:pt x="0" y="298290"/>
                 </a:moveTo>
                 <a:cubicBezTo>
-                  <a:pt x="34818" y="178072"/>
-                  <a:pt x="201434" y="30979"/>
-                  <a:pt x="396536" y="0"/>
-                </a:cubicBezTo>
-                <a:cubicBezTo>
-                  <a:pt x="589034" y="25038"/>
-                  <a:pt x="799292" y="163781"/>
-                  <a:pt x="793072" y="372862"/>
-                </a:cubicBezTo>
-                <a:cubicBezTo>
-                  <a:pt x="784908" y="564325"/>
-                  <a:pt x="590896" y="769324"/>
-                  <a:pt x="396536" y="745724"/>
-                </a:cubicBezTo>
-                <a:cubicBezTo>
-                  <a:pt x="177143" y="738897"/>
-                  <a:pt x="7678" y="583719"/>
-                  <a:pt x="0" y="372862"/>
+                  <a:pt x="5686" y="135368"/>
+                  <a:pt x="162447" y="26467"/>
+                  <a:pt x="317229" y="0"/>
+                </a:cubicBezTo>
+                <a:cubicBezTo>
+                  <a:pt x="481857" y="9989"/>
+                  <a:pt x="639963" y="130757"/>
+                  <a:pt x="634458" y="298290"/>
+                </a:cubicBezTo>
+                <a:cubicBezTo>
+                  <a:pt x="621724" y="440470"/>
+                  <a:pt x="486353" y="602400"/>
+                  <a:pt x="317229" y="596580"/>
+                </a:cubicBezTo>
+                <a:cubicBezTo>
+                  <a:pt x="140567" y="571149"/>
+                  <a:pt x="13501" y="471702"/>
+                  <a:pt x="0" y="298290"/>
                 </a:cubicBezTo>
                 <a:close/>
               </a:path>
@@ -4801,7 +4802,7 @@
           <a:lstStyle/>
           <a:p>
             <a:pPr algn="ctr"/>
-            <a:endParaRPr lang="en-US"/>
+            <a:endParaRPr lang="en-US" sz="1440"/>
           </a:p>
         </p:txBody>
       </p:sp>
@@ -4819,22 +4820,22 @@
         </p:nvSpPr>
         <p:spPr>
           <a:xfrm>
-            <a:off x="674398" y="470728"/>
-            <a:ext cx="793072" cy="745724"/>
+            <a:off x="356638" y="559463"/>
+            <a:ext cx="634458" cy="596579"/>
           </a:xfrm>
           <a:custGeom>
             <a:avLst/>
             <a:gdLst>
-              <a:gd name="connsiteX0" fmla="*/ 0 w 793072"/>
-              <a:gd name="connsiteY0" fmla="*/ 372862 h 745724"/>
-              <a:gd name="connsiteX1" fmla="*/ 396536 w 793072"/>
-              <a:gd name="connsiteY1" fmla="*/ 0 h 745724"/>
-              <a:gd name="connsiteX2" fmla="*/ 793072 w 793072"/>
-              <a:gd name="connsiteY2" fmla="*/ 372862 h 745724"/>
-              <a:gd name="connsiteX3" fmla="*/ 396536 w 793072"/>
-              <a:gd name="connsiteY3" fmla="*/ 745724 h 745724"/>
-              <a:gd name="connsiteX4" fmla="*/ 0 w 793072"/>
-              <a:gd name="connsiteY4" fmla="*/ 372862 h 745724"/>
+              <a:gd name="connsiteX0" fmla="*/ 0 w 634458"/>
+              <a:gd name="connsiteY0" fmla="*/ 298290 h 596579"/>
+              <a:gd name="connsiteX1" fmla="*/ 317229 w 634458"/>
+              <a:gd name="connsiteY1" fmla="*/ 0 h 596579"/>
+              <a:gd name="connsiteX2" fmla="*/ 634458 w 634458"/>
+              <a:gd name="connsiteY2" fmla="*/ 298290 h 596579"/>
+              <a:gd name="connsiteX3" fmla="*/ 317229 w 634458"/>
+              <a:gd name="connsiteY3" fmla="*/ 596580 h 596579"/>
+              <a:gd name="connsiteX4" fmla="*/ 0 w 634458"/>
+              <a:gd name="connsiteY4" fmla="*/ 298290 h 596579"/>
             </a:gdLst>
             <a:ahLst/>
             <a:cxnLst>
@@ -4856,55 +4857,55 @@
             </a:cxnLst>
             <a:rect l="l" t="t" r="r" b="b"/>
             <a:pathLst>
-              <a:path w="793072" h="745724" fill="none" extrusionOk="0">
+              <a:path w="634458" h="596579" fill="none" extrusionOk="0">
                 <a:moveTo>
-                  <a:pt x="0" y="372862"/>
+                  <a:pt x="0" y="298290"/>
                 </a:moveTo>
                 <a:cubicBezTo>
-                  <a:pt x="9943" y="166305"/>
-                  <a:pt x="160892" y="-10251"/>
-                  <a:pt x="396536" y="0"/>
-                </a:cubicBezTo>
-                <a:cubicBezTo>
-                  <a:pt x="629423" y="14708"/>
-                  <a:pt x="772656" y="145507"/>
-                  <a:pt x="793072" y="372862"/>
-                </a:cubicBezTo>
-                <a:cubicBezTo>
-                  <a:pt x="775778" y="614956"/>
-                  <a:pt x="631639" y="726316"/>
-                  <a:pt x="396536" y="745724"/>
-                </a:cubicBezTo>
-                <a:cubicBezTo>
-                  <a:pt x="149981" y="729288"/>
-                  <a:pt x="-1635" y="592335"/>
-                  <a:pt x="0" y="372862"/>
+                  <a:pt x="5243" y="133216"/>
+                  <a:pt x="118882" y="-14256"/>
+                  <a:pt x="317229" y="0"/>
+                </a:cubicBezTo>
+                <a:cubicBezTo>
+                  <a:pt x="505663" y="14017"/>
+                  <a:pt x="616664" y="114872"/>
+                  <a:pt x="634458" y="298290"/>
+                </a:cubicBezTo>
+                <a:cubicBezTo>
+                  <a:pt x="621336" y="490475"/>
+                  <a:pt x="507175" y="578808"/>
+                  <a:pt x="317229" y="596580"/>
+                </a:cubicBezTo>
+                <a:cubicBezTo>
+                  <a:pt x="124810" y="586310"/>
+                  <a:pt x="-1624" y="476482"/>
+                  <a:pt x="0" y="298290"/>
                 </a:cubicBezTo>
                 <a:close/>
               </a:path>
-              <a:path w="793072" h="745724" stroke="0" extrusionOk="0">
+              <a:path w="634458" h="596579" stroke="0" extrusionOk="0">
                 <a:moveTo>
-                  <a:pt x="0" y="372862"/>
+                  <a:pt x="0" y="298290"/>
                 </a:moveTo>
                 <a:cubicBezTo>
-                  <a:pt x="-1172" y="174753"/>
-                  <a:pt x="178774" y="32163"/>
-                  <a:pt x="396536" y="0"/>
-                </a:cubicBezTo>
-                <a:cubicBezTo>
-                  <a:pt x="599490" y="17898"/>
-                  <a:pt x="789438" y="149485"/>
-                  <a:pt x="793072" y="372862"/>
-                </a:cubicBezTo>
-                <a:cubicBezTo>
-                  <a:pt x="804224" y="570231"/>
-                  <a:pt x="597272" y="755959"/>
-                  <a:pt x="396536" y="745724"/>
-                </a:cubicBezTo>
-                <a:cubicBezTo>
-                  <a:pt x="169066" y="751909"/>
-                  <a:pt x="15446" y="552727"/>
-                  <a:pt x="0" y="372862"/>
+                  <a:pt x="-3476" y="156727"/>
+                  <a:pt x="143242" y="31506"/>
+                  <a:pt x="317229" y="0"/>
+                </a:cubicBezTo>
+                <a:cubicBezTo>
+                  <a:pt x="489650" y="3101"/>
+                  <a:pt x="628580" y="105323"/>
+                  <a:pt x="634458" y="298290"/>
+                </a:cubicBezTo>
+                <a:cubicBezTo>
+                  <a:pt x="651860" y="449679"/>
+                  <a:pt x="470139" y="609071"/>
+                  <a:pt x="317229" y="596580"/>
+                </a:cubicBezTo>
+                <a:cubicBezTo>
+                  <a:pt x="139521" y="598411"/>
+                  <a:pt x="5764" y="453305"/>
+                  <a:pt x="0" y="298290"/>
                 </a:cubicBezTo>
                 <a:close/>
               </a:path>
@@ -4980,7 +4981,124 @@
           <a:lstStyle/>
           <a:p>
             <a:pPr algn="ctr"/>
-            <a:endParaRPr lang="en-US"/>
+            <a:endParaRPr lang="en-US" sz="1440"/>
+          </a:p>
+        </p:txBody>
+      </p:sp>
+      <p:sp>
+        <p:nvSpPr>
+          <p:cNvPr id="4" name="TextBox 3">
+            <a:extLst>
+              <a:ext uri="{FF2B5EF4-FFF2-40B4-BE49-F238E27FC236}">
+                <a16:creationId xmlns:a16="http://schemas.microsoft.com/office/drawing/2014/main" id="{9A83CA57-9740-9EB5-0F86-75AA007A9D20}"/>
+              </a:ext>
+            </a:extLst>
+          </p:cNvPr>
+          <p:cNvSpPr txBox="1"/>
+          <p:nvPr/>
+        </p:nvSpPr>
+        <p:spPr>
+          <a:xfrm>
+            <a:off x="-53383" y="513042"/>
+            <a:ext cx="454537" cy="707886"/>
+          </a:xfrm>
+          <a:prstGeom prst="rect">
+            <a:avLst/>
+          </a:prstGeom>
+          <a:noFill/>
+        </p:spPr>
+        <p:txBody>
+          <a:bodyPr wrap="square" rtlCol="0">
+            <a:spAutoFit/>
+          </a:bodyPr>
+          <a:lstStyle/>
+          <a:p>
+            <a:r>
+              <a:rPr lang="en-US" sz="4000" dirty="0">
+                <a:latin typeface="Arial Nova Light" panose="020B0304020202020204" pitchFamily="34" charset="0"/>
+              </a:rPr>
+              <a:t>R</a:t>
+            </a:r>
+          </a:p>
+        </p:txBody>
+      </p:sp>
+      <p:sp>
+        <p:nvSpPr>
+          <p:cNvPr id="5" name="TextBox 4">
+            <a:extLst>
+              <a:ext uri="{FF2B5EF4-FFF2-40B4-BE49-F238E27FC236}">
+                <a16:creationId xmlns:a16="http://schemas.microsoft.com/office/drawing/2014/main" id="{BEFA6CC0-547E-542B-F41E-5DE6B64E9FB7}"/>
+              </a:ext>
+            </a:extLst>
+          </p:cNvPr>
+          <p:cNvSpPr txBox="1"/>
+          <p:nvPr/>
+        </p:nvSpPr>
+        <p:spPr>
+          <a:xfrm>
+            <a:off x="445669" y="655327"/>
+            <a:ext cx="456397" cy="404854"/>
+          </a:xfrm>
+          <a:prstGeom prst="rect">
+            <a:avLst/>
+          </a:prstGeom>
+          <a:noFill/>
+        </p:spPr>
+        <p:txBody>
+          <a:bodyPr wrap="square" rtlCol="0">
+            <a:prstTxWarp prst="textInflate">
+              <a:avLst/>
+            </a:prstTxWarp>
+            <a:spAutoFit/>
+          </a:bodyPr>
+          <a:lstStyle/>
+          <a:p>
+            <a:r>
+              <a:rPr lang="en-US" sz="1440" dirty="0">
+                <a:latin typeface="Arial Nova Light" panose="020B0304020202020204" pitchFamily="34" charset="0"/>
+              </a:rPr>
+              <a:t>EE</a:t>
+            </a:r>
+          </a:p>
+        </p:txBody>
+      </p:sp>
+      <p:sp>
+        <p:nvSpPr>
+          <p:cNvPr id="6" name="TextBox 5">
+            <a:extLst>
+              <a:ext uri="{FF2B5EF4-FFF2-40B4-BE49-F238E27FC236}">
+                <a16:creationId xmlns:a16="http://schemas.microsoft.com/office/drawing/2014/main" id="{7B862E7E-2AA9-97B9-EF6A-E0DFB4D43A3B}"/>
+              </a:ext>
+            </a:extLst>
+          </p:cNvPr>
+          <p:cNvSpPr txBox="1"/>
+          <p:nvPr/>
+        </p:nvSpPr>
+        <p:spPr>
+          <a:xfrm>
+            <a:off x="1161540" y="643003"/>
+            <a:ext cx="484183" cy="429502"/>
+          </a:xfrm>
+          <a:prstGeom prst="rect">
+            <a:avLst/>
+          </a:prstGeom>
+          <a:noFill/>
+        </p:spPr>
+        <p:txBody>
+          <a:bodyPr wrap="square" rtlCol="0">
+            <a:prstTxWarp prst="textInflate">
+              <a:avLst/>
+            </a:prstTxWarp>
+            <a:spAutoFit/>
+          </a:bodyPr>
+          <a:lstStyle/>
+          <a:p>
+            <a:r>
+              <a:rPr lang="en-US" sz="1440" dirty="0">
+                <a:latin typeface="Arial Nova Light" panose="020B0304020202020204" pitchFamily="34" charset="0"/>
+              </a:rPr>
+              <a:t>DR</a:t>
+            </a:r>
           </a:p>
         </p:txBody>
       </p:sp>
@@ -4998,24 +5116,24 @@
         </p:nvSpPr>
         <p:spPr>
           <a:xfrm>
-            <a:off x="1307295" y="799340"/>
-            <a:ext cx="266700" cy="229360"/>
+            <a:off x="862957" y="822352"/>
+            <a:ext cx="213360" cy="183488"/>
           </a:xfrm>
           <a:custGeom>
             <a:avLst/>
             <a:gdLst>
-              <a:gd name="connsiteX0" fmla="*/ 133350 w 266700"/>
-              <a:gd name="connsiteY0" fmla="*/ 0 h 229360"/>
-              <a:gd name="connsiteX1" fmla="*/ 266700 w 266700"/>
-              <a:gd name="connsiteY1" fmla="*/ 114680 h 229360"/>
-              <a:gd name="connsiteX2" fmla="*/ 133350 w 266700"/>
-              <a:gd name="connsiteY2" fmla="*/ 114680 h 229360"/>
-              <a:gd name="connsiteX3" fmla="*/ 133350 w 266700"/>
-              <a:gd name="connsiteY3" fmla="*/ 0 h 229360"/>
-              <a:gd name="connsiteX0" fmla="*/ 133350 w 266700"/>
-              <a:gd name="connsiteY0" fmla="*/ 0 h 229360"/>
-              <a:gd name="connsiteX1" fmla="*/ 266700 w 266700"/>
-              <a:gd name="connsiteY1" fmla="*/ 114680 h 229360"/>
+              <a:gd name="connsiteX0" fmla="*/ 106680 w 213360"/>
+              <a:gd name="connsiteY0" fmla="*/ 0 h 183488"/>
+              <a:gd name="connsiteX1" fmla="*/ 213360 w 213360"/>
+              <a:gd name="connsiteY1" fmla="*/ 91744 h 183488"/>
+              <a:gd name="connsiteX2" fmla="*/ 106680 w 213360"/>
+              <a:gd name="connsiteY2" fmla="*/ 91744 h 183488"/>
+              <a:gd name="connsiteX3" fmla="*/ 106680 w 213360"/>
+              <a:gd name="connsiteY3" fmla="*/ 0 h 183488"/>
+              <a:gd name="connsiteX0" fmla="*/ 106680 w 213360"/>
+              <a:gd name="connsiteY0" fmla="*/ 0 h 183488"/>
+              <a:gd name="connsiteX1" fmla="*/ 213360 w 213360"/>
+              <a:gd name="connsiteY1" fmla="*/ 91744 h 183488"/>
             </a:gdLst>
             <a:ahLst/>
             <a:cxnLst>
@@ -5028,45 +5146,35 @@
             </a:cxnLst>
             <a:rect l="l" t="t" r="r" b="b"/>
             <a:pathLst>
-              <a:path w="266700" h="229360" stroke="0" extrusionOk="0">
+              <a:path w="213360" h="183488" stroke="0" extrusionOk="0">
                 <a:moveTo>
-                  <a:pt x="133350" y="0"/>
+                  <a:pt x="106680" y="0"/>
                 </a:moveTo>
                 <a:cubicBezTo>
-                  <a:pt x="209538" y="-31"/>
-                  <a:pt x="262316" y="53201"/>
-                  <a:pt x="266700" y="114680"/>
-                </a:cubicBezTo>
-                <a:cubicBezTo>
-                  <a:pt x="250348" y="108994"/>
-                  <a:pt x="166006" y="107022"/>
-                  <a:pt x="133350" y="114680"/>
-                </a:cubicBezTo>
-                <a:cubicBezTo>
-                  <a:pt x="132725" y="93784"/>
-                  <a:pt x="137235" y="55357"/>
-                  <a:pt x="133350" y="0"/>
+                  <a:pt x="172856" y="-89"/>
+                  <a:pt x="211878" y="41703"/>
+                  <a:pt x="213360" y="91744"/>
+                </a:cubicBezTo>
+                <a:cubicBezTo>
+                  <a:pt x="200467" y="98059"/>
+                  <a:pt x="122237" y="91286"/>
+                  <a:pt x="106680" y="91744"/>
+                </a:cubicBezTo>
+                <a:cubicBezTo>
+                  <a:pt x="99863" y="70544"/>
+                  <a:pt x="112629" y="26454"/>
+                  <a:pt x="106680" y="0"/>
                 </a:cubicBezTo>
                 <a:close/>
               </a:path>
-              <a:path w="266700" h="229360" fill="none" extrusionOk="0">
+              <a:path w="213360" h="183488" fill="none" extrusionOk="0">
                 <a:moveTo>
-                  <a:pt x="133350" y="0"/>
+                  <a:pt x="106680" y="0"/>
                 </a:moveTo>
                 <a:cubicBezTo>
-                  <a:pt x="206740" y="3173"/>
-                  <a:pt x="269823" y="44784"/>
-                  <a:pt x="266700" y="114680"/>
-                </a:cubicBezTo>
-              </a:path>
-              <a:path w="266700" h="229360" fill="none" stroke="0" extrusionOk="0">
-                <a:moveTo>
-                  <a:pt x="133350" y="0"/>
-                </a:moveTo>
-                <a:cubicBezTo>
-                  <a:pt x="201788" y="-9065"/>
-                  <a:pt x="258790" y="50975"/>
-                  <a:pt x="266700" y="114680"/>
+                  <a:pt x="163190" y="-4190"/>
+                  <a:pt x="204604" y="40667"/>
+                  <a:pt x="213360" y="91744"/>
                 </a:cubicBezTo>
               </a:path>
             </a:pathLst>
@@ -5111,7 +5219,7 @@
           <a:lstStyle/>
           <a:p>
             <a:pPr algn="ctr"/>
-            <a:endParaRPr lang="en-US"/>
+            <a:endParaRPr lang="en-US" sz="1440"/>
           </a:p>
         </p:txBody>
       </p:sp>
@@ -5129,22 +5237,22 @@
         </p:nvSpPr>
         <p:spPr>
           <a:xfrm>
-            <a:off x="640759" y="830374"/>
-            <a:ext cx="79117" cy="45719"/>
+            <a:off x="329729" y="847181"/>
+            <a:ext cx="63294" cy="36575"/>
           </a:xfrm>
           <a:custGeom>
             <a:avLst/>
             <a:gdLst>
-              <a:gd name="connsiteX0" fmla="*/ 0 w 79117"/>
-              <a:gd name="connsiteY0" fmla="*/ 0 h 45719"/>
-              <a:gd name="connsiteX1" fmla="*/ 79117 w 79117"/>
-              <a:gd name="connsiteY1" fmla="*/ 0 h 45719"/>
-              <a:gd name="connsiteX2" fmla="*/ 79117 w 79117"/>
-              <a:gd name="connsiteY2" fmla="*/ 45719 h 45719"/>
-              <a:gd name="connsiteX3" fmla="*/ 0 w 79117"/>
-              <a:gd name="connsiteY3" fmla="*/ 45719 h 45719"/>
-              <a:gd name="connsiteX4" fmla="*/ 0 w 79117"/>
-              <a:gd name="connsiteY4" fmla="*/ 0 h 45719"/>
+              <a:gd name="connsiteX0" fmla="*/ 0 w 63294"/>
+              <a:gd name="connsiteY0" fmla="*/ 0 h 36575"/>
+              <a:gd name="connsiteX1" fmla="*/ 63294 w 63294"/>
+              <a:gd name="connsiteY1" fmla="*/ 0 h 36575"/>
+              <a:gd name="connsiteX2" fmla="*/ 63294 w 63294"/>
+              <a:gd name="connsiteY2" fmla="*/ 36575 h 36575"/>
+              <a:gd name="connsiteX3" fmla="*/ 0 w 63294"/>
+              <a:gd name="connsiteY3" fmla="*/ 36575 h 36575"/>
+              <a:gd name="connsiteX4" fmla="*/ 0 w 63294"/>
+              <a:gd name="connsiteY4" fmla="*/ 0 h 36575"/>
             </a:gdLst>
             <a:ahLst/>
             <a:cxnLst>
@@ -5166,54 +5274,54 @@
             </a:cxnLst>
             <a:rect l="l" t="t" r="r" b="b"/>
             <a:pathLst>
-              <a:path w="79117" h="45719" fill="none" extrusionOk="0">
+              <a:path w="63294" h="36575" fill="none" extrusionOk="0">
                 <a:moveTo>
                   <a:pt x="0" y="0"/>
                 </a:moveTo>
                 <a:cubicBezTo>
-                  <a:pt x="23045" y="1611"/>
-                  <a:pt x="53366" y="822"/>
-                  <a:pt x="79117" y="0"/>
-                </a:cubicBezTo>
-                <a:cubicBezTo>
-                  <a:pt x="77081" y="17070"/>
-                  <a:pt x="80490" y="25705"/>
-                  <a:pt x="79117" y="45719"/>
-                </a:cubicBezTo>
-                <a:cubicBezTo>
-                  <a:pt x="54419" y="47153"/>
-                  <a:pt x="36086" y="48873"/>
-                  <a:pt x="0" y="45719"/>
-                </a:cubicBezTo>
-                <a:cubicBezTo>
-                  <a:pt x="806" y="34592"/>
-                  <a:pt x="876" y="9605"/>
+                  <a:pt x="16393" y="-949"/>
+                  <a:pt x="47418" y="-3140"/>
+                  <a:pt x="63294" y="0"/>
+                </a:cubicBezTo>
+                <a:cubicBezTo>
+                  <a:pt x="63689" y="15737"/>
+                  <a:pt x="61759" y="28686"/>
+                  <a:pt x="63294" y="36575"/>
+                </a:cubicBezTo>
+                <a:cubicBezTo>
+                  <a:pt x="33901" y="35514"/>
+                  <a:pt x="20977" y="38817"/>
+                  <a:pt x="0" y="36575"/>
+                </a:cubicBezTo>
+                <a:cubicBezTo>
+                  <a:pt x="584" y="26105"/>
+                  <a:pt x="-224" y="7763"/>
                   <a:pt x="0" y="0"/>
                 </a:cubicBezTo>
                 <a:close/>
               </a:path>
-              <a:path w="79117" h="45719" stroke="0" extrusionOk="0">
+              <a:path w="63294" h="36575" stroke="0" extrusionOk="0">
                 <a:moveTo>
                   <a:pt x="0" y="0"/>
                 </a:moveTo>
                 <a:cubicBezTo>
-                  <a:pt x="33487" y="3878"/>
-                  <a:pt x="48428" y="330"/>
-                  <a:pt x="79117" y="0"/>
-                </a:cubicBezTo>
-                <a:cubicBezTo>
-                  <a:pt x="81255" y="16182"/>
-                  <a:pt x="81276" y="33719"/>
-                  <a:pt x="79117" y="45719"/>
-                </a:cubicBezTo>
-                <a:cubicBezTo>
-                  <a:pt x="62540" y="44370"/>
-                  <a:pt x="30026" y="46550"/>
-                  <a:pt x="0" y="45719"/>
-                </a:cubicBezTo>
-                <a:cubicBezTo>
-                  <a:pt x="-1966" y="25792"/>
-                  <a:pt x="-747" y="20069"/>
+                  <a:pt x="28177" y="878"/>
+                  <a:pt x="41115" y="892"/>
+                  <a:pt x="63294" y="0"/>
+                </a:cubicBezTo>
+                <a:cubicBezTo>
+                  <a:pt x="63368" y="11321"/>
+                  <a:pt x="61617" y="24127"/>
+                  <a:pt x="63294" y="36575"/>
+                </a:cubicBezTo>
+                <a:cubicBezTo>
+                  <a:pt x="44569" y="35970"/>
+                  <a:pt x="14705" y="35334"/>
+                  <a:pt x="0" y="36575"/>
+                </a:cubicBezTo>
+                <a:cubicBezTo>
+                  <a:pt x="-1271" y="24377"/>
+                  <a:pt x="-473" y="13190"/>
                   <a:pt x="0" y="0"/>
                 </a:cubicBezTo>
                 <a:close/>
@@ -5259,7 +5367,7 @@
           <a:lstStyle/>
           <a:p>
             <a:pPr algn="ctr"/>
-            <a:endParaRPr lang="en-US"/>
+            <a:endParaRPr lang="en-US" sz="1440"/>
           </a:p>
         </p:txBody>
       </p:sp>
@@ -5277,22 +5385,22 @@
         </p:nvSpPr>
         <p:spPr>
           <a:xfrm>
-            <a:off x="2327509" y="820730"/>
-            <a:ext cx="79117" cy="45719"/>
+            <a:off x="1679128" y="839465"/>
+            <a:ext cx="63294" cy="36575"/>
           </a:xfrm>
           <a:custGeom>
             <a:avLst/>
             <a:gdLst>
-              <a:gd name="connsiteX0" fmla="*/ 0 w 79117"/>
-              <a:gd name="connsiteY0" fmla="*/ 0 h 45719"/>
-              <a:gd name="connsiteX1" fmla="*/ 79117 w 79117"/>
-              <a:gd name="connsiteY1" fmla="*/ 0 h 45719"/>
-              <a:gd name="connsiteX2" fmla="*/ 79117 w 79117"/>
-              <a:gd name="connsiteY2" fmla="*/ 45719 h 45719"/>
-              <a:gd name="connsiteX3" fmla="*/ 0 w 79117"/>
-              <a:gd name="connsiteY3" fmla="*/ 45719 h 45719"/>
-              <a:gd name="connsiteX4" fmla="*/ 0 w 79117"/>
-              <a:gd name="connsiteY4" fmla="*/ 0 h 45719"/>
+              <a:gd name="connsiteX0" fmla="*/ 0 w 63294"/>
+              <a:gd name="connsiteY0" fmla="*/ 0 h 36575"/>
+              <a:gd name="connsiteX1" fmla="*/ 63294 w 63294"/>
+              <a:gd name="connsiteY1" fmla="*/ 0 h 36575"/>
+              <a:gd name="connsiteX2" fmla="*/ 63294 w 63294"/>
+              <a:gd name="connsiteY2" fmla="*/ 36575 h 36575"/>
+              <a:gd name="connsiteX3" fmla="*/ 0 w 63294"/>
+              <a:gd name="connsiteY3" fmla="*/ 36575 h 36575"/>
+              <a:gd name="connsiteX4" fmla="*/ 0 w 63294"/>
+              <a:gd name="connsiteY4" fmla="*/ 0 h 36575"/>
             </a:gdLst>
             <a:ahLst/>
             <a:cxnLst>
@@ -5314,54 +5422,54 @@
             </a:cxnLst>
             <a:rect l="l" t="t" r="r" b="b"/>
             <a:pathLst>
-              <a:path w="79117" h="45719" fill="none" extrusionOk="0">
+              <a:path w="63294" h="36575" fill="none" extrusionOk="0">
                 <a:moveTo>
                   <a:pt x="0" y="0"/>
                 </a:moveTo>
                 <a:cubicBezTo>
-                  <a:pt x="23045" y="1611"/>
-                  <a:pt x="53366" y="822"/>
-                  <a:pt x="79117" y="0"/>
-                </a:cubicBezTo>
-                <a:cubicBezTo>
-                  <a:pt x="77081" y="17070"/>
-                  <a:pt x="80490" y="25705"/>
-                  <a:pt x="79117" y="45719"/>
-                </a:cubicBezTo>
-                <a:cubicBezTo>
-                  <a:pt x="54419" y="47153"/>
-                  <a:pt x="36086" y="48873"/>
-                  <a:pt x="0" y="45719"/>
-                </a:cubicBezTo>
-                <a:cubicBezTo>
-                  <a:pt x="806" y="34592"/>
-                  <a:pt x="876" y="9605"/>
+                  <a:pt x="16393" y="-949"/>
+                  <a:pt x="47418" y="-3140"/>
+                  <a:pt x="63294" y="0"/>
+                </a:cubicBezTo>
+                <a:cubicBezTo>
+                  <a:pt x="63689" y="15737"/>
+                  <a:pt x="61759" y="28686"/>
+                  <a:pt x="63294" y="36575"/>
+                </a:cubicBezTo>
+                <a:cubicBezTo>
+                  <a:pt x="33901" y="35514"/>
+                  <a:pt x="20977" y="38817"/>
+                  <a:pt x="0" y="36575"/>
+                </a:cubicBezTo>
+                <a:cubicBezTo>
+                  <a:pt x="584" y="26105"/>
+                  <a:pt x="-224" y="7763"/>
                   <a:pt x="0" y="0"/>
                 </a:cubicBezTo>
                 <a:close/>
               </a:path>
-              <a:path w="79117" h="45719" stroke="0" extrusionOk="0">
+              <a:path w="63294" h="36575" stroke="0" extrusionOk="0">
                 <a:moveTo>
                   <a:pt x="0" y="0"/>
                 </a:moveTo>
                 <a:cubicBezTo>
-                  <a:pt x="33487" y="3878"/>
-                  <a:pt x="48428" y="330"/>
-                  <a:pt x="79117" y="0"/>
-                </a:cubicBezTo>
-                <a:cubicBezTo>
-                  <a:pt x="81255" y="16182"/>
-                  <a:pt x="81276" y="33719"/>
-                  <a:pt x="79117" y="45719"/>
-                </a:cubicBezTo>
-                <a:cubicBezTo>
-                  <a:pt x="62540" y="44370"/>
-                  <a:pt x="30026" y="46550"/>
-                  <a:pt x="0" y="45719"/>
-                </a:cubicBezTo>
-                <a:cubicBezTo>
-                  <a:pt x="-1966" y="25792"/>
-                  <a:pt x="-747" y="20069"/>
+                  <a:pt x="28177" y="878"/>
+                  <a:pt x="41115" y="892"/>
+                  <a:pt x="63294" y="0"/>
+                </a:cubicBezTo>
+                <a:cubicBezTo>
+                  <a:pt x="63368" y="11321"/>
+                  <a:pt x="61617" y="24127"/>
+                  <a:pt x="63294" y="36575"/>
+                </a:cubicBezTo>
+                <a:cubicBezTo>
+                  <a:pt x="44569" y="35970"/>
+                  <a:pt x="14705" y="35334"/>
+                  <a:pt x="0" y="36575"/>
+                </a:cubicBezTo>
+                <a:cubicBezTo>
+                  <a:pt x="-1271" y="24377"/>
+                  <a:pt x="-473" y="13190"/>
                   <a:pt x="0" y="0"/>
                 </a:cubicBezTo>
                 <a:close/>
@@ -5407,7 +5515,1132 @@
           <a:lstStyle/>
           <a:p>
             <a:pPr algn="ctr"/>
-            <a:endParaRPr lang="en-US"/>
+            <a:endParaRPr lang="en-US" sz="1440"/>
+          </a:p>
+        </p:txBody>
+      </p:sp>
+    </p:spTree>
+    <p:extLst>
+      <p:ext uri="{BB962C8B-B14F-4D97-AF65-F5344CB8AC3E}">
+        <p14:creationId xmlns:p14="http://schemas.microsoft.com/office/powerpoint/2010/main" val="3799776496"/>
+      </p:ext>
+    </p:extLst>
+  </p:cSld>
+  <p:clrMapOvr>
+    <a:masterClrMapping/>
+  </p:clrMapOvr>
+</p:sld>
+</file>
+
+<file path=ppt/slides/slide3.xml><?xml version="1.0" encoding="utf-8"?>
+<p:sld xmlns:a="http://schemas.openxmlformats.org/drawingml/2006/main" xmlns:r="http://schemas.openxmlformats.org/officeDocument/2006/relationships" xmlns:p="http://schemas.openxmlformats.org/presentationml/2006/main">
+  <p:cSld>
+    <p:bg>
+      <p:bgPr>
+        <a:solidFill>
+          <a:schemeClr val="bg1">
+            <a:alpha val="0"/>
+          </a:schemeClr>
+        </a:solidFill>
+        <a:effectLst/>
+      </p:bgPr>
+    </p:bg>
+    <p:spTree>
+      <p:nvGrpSpPr>
+        <p:cNvPr id="1" name=""/>
+        <p:cNvGrpSpPr/>
+        <p:nvPr/>
+      </p:nvGrpSpPr>
+      <p:grpSpPr>
+        <a:xfrm>
+          <a:off x="0" y="0"/>
+          <a:ext cx="0" cy="0"/>
+          <a:chOff x="0" y="0"/>
+          <a:chExt cx="0" cy="0"/>
+        </a:xfrm>
+      </p:grpSpPr>
+      <p:sp>
+        <p:nvSpPr>
+          <p:cNvPr id="20" name="Oval 19">
+            <a:extLst>
+              <a:ext uri="{FF2B5EF4-FFF2-40B4-BE49-F238E27FC236}">
+                <a16:creationId xmlns:a16="http://schemas.microsoft.com/office/drawing/2014/main" id="{3BE4B92A-0F9A-9717-17F1-D4003F7A7BAA}"/>
+              </a:ext>
+            </a:extLst>
+          </p:cNvPr>
+          <p:cNvSpPr/>
+          <p:nvPr/>
+        </p:nvSpPr>
+        <p:spPr>
+          <a:xfrm rot="600000">
+            <a:off x="805912" y="882086"/>
+            <a:ext cx="48391" cy="146750"/>
+          </a:xfrm>
+          <a:custGeom>
+            <a:avLst/>
+            <a:gdLst>
+              <a:gd name="connsiteX0" fmla="*/ 0 w 48391"/>
+              <a:gd name="connsiteY0" fmla="*/ 73375 h 146750"/>
+              <a:gd name="connsiteX1" fmla="*/ 24196 w 48391"/>
+              <a:gd name="connsiteY1" fmla="*/ 0 h 146750"/>
+              <a:gd name="connsiteX2" fmla="*/ 48392 w 48391"/>
+              <a:gd name="connsiteY2" fmla="*/ 73375 h 146750"/>
+              <a:gd name="connsiteX3" fmla="*/ 24196 w 48391"/>
+              <a:gd name="connsiteY3" fmla="*/ 146750 h 146750"/>
+              <a:gd name="connsiteX4" fmla="*/ 0 w 48391"/>
+              <a:gd name="connsiteY4" fmla="*/ 73375 h 146750"/>
+            </a:gdLst>
+            <a:ahLst/>
+            <a:cxnLst>
+              <a:cxn ang="0">
+                <a:pos x="connsiteX0" y="connsiteY0"/>
+              </a:cxn>
+              <a:cxn ang="0">
+                <a:pos x="connsiteX1" y="connsiteY1"/>
+              </a:cxn>
+              <a:cxn ang="0">
+                <a:pos x="connsiteX2" y="connsiteY2"/>
+              </a:cxn>
+              <a:cxn ang="0">
+                <a:pos x="connsiteX3" y="connsiteY3"/>
+              </a:cxn>
+              <a:cxn ang="0">
+                <a:pos x="connsiteX4" y="connsiteY4"/>
+              </a:cxn>
+            </a:cxnLst>
+            <a:rect l="l" t="t" r="r" b="b"/>
+            <a:pathLst>
+              <a:path w="48391" h="146750" fill="none" extrusionOk="0">
+                <a:moveTo>
+                  <a:pt x="0" y="73375"/>
+                </a:moveTo>
+                <a:cubicBezTo>
+                  <a:pt x="-2112" y="34746"/>
+                  <a:pt x="12906" y="-2176"/>
+                  <a:pt x="24196" y="0"/>
+                </a:cubicBezTo>
+                <a:cubicBezTo>
+                  <a:pt x="44502" y="-2232"/>
+                  <a:pt x="44478" y="30243"/>
+                  <a:pt x="48392" y="73375"/>
+                </a:cubicBezTo>
+                <a:cubicBezTo>
+                  <a:pt x="47957" y="115048"/>
+                  <a:pt x="37294" y="147038"/>
+                  <a:pt x="24196" y="146750"/>
+                </a:cubicBezTo>
+                <a:cubicBezTo>
+                  <a:pt x="14832" y="141264"/>
+                  <a:pt x="-3709" y="119436"/>
+                  <a:pt x="0" y="73375"/>
+                </a:cubicBezTo>
+                <a:close/>
+              </a:path>
+              <a:path w="48391" h="146750" stroke="0" extrusionOk="0">
+                <a:moveTo>
+                  <a:pt x="0" y="73375"/>
+                </a:moveTo>
+                <a:cubicBezTo>
+                  <a:pt x="1307" y="33252"/>
+                  <a:pt x="8738" y="-2589"/>
+                  <a:pt x="24196" y="0"/>
+                </a:cubicBezTo>
+                <a:cubicBezTo>
+                  <a:pt x="37896" y="-3161"/>
+                  <a:pt x="50314" y="32056"/>
+                  <a:pt x="48392" y="73375"/>
+                </a:cubicBezTo>
+                <a:cubicBezTo>
+                  <a:pt x="49031" y="114974"/>
+                  <a:pt x="37462" y="147815"/>
+                  <a:pt x="24196" y="146750"/>
+                </a:cubicBezTo>
+                <a:cubicBezTo>
+                  <a:pt x="10565" y="144895"/>
+                  <a:pt x="-1115" y="115343"/>
+                  <a:pt x="0" y="73375"/>
+                </a:cubicBezTo>
+                <a:close/>
+              </a:path>
+            </a:pathLst>
+          </a:custGeom>
+          <a:solidFill>
+            <a:schemeClr val="accent1">
+              <a:lumMod val="75000"/>
+            </a:schemeClr>
+          </a:solidFill>
+          <a:ln>
+            <a:solidFill>
+              <a:schemeClr val="accent1">
+                <a:lumMod val="75000"/>
+              </a:schemeClr>
+            </a:solidFill>
+            <a:extLst>
+              <a:ext uri="{C807C97D-BFC1-408E-A445-0C87EB9F89A2}">
+                <ask:lineSketchStyleProps xmlns:ask="http://schemas.microsoft.com/office/drawing/2018/sketchyshapes" sd="576019899">
+                  <a:prstGeom prst="ellipse">
+                    <a:avLst/>
+                  </a:prstGeom>
+                  <ask:type>
+                    <ask:lineSketchFreehand/>
+                  </ask:type>
+                </ask:lineSketchStyleProps>
+              </a:ext>
+            </a:extLst>
+          </a:ln>
+        </p:spPr>
+        <p:style>
+          <a:lnRef idx="2">
+            <a:schemeClr val="accent1">
+              <a:shade val="50000"/>
+            </a:schemeClr>
+          </a:lnRef>
+          <a:fillRef idx="1">
+            <a:schemeClr val="accent1"/>
+          </a:fillRef>
+          <a:effectRef idx="0">
+            <a:schemeClr val="accent1"/>
+          </a:effectRef>
+          <a:fontRef idx="minor">
+            <a:schemeClr val="lt1"/>
+          </a:fontRef>
+        </p:style>
+        <p:txBody>
+          <a:bodyPr rtlCol="0" anchor="ctr"/>
+          <a:lstStyle/>
+          <a:p>
+            <a:pPr algn="ctr"/>
+            <a:endParaRPr lang="en-US" sz="1440"/>
+          </a:p>
+        </p:txBody>
+      </p:sp>
+      <p:sp>
+        <p:nvSpPr>
+          <p:cNvPr id="24" name="Oval 23">
+            <a:extLst>
+              <a:ext uri="{FF2B5EF4-FFF2-40B4-BE49-F238E27FC236}">
+                <a16:creationId xmlns:a16="http://schemas.microsoft.com/office/drawing/2014/main" id="{665F8D12-1278-F33B-6286-6F61CC648D13}"/>
+              </a:ext>
+            </a:extLst>
+          </p:cNvPr>
+          <p:cNvSpPr/>
+          <p:nvPr/>
+        </p:nvSpPr>
+        <p:spPr>
+          <a:xfrm rot="-600000">
+            <a:off x="966878" y="882649"/>
+            <a:ext cx="49770" cy="150932"/>
+          </a:xfrm>
+          <a:custGeom>
+            <a:avLst/>
+            <a:gdLst>
+              <a:gd name="connsiteX0" fmla="*/ 0 w 49770"/>
+              <a:gd name="connsiteY0" fmla="*/ 75466 h 150932"/>
+              <a:gd name="connsiteX1" fmla="*/ 24885 w 49770"/>
+              <a:gd name="connsiteY1" fmla="*/ 0 h 150932"/>
+              <a:gd name="connsiteX2" fmla="*/ 49770 w 49770"/>
+              <a:gd name="connsiteY2" fmla="*/ 75466 h 150932"/>
+              <a:gd name="connsiteX3" fmla="*/ 24885 w 49770"/>
+              <a:gd name="connsiteY3" fmla="*/ 150932 h 150932"/>
+              <a:gd name="connsiteX4" fmla="*/ 0 w 49770"/>
+              <a:gd name="connsiteY4" fmla="*/ 75466 h 150932"/>
+            </a:gdLst>
+            <a:ahLst/>
+            <a:cxnLst>
+              <a:cxn ang="0">
+                <a:pos x="connsiteX0" y="connsiteY0"/>
+              </a:cxn>
+              <a:cxn ang="0">
+                <a:pos x="connsiteX1" y="connsiteY1"/>
+              </a:cxn>
+              <a:cxn ang="0">
+                <a:pos x="connsiteX2" y="connsiteY2"/>
+              </a:cxn>
+              <a:cxn ang="0">
+                <a:pos x="connsiteX3" y="connsiteY3"/>
+              </a:cxn>
+              <a:cxn ang="0">
+                <a:pos x="connsiteX4" y="connsiteY4"/>
+              </a:cxn>
+            </a:cxnLst>
+            <a:rect l="l" t="t" r="r" b="b"/>
+            <a:pathLst>
+              <a:path w="49770" h="150932" fill="none" extrusionOk="0">
+                <a:moveTo>
+                  <a:pt x="0" y="75466"/>
+                </a:moveTo>
+                <a:cubicBezTo>
+                  <a:pt x="-1569" y="35194"/>
+                  <a:pt x="11761" y="-651"/>
+                  <a:pt x="24885" y="0"/>
+                </a:cubicBezTo>
+                <a:cubicBezTo>
+                  <a:pt x="43390" y="-1531"/>
+                  <a:pt x="48647" y="33039"/>
+                  <a:pt x="49770" y="75466"/>
+                </a:cubicBezTo>
+                <a:cubicBezTo>
+                  <a:pt x="48740" y="119867"/>
+                  <a:pt x="36998" y="152705"/>
+                  <a:pt x="24885" y="150932"/>
+                </a:cubicBezTo>
+                <a:cubicBezTo>
+                  <a:pt x="14167" y="146780"/>
+                  <a:pt x="-2267" y="120530"/>
+                  <a:pt x="0" y="75466"/>
+                </a:cubicBezTo>
+                <a:close/>
+              </a:path>
+              <a:path w="49770" h="150932" stroke="0" extrusionOk="0">
+                <a:moveTo>
+                  <a:pt x="0" y="75466"/>
+                </a:moveTo>
+                <a:cubicBezTo>
+                  <a:pt x="2999" y="34707"/>
+                  <a:pt x="9737" y="-1736"/>
+                  <a:pt x="24885" y="0"/>
+                </a:cubicBezTo>
+                <a:cubicBezTo>
+                  <a:pt x="39570" y="-8822"/>
+                  <a:pt x="51368" y="33127"/>
+                  <a:pt x="49770" y="75466"/>
+                </a:cubicBezTo>
+                <a:cubicBezTo>
+                  <a:pt x="51367" y="119833"/>
+                  <a:pt x="38332" y="154203"/>
+                  <a:pt x="24885" y="150932"/>
+                </a:cubicBezTo>
+                <a:cubicBezTo>
+                  <a:pt x="9891" y="142283"/>
+                  <a:pt x="-637" y="117970"/>
+                  <a:pt x="0" y="75466"/>
+                </a:cubicBezTo>
+                <a:close/>
+              </a:path>
+            </a:pathLst>
+          </a:custGeom>
+          <a:solidFill>
+            <a:schemeClr val="accent1">
+              <a:lumMod val="75000"/>
+            </a:schemeClr>
+          </a:solidFill>
+          <a:ln>
+            <a:solidFill>
+              <a:schemeClr val="accent1">
+                <a:lumMod val="75000"/>
+              </a:schemeClr>
+            </a:solidFill>
+            <a:extLst>
+              <a:ext uri="{C807C97D-BFC1-408E-A445-0C87EB9F89A2}">
+                <ask:lineSketchStyleProps xmlns:ask="http://schemas.microsoft.com/office/drawing/2018/sketchyshapes" sd="576019899">
+                  <a:prstGeom prst="ellipse">
+                    <a:avLst/>
+                  </a:prstGeom>
+                  <ask:type>
+                    <ask:lineSketchFreehand/>
+                  </ask:type>
+                </ask:lineSketchStyleProps>
+              </a:ext>
+            </a:extLst>
+          </a:ln>
+        </p:spPr>
+        <p:style>
+          <a:lnRef idx="2">
+            <a:schemeClr val="accent1">
+              <a:shade val="50000"/>
+            </a:schemeClr>
+          </a:lnRef>
+          <a:fillRef idx="1">
+            <a:schemeClr val="accent1"/>
+          </a:fillRef>
+          <a:effectRef idx="0">
+            <a:schemeClr val="accent1"/>
+          </a:effectRef>
+          <a:fontRef idx="minor">
+            <a:schemeClr val="lt1"/>
+          </a:fontRef>
+        </p:style>
+        <p:txBody>
+          <a:bodyPr rtlCol="0" anchor="ctr"/>
+          <a:lstStyle/>
+          <a:p>
+            <a:pPr algn="ctr"/>
+            <a:endParaRPr lang="en-US" sz="1440"/>
+          </a:p>
+        </p:txBody>
+      </p:sp>
+      <p:sp>
+        <p:nvSpPr>
+          <p:cNvPr id="8" name="Oval 7">
+            <a:extLst>
+              <a:ext uri="{FF2B5EF4-FFF2-40B4-BE49-F238E27FC236}">
+                <a16:creationId xmlns:a16="http://schemas.microsoft.com/office/drawing/2014/main" id="{ECB94614-01BA-89BA-8162-F1AEB3224A97}"/>
+              </a:ext>
+            </a:extLst>
+          </p:cNvPr>
+          <p:cNvSpPr/>
+          <p:nvPr/>
+        </p:nvSpPr>
+        <p:spPr>
+          <a:xfrm>
+            <a:off x="955935" y="616110"/>
+            <a:ext cx="634458" cy="596579"/>
+          </a:xfrm>
+          <a:custGeom>
+            <a:avLst/>
+            <a:gdLst>
+              <a:gd name="connsiteX0" fmla="*/ 0 w 634458"/>
+              <a:gd name="connsiteY0" fmla="*/ 298290 h 596579"/>
+              <a:gd name="connsiteX1" fmla="*/ 317229 w 634458"/>
+              <a:gd name="connsiteY1" fmla="*/ 0 h 596579"/>
+              <a:gd name="connsiteX2" fmla="*/ 634458 w 634458"/>
+              <a:gd name="connsiteY2" fmla="*/ 298290 h 596579"/>
+              <a:gd name="connsiteX3" fmla="*/ 317229 w 634458"/>
+              <a:gd name="connsiteY3" fmla="*/ 596580 h 596579"/>
+              <a:gd name="connsiteX4" fmla="*/ 0 w 634458"/>
+              <a:gd name="connsiteY4" fmla="*/ 298290 h 596579"/>
+            </a:gdLst>
+            <a:ahLst/>
+            <a:cxnLst>
+              <a:cxn ang="0">
+                <a:pos x="connsiteX0" y="connsiteY0"/>
+              </a:cxn>
+              <a:cxn ang="0">
+                <a:pos x="connsiteX1" y="connsiteY1"/>
+              </a:cxn>
+              <a:cxn ang="0">
+                <a:pos x="connsiteX2" y="connsiteY2"/>
+              </a:cxn>
+              <a:cxn ang="0">
+                <a:pos x="connsiteX3" y="connsiteY3"/>
+              </a:cxn>
+              <a:cxn ang="0">
+                <a:pos x="connsiteX4" y="connsiteY4"/>
+              </a:cxn>
+            </a:cxnLst>
+            <a:rect l="l" t="t" r="r" b="b"/>
+            <a:pathLst>
+              <a:path w="634458" h="596579" fill="none" extrusionOk="0">
+                <a:moveTo>
+                  <a:pt x="0" y="298290"/>
+                </a:moveTo>
+                <a:cubicBezTo>
+                  <a:pt x="-3991" y="140356"/>
+                  <a:pt x="130281" y="26180"/>
+                  <a:pt x="317229" y="0"/>
+                </a:cubicBezTo>
+                <a:cubicBezTo>
+                  <a:pt x="499752" y="8996"/>
+                  <a:pt x="647893" y="144260"/>
+                  <a:pt x="634458" y="298290"/>
+                </a:cubicBezTo>
+                <a:cubicBezTo>
+                  <a:pt x="636384" y="457712"/>
+                  <a:pt x="489223" y="627926"/>
+                  <a:pt x="317229" y="596580"/>
+                </a:cubicBezTo>
+                <a:cubicBezTo>
+                  <a:pt x="136747" y="596451"/>
+                  <a:pt x="-3594" y="460923"/>
+                  <a:pt x="0" y="298290"/>
+                </a:cubicBezTo>
+                <a:close/>
+              </a:path>
+              <a:path w="634458" h="596579" stroke="0" extrusionOk="0">
+                <a:moveTo>
+                  <a:pt x="0" y="298290"/>
+                </a:moveTo>
+                <a:cubicBezTo>
+                  <a:pt x="5686" y="135368"/>
+                  <a:pt x="162447" y="26467"/>
+                  <a:pt x="317229" y="0"/>
+                </a:cubicBezTo>
+                <a:cubicBezTo>
+                  <a:pt x="481857" y="9989"/>
+                  <a:pt x="639963" y="130757"/>
+                  <a:pt x="634458" y="298290"/>
+                </a:cubicBezTo>
+                <a:cubicBezTo>
+                  <a:pt x="621724" y="440470"/>
+                  <a:pt x="486353" y="602400"/>
+                  <a:pt x="317229" y="596580"/>
+                </a:cubicBezTo>
+                <a:cubicBezTo>
+                  <a:pt x="140567" y="571149"/>
+                  <a:pt x="13501" y="471702"/>
+                  <a:pt x="0" y="298290"/>
+                </a:cubicBezTo>
+                <a:close/>
+              </a:path>
+            </a:pathLst>
+          </a:custGeom>
+          <a:gradFill flip="none" rotWithShape="1">
+            <a:gsLst>
+              <a:gs pos="0">
+                <a:schemeClr val="accent5">
+                  <a:lumMod val="5000"/>
+                  <a:lumOff val="95000"/>
+                  <a:alpha val="0"/>
+                </a:schemeClr>
+              </a:gs>
+              <a:gs pos="74000">
+                <a:schemeClr val="accent5">
+                  <a:lumMod val="45000"/>
+                  <a:lumOff val="55000"/>
+                </a:schemeClr>
+              </a:gs>
+              <a:gs pos="83000">
+                <a:schemeClr val="accent5">
+                  <a:lumMod val="45000"/>
+                  <a:lumOff val="55000"/>
+                </a:schemeClr>
+              </a:gs>
+              <a:gs pos="100000">
+                <a:schemeClr val="accent5">
+                  <a:lumMod val="30000"/>
+                  <a:lumOff val="70000"/>
+                </a:schemeClr>
+              </a:gs>
+            </a:gsLst>
+            <a:lin ang="5400000" scaled="1"/>
+            <a:tileRect/>
+          </a:gradFill>
+          <a:ln w="38100">
+            <a:solidFill>
+              <a:schemeClr val="tx1"/>
+            </a:solidFill>
+            <a:extLst>
+              <a:ext uri="{C807C97D-BFC1-408E-A445-0C87EB9F89A2}">
+                <ask:lineSketchStyleProps xmlns:ask="http://schemas.microsoft.com/office/drawing/2018/sketchyshapes" sd="625625018">
+                  <a:prstGeom prst="ellipse">
+                    <a:avLst/>
+                  </a:prstGeom>
+                  <ask:type>
+                    <ask:lineSketchCurved/>
+                  </ask:type>
+                </ask:lineSketchStyleProps>
+              </a:ext>
+            </a:extLst>
+          </a:ln>
+        </p:spPr>
+        <p:style>
+          <a:lnRef idx="2">
+            <a:schemeClr val="accent1">
+              <a:shade val="50000"/>
+            </a:schemeClr>
+          </a:lnRef>
+          <a:fillRef idx="1">
+            <a:schemeClr val="accent1"/>
+          </a:fillRef>
+          <a:effectRef idx="0">
+            <a:schemeClr val="accent1"/>
+          </a:effectRef>
+          <a:fontRef idx="minor">
+            <a:schemeClr val="lt1"/>
+          </a:fontRef>
+        </p:style>
+        <p:txBody>
+          <a:bodyPr rtlCol="0" anchor="ctr"/>
+          <a:lstStyle/>
+          <a:p>
+            <a:pPr algn="ctr"/>
+            <a:endParaRPr lang="en-US" sz="1440"/>
+          </a:p>
+        </p:txBody>
+      </p:sp>
+      <p:sp>
+        <p:nvSpPr>
+          <p:cNvPr id="7" name="Oval 6">
+            <a:extLst>
+              <a:ext uri="{FF2B5EF4-FFF2-40B4-BE49-F238E27FC236}">
+                <a16:creationId xmlns:a16="http://schemas.microsoft.com/office/drawing/2014/main" id="{F3AEEA81-803B-2582-45DF-442017CEBD80}"/>
+              </a:ext>
+            </a:extLst>
+          </p:cNvPr>
+          <p:cNvSpPr/>
+          <p:nvPr/>
+        </p:nvSpPr>
+        <p:spPr>
+          <a:xfrm>
+            <a:off x="236256" y="616110"/>
+            <a:ext cx="634458" cy="596579"/>
+          </a:xfrm>
+          <a:custGeom>
+            <a:avLst/>
+            <a:gdLst>
+              <a:gd name="connsiteX0" fmla="*/ 0 w 634458"/>
+              <a:gd name="connsiteY0" fmla="*/ 298290 h 596579"/>
+              <a:gd name="connsiteX1" fmla="*/ 317229 w 634458"/>
+              <a:gd name="connsiteY1" fmla="*/ 0 h 596579"/>
+              <a:gd name="connsiteX2" fmla="*/ 634458 w 634458"/>
+              <a:gd name="connsiteY2" fmla="*/ 298290 h 596579"/>
+              <a:gd name="connsiteX3" fmla="*/ 317229 w 634458"/>
+              <a:gd name="connsiteY3" fmla="*/ 596580 h 596579"/>
+              <a:gd name="connsiteX4" fmla="*/ 0 w 634458"/>
+              <a:gd name="connsiteY4" fmla="*/ 298290 h 596579"/>
+            </a:gdLst>
+            <a:ahLst/>
+            <a:cxnLst>
+              <a:cxn ang="0">
+                <a:pos x="connsiteX0" y="connsiteY0"/>
+              </a:cxn>
+              <a:cxn ang="0">
+                <a:pos x="connsiteX1" y="connsiteY1"/>
+              </a:cxn>
+              <a:cxn ang="0">
+                <a:pos x="connsiteX2" y="connsiteY2"/>
+              </a:cxn>
+              <a:cxn ang="0">
+                <a:pos x="connsiteX3" y="connsiteY3"/>
+              </a:cxn>
+              <a:cxn ang="0">
+                <a:pos x="connsiteX4" y="connsiteY4"/>
+              </a:cxn>
+            </a:cxnLst>
+            <a:rect l="l" t="t" r="r" b="b"/>
+            <a:pathLst>
+              <a:path w="634458" h="596579" fill="none" extrusionOk="0">
+                <a:moveTo>
+                  <a:pt x="0" y="298290"/>
+                </a:moveTo>
+                <a:cubicBezTo>
+                  <a:pt x="5243" y="133216"/>
+                  <a:pt x="118882" y="-14256"/>
+                  <a:pt x="317229" y="0"/>
+                </a:cubicBezTo>
+                <a:cubicBezTo>
+                  <a:pt x="505663" y="14017"/>
+                  <a:pt x="616664" y="114872"/>
+                  <a:pt x="634458" y="298290"/>
+                </a:cubicBezTo>
+                <a:cubicBezTo>
+                  <a:pt x="621336" y="490475"/>
+                  <a:pt x="507175" y="578808"/>
+                  <a:pt x="317229" y="596580"/>
+                </a:cubicBezTo>
+                <a:cubicBezTo>
+                  <a:pt x="124810" y="586310"/>
+                  <a:pt x="-1624" y="476482"/>
+                  <a:pt x="0" y="298290"/>
+                </a:cubicBezTo>
+                <a:close/>
+              </a:path>
+              <a:path w="634458" h="596579" stroke="0" extrusionOk="0">
+                <a:moveTo>
+                  <a:pt x="0" y="298290"/>
+                </a:moveTo>
+                <a:cubicBezTo>
+                  <a:pt x="-3476" y="156727"/>
+                  <a:pt x="143242" y="31506"/>
+                  <a:pt x="317229" y="0"/>
+                </a:cubicBezTo>
+                <a:cubicBezTo>
+                  <a:pt x="489650" y="3101"/>
+                  <a:pt x="628580" y="105323"/>
+                  <a:pt x="634458" y="298290"/>
+                </a:cubicBezTo>
+                <a:cubicBezTo>
+                  <a:pt x="651860" y="449679"/>
+                  <a:pt x="470139" y="609071"/>
+                  <a:pt x="317229" y="596580"/>
+                </a:cubicBezTo>
+                <a:cubicBezTo>
+                  <a:pt x="139521" y="598411"/>
+                  <a:pt x="5764" y="453305"/>
+                  <a:pt x="0" y="298290"/>
+                </a:cubicBezTo>
+                <a:close/>
+              </a:path>
+            </a:pathLst>
+          </a:custGeom>
+          <a:gradFill flip="none" rotWithShape="1">
+            <a:gsLst>
+              <a:gs pos="0">
+                <a:schemeClr val="accent5">
+                  <a:lumMod val="5000"/>
+                  <a:lumOff val="95000"/>
+                  <a:alpha val="8000"/>
+                </a:schemeClr>
+              </a:gs>
+              <a:gs pos="74000">
+                <a:schemeClr val="accent5">
+                  <a:lumMod val="45000"/>
+                  <a:lumOff val="55000"/>
+                </a:schemeClr>
+              </a:gs>
+              <a:gs pos="83000">
+                <a:schemeClr val="accent5">
+                  <a:lumMod val="45000"/>
+                  <a:lumOff val="55000"/>
+                </a:schemeClr>
+              </a:gs>
+              <a:gs pos="100000">
+                <a:schemeClr val="accent5">
+                  <a:lumMod val="30000"/>
+                  <a:lumOff val="70000"/>
+                </a:schemeClr>
+              </a:gs>
+            </a:gsLst>
+            <a:lin ang="5400000" scaled="1"/>
+            <a:tileRect/>
+          </a:gradFill>
+          <a:ln w="38100">
+            <a:solidFill>
+              <a:schemeClr val="tx1"/>
+            </a:solidFill>
+            <a:extLst>
+              <a:ext uri="{C807C97D-BFC1-408E-A445-0C87EB9F89A2}">
+                <ask:lineSketchStyleProps xmlns:ask="http://schemas.microsoft.com/office/drawing/2018/sketchyshapes" sd="2998267428">
+                  <a:prstGeom prst="ellipse">
+                    <a:avLst/>
+                  </a:prstGeom>
+                  <ask:type>
+                    <ask:lineSketchCurved/>
+                  </ask:type>
+                </ask:lineSketchStyleProps>
+              </a:ext>
+            </a:extLst>
+          </a:ln>
+        </p:spPr>
+        <p:style>
+          <a:lnRef idx="2">
+            <a:schemeClr val="accent1">
+              <a:shade val="50000"/>
+            </a:schemeClr>
+          </a:lnRef>
+          <a:fillRef idx="1">
+            <a:schemeClr val="accent1"/>
+          </a:fillRef>
+          <a:effectRef idx="0">
+            <a:schemeClr val="accent1"/>
+          </a:effectRef>
+          <a:fontRef idx="minor">
+            <a:schemeClr val="lt1"/>
+          </a:fontRef>
+        </p:style>
+        <p:txBody>
+          <a:bodyPr rtlCol="0" anchor="ctr"/>
+          <a:lstStyle/>
+          <a:p>
+            <a:pPr algn="ctr"/>
+            <a:endParaRPr lang="en-US" sz="1440"/>
+          </a:p>
+        </p:txBody>
+      </p:sp>
+      <p:sp>
+        <p:nvSpPr>
+          <p:cNvPr id="11" name="Arc 10">
+            <a:extLst>
+              <a:ext uri="{FF2B5EF4-FFF2-40B4-BE49-F238E27FC236}">
+                <a16:creationId xmlns:a16="http://schemas.microsoft.com/office/drawing/2014/main" id="{2189B46A-E60D-2243-C25B-99B7ED55631C}"/>
+              </a:ext>
+            </a:extLst>
+          </p:cNvPr>
+          <p:cNvSpPr/>
+          <p:nvPr/>
+        </p:nvSpPr>
+        <p:spPr>
+          <a:xfrm>
+            <a:off x="742575" y="878999"/>
+            <a:ext cx="213360" cy="183488"/>
+          </a:xfrm>
+          <a:custGeom>
+            <a:avLst/>
+            <a:gdLst>
+              <a:gd name="connsiteX0" fmla="*/ 106680 w 213360"/>
+              <a:gd name="connsiteY0" fmla="*/ 0 h 183488"/>
+              <a:gd name="connsiteX1" fmla="*/ 213360 w 213360"/>
+              <a:gd name="connsiteY1" fmla="*/ 91744 h 183488"/>
+              <a:gd name="connsiteX2" fmla="*/ 106680 w 213360"/>
+              <a:gd name="connsiteY2" fmla="*/ 91744 h 183488"/>
+              <a:gd name="connsiteX3" fmla="*/ 106680 w 213360"/>
+              <a:gd name="connsiteY3" fmla="*/ 0 h 183488"/>
+              <a:gd name="connsiteX0" fmla="*/ 106680 w 213360"/>
+              <a:gd name="connsiteY0" fmla="*/ 0 h 183488"/>
+              <a:gd name="connsiteX1" fmla="*/ 213360 w 213360"/>
+              <a:gd name="connsiteY1" fmla="*/ 91744 h 183488"/>
+            </a:gdLst>
+            <a:ahLst/>
+            <a:cxnLst>
+              <a:cxn ang="0">
+                <a:pos x="connsiteX0" y="connsiteY0"/>
+              </a:cxn>
+              <a:cxn ang="0">
+                <a:pos x="connsiteX1" y="connsiteY1"/>
+              </a:cxn>
+            </a:cxnLst>
+            <a:rect l="l" t="t" r="r" b="b"/>
+            <a:pathLst>
+              <a:path w="213360" h="183488" stroke="0" extrusionOk="0">
+                <a:moveTo>
+                  <a:pt x="106680" y="0"/>
+                </a:moveTo>
+                <a:cubicBezTo>
+                  <a:pt x="172856" y="-89"/>
+                  <a:pt x="211878" y="41703"/>
+                  <a:pt x="213360" y="91744"/>
+                </a:cubicBezTo>
+                <a:cubicBezTo>
+                  <a:pt x="200467" y="98059"/>
+                  <a:pt x="122237" y="91286"/>
+                  <a:pt x="106680" y="91744"/>
+                </a:cubicBezTo>
+                <a:cubicBezTo>
+                  <a:pt x="99863" y="70544"/>
+                  <a:pt x="112629" y="26454"/>
+                  <a:pt x="106680" y="0"/>
+                </a:cubicBezTo>
+                <a:close/>
+              </a:path>
+              <a:path w="213360" h="183488" fill="none" extrusionOk="0">
+                <a:moveTo>
+                  <a:pt x="106680" y="0"/>
+                </a:moveTo>
+                <a:cubicBezTo>
+                  <a:pt x="163190" y="-4190"/>
+                  <a:pt x="204604" y="40667"/>
+                  <a:pt x="213360" y="91744"/>
+                </a:cubicBezTo>
+              </a:path>
+            </a:pathLst>
+          </a:custGeom>
+          <a:ln w="38100">
+            <a:extLst>
+              <a:ext uri="{C807C97D-BFC1-408E-A445-0C87EB9F89A2}">
+                <ask:lineSketchStyleProps xmlns:ask="http://schemas.microsoft.com/office/drawing/2018/sketchyshapes" sd="1285288346">
+                  <a:prstGeom prst="arc">
+                    <a:avLst/>
+                  </a:prstGeom>
+                  <ask:type>
+                    <ask:lineSketchCurved/>
+                  </ask:type>
+                </ask:lineSketchStyleProps>
+              </a:ext>
+            </a:extLst>
+          </a:ln>
+          <a:scene3d>
+            <a:camera prst="orthographicFront">
+              <a:rot lat="0" lon="0" rev="2400000"/>
+            </a:camera>
+            <a:lightRig rig="threePt" dir="t"/>
+          </a:scene3d>
+        </p:spPr>
+        <p:style>
+          <a:lnRef idx="1">
+            <a:schemeClr val="dk1"/>
+          </a:lnRef>
+          <a:fillRef idx="0">
+            <a:schemeClr val="dk1"/>
+          </a:fillRef>
+          <a:effectRef idx="0">
+            <a:schemeClr val="dk1"/>
+          </a:effectRef>
+          <a:fontRef idx="minor">
+            <a:schemeClr val="tx1"/>
+          </a:fontRef>
+        </p:style>
+        <p:txBody>
+          <a:bodyPr rtlCol="0" anchor="ctr"/>
+          <a:lstStyle/>
+          <a:p>
+            <a:pPr algn="ctr"/>
+            <a:endParaRPr lang="en-US" sz="1440"/>
+          </a:p>
+        </p:txBody>
+      </p:sp>
+      <p:sp>
+        <p:nvSpPr>
+          <p:cNvPr id="18" name="Rectangle 17">
+            <a:extLst>
+              <a:ext uri="{FF2B5EF4-FFF2-40B4-BE49-F238E27FC236}">
+                <a16:creationId xmlns:a16="http://schemas.microsoft.com/office/drawing/2014/main" id="{F15B11AA-F5D8-37DC-1C2C-A20F5E9E5AAF}"/>
+              </a:ext>
+            </a:extLst>
+          </p:cNvPr>
+          <p:cNvSpPr/>
+          <p:nvPr/>
+        </p:nvSpPr>
+        <p:spPr>
+          <a:xfrm>
+            <a:off x="209347" y="903828"/>
+            <a:ext cx="63294" cy="36575"/>
+          </a:xfrm>
+          <a:custGeom>
+            <a:avLst/>
+            <a:gdLst>
+              <a:gd name="connsiteX0" fmla="*/ 0 w 63294"/>
+              <a:gd name="connsiteY0" fmla="*/ 0 h 36575"/>
+              <a:gd name="connsiteX1" fmla="*/ 63294 w 63294"/>
+              <a:gd name="connsiteY1" fmla="*/ 0 h 36575"/>
+              <a:gd name="connsiteX2" fmla="*/ 63294 w 63294"/>
+              <a:gd name="connsiteY2" fmla="*/ 36575 h 36575"/>
+              <a:gd name="connsiteX3" fmla="*/ 0 w 63294"/>
+              <a:gd name="connsiteY3" fmla="*/ 36575 h 36575"/>
+              <a:gd name="connsiteX4" fmla="*/ 0 w 63294"/>
+              <a:gd name="connsiteY4" fmla="*/ 0 h 36575"/>
+            </a:gdLst>
+            <a:ahLst/>
+            <a:cxnLst>
+              <a:cxn ang="0">
+                <a:pos x="connsiteX0" y="connsiteY0"/>
+              </a:cxn>
+              <a:cxn ang="0">
+                <a:pos x="connsiteX1" y="connsiteY1"/>
+              </a:cxn>
+              <a:cxn ang="0">
+                <a:pos x="connsiteX2" y="connsiteY2"/>
+              </a:cxn>
+              <a:cxn ang="0">
+                <a:pos x="connsiteX3" y="connsiteY3"/>
+              </a:cxn>
+              <a:cxn ang="0">
+                <a:pos x="connsiteX4" y="connsiteY4"/>
+              </a:cxn>
+            </a:cxnLst>
+            <a:rect l="l" t="t" r="r" b="b"/>
+            <a:pathLst>
+              <a:path w="63294" h="36575" fill="none" extrusionOk="0">
+                <a:moveTo>
+                  <a:pt x="0" y="0"/>
+                </a:moveTo>
+                <a:cubicBezTo>
+                  <a:pt x="16393" y="-949"/>
+                  <a:pt x="47418" y="-3140"/>
+                  <a:pt x="63294" y="0"/>
+                </a:cubicBezTo>
+                <a:cubicBezTo>
+                  <a:pt x="63689" y="15737"/>
+                  <a:pt x="61759" y="28686"/>
+                  <a:pt x="63294" y="36575"/>
+                </a:cubicBezTo>
+                <a:cubicBezTo>
+                  <a:pt x="33901" y="35514"/>
+                  <a:pt x="20977" y="38817"/>
+                  <a:pt x="0" y="36575"/>
+                </a:cubicBezTo>
+                <a:cubicBezTo>
+                  <a:pt x="584" y="26105"/>
+                  <a:pt x="-224" y="7763"/>
+                  <a:pt x="0" y="0"/>
+                </a:cubicBezTo>
+                <a:close/>
+              </a:path>
+              <a:path w="63294" h="36575" stroke="0" extrusionOk="0">
+                <a:moveTo>
+                  <a:pt x="0" y="0"/>
+                </a:moveTo>
+                <a:cubicBezTo>
+                  <a:pt x="28177" y="878"/>
+                  <a:pt x="41115" y="892"/>
+                  <a:pt x="63294" y="0"/>
+                </a:cubicBezTo>
+                <a:cubicBezTo>
+                  <a:pt x="63368" y="11321"/>
+                  <a:pt x="61617" y="24127"/>
+                  <a:pt x="63294" y="36575"/>
+                </a:cubicBezTo>
+                <a:cubicBezTo>
+                  <a:pt x="44569" y="35970"/>
+                  <a:pt x="14705" y="35334"/>
+                  <a:pt x="0" y="36575"/>
+                </a:cubicBezTo>
+                <a:cubicBezTo>
+                  <a:pt x="-1271" y="24377"/>
+                  <a:pt x="-473" y="13190"/>
+                  <a:pt x="0" y="0"/>
+                </a:cubicBezTo>
+                <a:close/>
+              </a:path>
+            </a:pathLst>
+          </a:custGeom>
+          <a:ln>
+            <a:solidFill>
+              <a:schemeClr val="tx1"/>
+            </a:solidFill>
+            <a:extLst>
+              <a:ext uri="{C807C97D-BFC1-408E-A445-0C87EB9F89A2}">
+                <ask:lineSketchStyleProps xmlns:ask="http://schemas.microsoft.com/office/drawing/2018/sketchyshapes" sd="2353769002">
+                  <a:prstGeom prst="rect">
+                    <a:avLst/>
+                  </a:prstGeom>
+                  <ask:type>
+                    <ask:lineSketchFreehand/>
+                  </ask:type>
+                </ask:lineSketchStyleProps>
+              </a:ext>
+            </a:extLst>
+          </a:ln>
+        </p:spPr>
+        <p:style>
+          <a:lnRef idx="2">
+            <a:schemeClr val="dk1">
+              <a:shade val="50000"/>
+            </a:schemeClr>
+          </a:lnRef>
+          <a:fillRef idx="1">
+            <a:schemeClr val="dk1"/>
+          </a:fillRef>
+          <a:effectRef idx="0">
+            <a:schemeClr val="dk1"/>
+          </a:effectRef>
+          <a:fontRef idx="minor">
+            <a:schemeClr val="lt1"/>
+          </a:fontRef>
+        </p:style>
+        <p:txBody>
+          <a:bodyPr rtlCol="0" anchor="ctr"/>
+          <a:lstStyle/>
+          <a:p>
+            <a:pPr algn="ctr"/>
+            <a:endParaRPr lang="en-US" sz="1440"/>
+          </a:p>
+        </p:txBody>
+      </p:sp>
+      <p:sp>
+        <p:nvSpPr>
+          <p:cNvPr id="19" name="Rectangle 18">
+            <a:extLst>
+              <a:ext uri="{FF2B5EF4-FFF2-40B4-BE49-F238E27FC236}">
+                <a16:creationId xmlns:a16="http://schemas.microsoft.com/office/drawing/2014/main" id="{4C6FA3FA-6B43-50C1-7189-266FF3B5B204}"/>
+              </a:ext>
+            </a:extLst>
+          </p:cNvPr>
+          <p:cNvSpPr/>
+          <p:nvPr/>
+        </p:nvSpPr>
+        <p:spPr>
+          <a:xfrm>
+            <a:off x="1558746" y="896112"/>
+            <a:ext cx="63294" cy="36575"/>
+          </a:xfrm>
+          <a:custGeom>
+            <a:avLst/>
+            <a:gdLst>
+              <a:gd name="connsiteX0" fmla="*/ 0 w 63294"/>
+              <a:gd name="connsiteY0" fmla="*/ 0 h 36575"/>
+              <a:gd name="connsiteX1" fmla="*/ 63294 w 63294"/>
+              <a:gd name="connsiteY1" fmla="*/ 0 h 36575"/>
+              <a:gd name="connsiteX2" fmla="*/ 63294 w 63294"/>
+              <a:gd name="connsiteY2" fmla="*/ 36575 h 36575"/>
+              <a:gd name="connsiteX3" fmla="*/ 0 w 63294"/>
+              <a:gd name="connsiteY3" fmla="*/ 36575 h 36575"/>
+              <a:gd name="connsiteX4" fmla="*/ 0 w 63294"/>
+              <a:gd name="connsiteY4" fmla="*/ 0 h 36575"/>
+            </a:gdLst>
+            <a:ahLst/>
+            <a:cxnLst>
+              <a:cxn ang="0">
+                <a:pos x="connsiteX0" y="connsiteY0"/>
+              </a:cxn>
+              <a:cxn ang="0">
+                <a:pos x="connsiteX1" y="connsiteY1"/>
+              </a:cxn>
+              <a:cxn ang="0">
+                <a:pos x="connsiteX2" y="connsiteY2"/>
+              </a:cxn>
+              <a:cxn ang="0">
+                <a:pos x="connsiteX3" y="connsiteY3"/>
+              </a:cxn>
+              <a:cxn ang="0">
+                <a:pos x="connsiteX4" y="connsiteY4"/>
+              </a:cxn>
+            </a:cxnLst>
+            <a:rect l="l" t="t" r="r" b="b"/>
+            <a:pathLst>
+              <a:path w="63294" h="36575" fill="none" extrusionOk="0">
+                <a:moveTo>
+                  <a:pt x="0" y="0"/>
+                </a:moveTo>
+                <a:cubicBezTo>
+                  <a:pt x="16393" y="-949"/>
+                  <a:pt x="47418" y="-3140"/>
+                  <a:pt x="63294" y="0"/>
+                </a:cubicBezTo>
+                <a:cubicBezTo>
+                  <a:pt x="63689" y="15737"/>
+                  <a:pt x="61759" y="28686"/>
+                  <a:pt x="63294" y="36575"/>
+                </a:cubicBezTo>
+                <a:cubicBezTo>
+                  <a:pt x="33901" y="35514"/>
+                  <a:pt x="20977" y="38817"/>
+                  <a:pt x="0" y="36575"/>
+                </a:cubicBezTo>
+                <a:cubicBezTo>
+                  <a:pt x="584" y="26105"/>
+                  <a:pt x="-224" y="7763"/>
+                  <a:pt x="0" y="0"/>
+                </a:cubicBezTo>
+                <a:close/>
+              </a:path>
+              <a:path w="63294" h="36575" stroke="0" extrusionOk="0">
+                <a:moveTo>
+                  <a:pt x="0" y="0"/>
+                </a:moveTo>
+                <a:cubicBezTo>
+                  <a:pt x="28177" y="878"/>
+                  <a:pt x="41115" y="892"/>
+                  <a:pt x="63294" y="0"/>
+                </a:cubicBezTo>
+                <a:cubicBezTo>
+                  <a:pt x="63368" y="11321"/>
+                  <a:pt x="61617" y="24127"/>
+                  <a:pt x="63294" y="36575"/>
+                </a:cubicBezTo>
+                <a:cubicBezTo>
+                  <a:pt x="44569" y="35970"/>
+                  <a:pt x="14705" y="35334"/>
+                  <a:pt x="0" y="36575"/>
+                </a:cubicBezTo>
+                <a:cubicBezTo>
+                  <a:pt x="-1271" y="24377"/>
+                  <a:pt x="-473" y="13190"/>
+                  <a:pt x="0" y="0"/>
+                </a:cubicBezTo>
+                <a:close/>
+              </a:path>
+            </a:pathLst>
+          </a:custGeom>
+          <a:ln>
+            <a:solidFill>
+              <a:schemeClr val="tx1"/>
+            </a:solidFill>
+            <a:extLst>
+              <a:ext uri="{C807C97D-BFC1-408E-A445-0C87EB9F89A2}">
+                <ask:lineSketchStyleProps xmlns:ask="http://schemas.microsoft.com/office/drawing/2018/sketchyshapes" sd="2353769002">
+                  <a:prstGeom prst="rect">
+                    <a:avLst/>
+                  </a:prstGeom>
+                  <ask:type>
+                    <ask:lineSketchFreehand/>
+                  </ask:type>
+                </ask:lineSketchStyleProps>
+              </a:ext>
+            </a:extLst>
+          </a:ln>
+        </p:spPr>
+        <p:style>
+          <a:lnRef idx="2">
+            <a:schemeClr val="dk1">
+              <a:shade val="50000"/>
+            </a:schemeClr>
+          </a:lnRef>
+          <a:fillRef idx="1">
+            <a:schemeClr val="dk1"/>
+          </a:fillRef>
+          <a:effectRef idx="0">
+            <a:schemeClr val="dk1"/>
+          </a:effectRef>
+          <a:fontRef idx="minor">
+            <a:schemeClr val="lt1"/>
+          </a:fontRef>
+        </p:style>
+        <p:txBody>
+          <a:bodyPr rtlCol="0" anchor="ctr"/>
+          <a:lstStyle/>
+          <a:p>
+            <a:pPr algn="ctr"/>
+            <a:endParaRPr lang="en-US" sz="1440"/>
           </a:p>
         </p:txBody>
       </p:sp>

</xml_diff>